<commit_message>
added SNS topic to fanout the Lambda function
</commit_message>
<xml_diff>
--- a/aws_sra_examples/solutions/config/config_org/documentation/sra-config-org.pptx
+++ b/aws_sra_examples/solutions/config/config_org/documentation/sra-config-org.pptx
@@ -208,7 +208,7 @@
           <a:p>
             <a:fld id="{FD8D84E3-00BA-4A46-8256-7E527D8B4480}" type="datetimeFigureOut">
               <a:rPr lang="en-US" smtClean="0"/>
-              <a:t>11/2/23</a:t>
+              <a:t>1/17/24</a:t>
             </a:fld>
             <a:endParaRPr lang="en-US"/>
           </a:p>
@@ -706,7 +706,7 @@
           <a:p>
             <a:fld id="{9FE185F7-9B28-9F45-9F43-9CB5A0B99390}" type="datetimeFigureOut">
               <a:rPr lang="en-US" smtClean="0"/>
-              <a:t>11/2/23</a:t>
+              <a:t>1/17/24</a:t>
             </a:fld>
             <a:endParaRPr lang="en-US"/>
           </a:p>
@@ -904,7 +904,7 @@
           <a:p>
             <a:fld id="{9FE185F7-9B28-9F45-9F43-9CB5A0B99390}" type="datetimeFigureOut">
               <a:rPr lang="en-US" smtClean="0"/>
-              <a:t>11/2/23</a:t>
+              <a:t>1/17/24</a:t>
             </a:fld>
             <a:endParaRPr lang="en-US"/>
           </a:p>
@@ -1112,7 +1112,7 @@
           <a:p>
             <a:fld id="{9FE185F7-9B28-9F45-9F43-9CB5A0B99390}" type="datetimeFigureOut">
               <a:rPr lang="en-US" smtClean="0"/>
-              <a:t>11/2/23</a:t>
+              <a:t>1/17/24</a:t>
             </a:fld>
             <a:endParaRPr lang="en-US"/>
           </a:p>
@@ -1310,7 +1310,7 @@
           <a:p>
             <a:fld id="{9FE185F7-9B28-9F45-9F43-9CB5A0B99390}" type="datetimeFigureOut">
               <a:rPr lang="en-US" smtClean="0"/>
-              <a:t>11/2/23</a:t>
+              <a:t>1/17/24</a:t>
             </a:fld>
             <a:endParaRPr lang="en-US"/>
           </a:p>
@@ -1585,7 +1585,7 @@
           <a:p>
             <a:fld id="{9FE185F7-9B28-9F45-9F43-9CB5A0B99390}" type="datetimeFigureOut">
               <a:rPr lang="en-US" smtClean="0"/>
-              <a:t>11/2/23</a:t>
+              <a:t>1/17/24</a:t>
             </a:fld>
             <a:endParaRPr lang="en-US"/>
           </a:p>
@@ -1850,7 +1850,7 @@
           <a:p>
             <a:fld id="{9FE185F7-9B28-9F45-9F43-9CB5A0B99390}" type="datetimeFigureOut">
               <a:rPr lang="en-US" smtClean="0"/>
-              <a:t>11/2/23</a:t>
+              <a:t>1/17/24</a:t>
             </a:fld>
             <a:endParaRPr lang="en-US"/>
           </a:p>
@@ -2262,7 +2262,7 @@
           <a:p>
             <a:fld id="{9FE185F7-9B28-9F45-9F43-9CB5A0B99390}" type="datetimeFigureOut">
               <a:rPr lang="en-US" smtClean="0"/>
-              <a:t>11/2/23</a:t>
+              <a:t>1/17/24</a:t>
             </a:fld>
             <a:endParaRPr lang="en-US"/>
           </a:p>
@@ -2403,7 +2403,7 @@
           <a:p>
             <a:fld id="{9FE185F7-9B28-9F45-9F43-9CB5A0B99390}" type="datetimeFigureOut">
               <a:rPr lang="en-US" smtClean="0"/>
-              <a:t>11/2/23</a:t>
+              <a:t>1/17/24</a:t>
             </a:fld>
             <a:endParaRPr lang="en-US"/>
           </a:p>
@@ -2516,7 +2516,7 @@
           <a:p>
             <a:fld id="{9FE185F7-9B28-9F45-9F43-9CB5A0B99390}" type="datetimeFigureOut">
               <a:rPr lang="en-US" smtClean="0"/>
-              <a:t>11/2/23</a:t>
+              <a:t>1/17/24</a:t>
             </a:fld>
             <a:endParaRPr lang="en-US"/>
           </a:p>
@@ -2827,7 +2827,7 @@
           <a:p>
             <a:fld id="{9FE185F7-9B28-9F45-9F43-9CB5A0B99390}" type="datetimeFigureOut">
               <a:rPr lang="en-US" smtClean="0"/>
-              <a:t>11/2/23</a:t>
+              <a:t>1/17/24</a:t>
             </a:fld>
             <a:endParaRPr lang="en-US"/>
           </a:p>
@@ -3115,7 +3115,7 @@
           <a:p>
             <a:fld id="{9FE185F7-9B28-9F45-9F43-9CB5A0B99390}" type="datetimeFigureOut">
               <a:rPr lang="en-US" smtClean="0"/>
-              <a:t>11/2/23</a:t>
+              <a:t>1/17/24</a:t>
             </a:fld>
             <a:endParaRPr lang="en-US"/>
           </a:p>
@@ -3356,7 +3356,7 @@
           <a:p>
             <a:fld id="{9FE185F7-9B28-9F45-9F43-9CB5A0B99390}" type="datetimeFigureOut">
               <a:rPr lang="en-US" smtClean="0"/>
-              <a:t>11/2/23</a:t>
+              <a:t>1/17/24</a:t>
             </a:fld>
             <a:endParaRPr lang="en-US"/>
           </a:p>
@@ -4878,7 +4878,7 @@
                 <a:latin typeface="Arial" panose="020B0604020202020204" pitchFamily="34" charset="0"/>
                 <a:cs typeface="Arial" panose="020B0604020202020204" pitchFamily="34" charset="0"/>
               </a:rPr>
-              <a:t>1.6</a:t>
+              <a:t>1.7</a:t>
             </a:r>
           </a:p>
         </p:txBody>
@@ -4938,7 +4938,7 @@
                 <a:latin typeface="Arial" panose="020B0604020202020204" pitchFamily="34" charset="0"/>
                 <a:cs typeface="Arial" panose="020B0604020202020204" pitchFamily="34" charset="0"/>
               </a:rPr>
-              <a:t>1.7</a:t>
+              <a:t>1.8</a:t>
             </a:r>
           </a:p>
         </p:txBody>
@@ -7483,7 +7483,7 @@
         </p:nvSpPr>
         <p:spPr>
           <a:xfrm>
-            <a:off x="1308997" y="4545942"/>
+            <a:off x="1300149" y="4531107"/>
             <a:ext cx="253435" cy="212902"/>
           </a:xfrm>
           <a:prstGeom prst="ellipse">
@@ -7853,8 +7853,8 @@
         </p:nvSpPr>
         <p:spPr>
           <a:xfrm>
-            <a:off x="4727568" y="4476815"/>
-            <a:ext cx="1981450" cy="1493707"/>
+            <a:off x="4092705" y="4476815"/>
+            <a:ext cx="2616313" cy="1493707"/>
           </a:xfrm>
           <a:prstGeom prst="rect">
             <a:avLst/>
@@ -7946,7 +7946,7 @@
         </p:blipFill>
         <p:spPr>
           <a:xfrm>
-            <a:off x="4729712" y="4476434"/>
+            <a:off x="4082851" y="4481705"/>
             <a:ext cx="442506" cy="391567"/>
           </a:xfrm>
           <a:prstGeom prst="rect">
@@ -7975,8 +7975,8 @@
         </p:nvSpPr>
         <p:spPr>
           <a:xfrm>
-            <a:off x="4816752" y="4789779"/>
-            <a:ext cx="1981450" cy="1366400"/>
+            <a:off x="4275769" y="4789779"/>
+            <a:ext cx="2522433" cy="1366400"/>
           </a:xfrm>
           <a:prstGeom prst="rect">
             <a:avLst/>
@@ -8695,7 +8695,7 @@
                 <a:latin typeface="Arial" panose="020B0604020202020204" pitchFamily="34" charset="0"/>
                 <a:cs typeface="Arial" panose="020B0604020202020204" pitchFamily="34" charset="0"/>
               </a:rPr>
-              <a:t>1.9</a:t>
+              <a:t>1.10</a:t>
             </a:r>
           </a:p>
         </p:txBody>
@@ -9097,12 +9097,157 @@
           </a:fontRef>
         </p:style>
       </p:cxnSp>
+      <p:sp>
+        <p:nvSpPr>
+          <p:cNvPr id="29" name="TextBox 28">
+            <a:extLst>
+              <a:ext uri="{FF2B5EF4-FFF2-40B4-BE49-F238E27FC236}">
+                <a16:creationId xmlns:a16="http://schemas.microsoft.com/office/drawing/2014/main" id="{F441BD57-985B-3F49-99C3-BF3B9E891322}"/>
+              </a:ext>
+            </a:extLst>
+          </p:cNvPr>
+          <p:cNvSpPr txBox="1"/>
+          <p:nvPr/>
+        </p:nvSpPr>
+        <p:spPr>
+          <a:xfrm>
+            <a:off x="1994024" y="5945492"/>
+            <a:ext cx="1405120" cy="430887"/>
+          </a:xfrm>
+          <a:prstGeom prst="rect">
+            <a:avLst/>
+          </a:prstGeom>
+          <a:noFill/>
+        </p:spPr>
+        <p:txBody>
+          <a:bodyPr wrap="square" rtlCol="0">
+            <a:spAutoFit/>
+          </a:bodyPr>
+          <a:lstStyle/>
+          <a:p>
+            <a:pPr algn="ctr"/>
+            <a:r>
+              <a:rPr lang="en-US" sz="1100" dirty="0">
+                <a:latin typeface="Arial" panose="020B0604020202020204" pitchFamily="34" charset="0"/>
+                <a:cs typeface="Arial" panose="020B0604020202020204" pitchFamily="34" charset="0"/>
+              </a:rPr>
+              <a:t>Config </a:t>
+            </a:r>
+          </a:p>
+          <a:p>
+            <a:pPr algn="ctr"/>
+            <a:r>
+              <a:rPr lang="en-US" sz="1100" dirty="0">
+                <a:latin typeface="Arial" panose="020B0604020202020204" pitchFamily="34" charset="0"/>
+                <a:cs typeface="Arial" panose="020B0604020202020204" pitchFamily="34" charset="0"/>
+              </a:rPr>
+              <a:t>Aggregator Role</a:t>
+            </a:r>
+          </a:p>
+        </p:txBody>
+      </p:sp>
       <p:pic>
         <p:nvPicPr>
-          <p:cNvPr id="26" name="Graphic 17">
-            <a:extLst>
-              <a:ext uri="{FF2B5EF4-FFF2-40B4-BE49-F238E27FC236}">
-                <a16:creationId xmlns:a16="http://schemas.microsoft.com/office/drawing/2014/main" id="{7564EB38-E6C9-BEA3-06C8-2CA7A178281D}"/>
+          <p:cNvPr id="30" name="Graphic 29">
+            <a:extLst>
+              <a:ext uri="{FF2B5EF4-FFF2-40B4-BE49-F238E27FC236}">
+                <a16:creationId xmlns:a16="http://schemas.microsoft.com/office/drawing/2014/main" id="{EC7991A4-D5C4-088B-091C-5C2EC8F034B9}"/>
+              </a:ext>
+            </a:extLst>
+          </p:cNvPr>
+          <p:cNvPicPr>
+            <a:picLocks noChangeAspect="1"/>
+          </p:cNvPicPr>
+          <p:nvPr/>
+        </p:nvPicPr>
+        <p:blipFill>
+          <a:blip r:embed="rId17">
+            <a:extLst>
+              <a:ext uri="{96DAC541-7B7A-43D3-8B79-37D633B846F1}">
+                <asvg:svgBlip xmlns:asvg="http://schemas.microsoft.com/office/drawing/2016/SVG/main" r:embed="rId18"/>
+              </a:ext>
+            </a:extLst>
+          </a:blip>
+          <a:stretch>
+            <a:fillRect/>
+          </a:stretch>
+        </p:blipFill>
+        <p:spPr>
+          <a:xfrm>
+            <a:off x="2453666" y="5639415"/>
+            <a:ext cx="469900" cy="469900"/>
+          </a:xfrm>
+          <a:prstGeom prst="rect">
+            <a:avLst/>
+          </a:prstGeom>
+        </p:spPr>
+      </p:pic>
+      <p:sp>
+        <p:nvSpPr>
+          <p:cNvPr id="31" name="Oval 30">
+            <a:extLst>
+              <a:ext uri="{FF2B5EF4-FFF2-40B4-BE49-F238E27FC236}">
+                <a16:creationId xmlns:a16="http://schemas.microsoft.com/office/drawing/2014/main" id="{71712401-EE44-D9B6-6171-3CB782CF2E00}"/>
+              </a:ext>
+            </a:extLst>
+          </p:cNvPr>
+          <p:cNvSpPr/>
+          <p:nvPr/>
+        </p:nvSpPr>
+        <p:spPr>
+          <a:xfrm>
+            <a:off x="2356750" y="5552189"/>
+            <a:ext cx="253435" cy="212902"/>
+          </a:xfrm>
+          <a:prstGeom prst="ellipse">
+            <a:avLst/>
+          </a:prstGeom>
+          <a:solidFill>
+            <a:schemeClr val="tx1"/>
+          </a:solidFill>
+          <a:ln>
+            <a:solidFill>
+              <a:schemeClr val="tx1"/>
+            </a:solidFill>
+          </a:ln>
+        </p:spPr>
+        <p:style>
+          <a:lnRef idx="2">
+            <a:schemeClr val="accent1">
+              <a:shade val="50000"/>
+            </a:schemeClr>
+          </a:lnRef>
+          <a:fillRef idx="1">
+            <a:schemeClr val="accent1"/>
+          </a:fillRef>
+          <a:effectRef idx="0">
+            <a:schemeClr val="accent1"/>
+          </a:effectRef>
+          <a:fontRef idx="minor">
+            <a:schemeClr val="lt1"/>
+          </a:fontRef>
+        </p:style>
+        <p:txBody>
+          <a:bodyPr lIns="0" tIns="0" rIns="0" bIns="0" rtlCol="0" anchor="ctr"/>
+          <a:lstStyle/>
+          <a:p>
+            <a:pPr algn="ctr"/>
+            <a:r>
+              <a:rPr lang="en-US" sz="800" dirty="0">
+                <a:latin typeface="Arial" panose="020B0604020202020204" pitchFamily="34" charset="0"/>
+                <a:cs typeface="Arial" panose="020B0604020202020204" pitchFamily="34" charset="0"/>
+              </a:rPr>
+              <a:t>3.5</a:t>
+            </a:r>
+          </a:p>
+        </p:txBody>
+      </p:sp>
+      <p:pic>
+        <p:nvPicPr>
+          <p:cNvPr id="32" name="Graphic 7">
+            <a:extLst>
+              <a:ext uri="{FF2B5EF4-FFF2-40B4-BE49-F238E27FC236}">
+                <a16:creationId xmlns:a16="http://schemas.microsoft.com/office/drawing/2014/main" id="{285D0C81-7FE5-E018-1499-16DDA2CA65A1}"/>
               </a:ext>
             </a:extLst>
           </p:cNvPr>
@@ -9112,7 +9257,7 @@
           <p:nvPr/>
         </p:nvPicPr>
         <p:blipFill>
-          <a:blip r:embed="rId9">
+          <a:blip r:embed="rId22">
             <a:extLst>
               <a:ext uri="{28A0092B-C50C-407E-A947-70E740481C1C}">
                 <a14:useLocalDpi xmlns:a14="http://schemas.microsoft.com/office/drawing/2010/main" val="0"/>
@@ -9126,7 +9271,7 @@
         </p:blipFill>
         <p:spPr bwMode="auto">
           <a:xfrm>
-            <a:off x="2713049" y="4610823"/>
+            <a:off x="2457751" y="4608783"/>
             <a:ext cx="457200" cy="457200"/>
           </a:xfrm>
           <a:prstGeom prst="rect">
@@ -9159,10 +9304,10 @@
       </p:pic>
       <p:sp>
         <p:nvSpPr>
-          <p:cNvPr id="27" name="TextBox 2">
-            <a:extLst>
-              <a:ext uri="{FF2B5EF4-FFF2-40B4-BE49-F238E27FC236}">
-                <a16:creationId xmlns:a16="http://schemas.microsoft.com/office/drawing/2014/main" id="{869D045B-78C3-F872-E3CD-EF106730F8EF}"/>
+          <p:cNvPr id="40" name="TextBox 39">
+            <a:extLst>
+              <a:ext uri="{FF2B5EF4-FFF2-40B4-BE49-F238E27FC236}">
+                <a16:creationId xmlns:a16="http://schemas.microsoft.com/office/drawing/2014/main" id="{9036CCF1-19D8-E915-FD29-2D54271D0B79}"/>
               </a:ext>
             </a:extLst>
           </p:cNvPr>
@@ -9171,8 +9316,1377 @@
         </p:nvSpPr>
         <p:spPr>
           <a:xfrm>
-            <a:off x="2284636" y="5074014"/>
-            <a:ext cx="1273984" cy="261610"/>
+            <a:off x="2150353" y="5060627"/>
+            <a:ext cx="1115962" cy="430887"/>
+          </a:xfrm>
+          <a:prstGeom prst="rect">
+            <a:avLst/>
+          </a:prstGeom>
+          <a:noFill/>
+        </p:spPr>
+        <p:txBody>
+          <a:bodyPr wrap="square" rtlCol="0">
+            <a:spAutoFit/>
+          </a:bodyPr>
+          <a:lstStyle/>
+          <a:p>
+            <a:pPr algn="ctr"/>
+            <a:r>
+              <a:rPr lang="en-US" sz="1100" dirty="0">
+                <a:latin typeface="Arial" panose="020B0604020202020204" pitchFamily="34" charset="0"/>
+                <a:cs typeface="Arial" panose="020B0604020202020204" pitchFamily="34" charset="0"/>
+              </a:rPr>
+              <a:t>Delivery KMS Key</a:t>
+            </a:r>
+          </a:p>
+        </p:txBody>
+      </p:sp>
+      <p:sp>
+        <p:nvSpPr>
+          <p:cNvPr id="43" name="Oval 42">
+            <a:extLst>
+              <a:ext uri="{FF2B5EF4-FFF2-40B4-BE49-F238E27FC236}">
+                <a16:creationId xmlns:a16="http://schemas.microsoft.com/office/drawing/2014/main" id="{53D48C63-48F3-8838-3DEE-58DA4DA1F93F}"/>
+              </a:ext>
+            </a:extLst>
+          </p:cNvPr>
+          <p:cNvSpPr/>
+          <p:nvPr/>
+        </p:nvSpPr>
+        <p:spPr>
+          <a:xfrm>
+            <a:off x="2360760" y="4533805"/>
+            <a:ext cx="253435" cy="212902"/>
+          </a:xfrm>
+          <a:prstGeom prst="ellipse">
+            <a:avLst/>
+          </a:prstGeom>
+          <a:solidFill>
+            <a:schemeClr val="tx1"/>
+          </a:solidFill>
+          <a:ln>
+            <a:solidFill>
+              <a:schemeClr val="tx1"/>
+            </a:solidFill>
+          </a:ln>
+        </p:spPr>
+        <p:style>
+          <a:lnRef idx="2">
+            <a:schemeClr val="accent1">
+              <a:shade val="50000"/>
+            </a:schemeClr>
+          </a:lnRef>
+          <a:fillRef idx="1">
+            <a:schemeClr val="accent1"/>
+          </a:fillRef>
+          <a:effectRef idx="0">
+            <a:schemeClr val="accent1"/>
+          </a:effectRef>
+          <a:fontRef idx="minor">
+            <a:schemeClr val="lt1"/>
+          </a:fontRef>
+        </p:style>
+        <p:txBody>
+          <a:bodyPr lIns="0" tIns="0" rIns="0" bIns="0" rtlCol="0" anchor="ctr"/>
+          <a:lstStyle/>
+          <a:p>
+            <a:pPr algn="ctr"/>
+            <a:r>
+              <a:rPr lang="en-US" sz="800" dirty="0">
+                <a:latin typeface="Arial" panose="020B0604020202020204" pitchFamily="34" charset="0"/>
+                <a:cs typeface="Arial" panose="020B0604020202020204" pitchFamily="34" charset="0"/>
+              </a:rPr>
+              <a:t>3.2</a:t>
+            </a:r>
+          </a:p>
+        </p:txBody>
+      </p:sp>
+      <p:sp>
+        <p:nvSpPr>
+          <p:cNvPr id="44" name="TextBox 43">
+            <a:extLst>
+              <a:ext uri="{FF2B5EF4-FFF2-40B4-BE49-F238E27FC236}">
+                <a16:creationId xmlns:a16="http://schemas.microsoft.com/office/drawing/2014/main" id="{EFAE6A75-3526-ABBF-1A4A-28677634242C}"/>
+              </a:ext>
+            </a:extLst>
+          </p:cNvPr>
+          <p:cNvSpPr txBox="1"/>
+          <p:nvPr/>
+        </p:nvSpPr>
+        <p:spPr>
+          <a:xfrm>
+            <a:off x="8633467" y="2875526"/>
+            <a:ext cx="1103001" cy="430887"/>
+          </a:xfrm>
+          <a:prstGeom prst="rect">
+            <a:avLst/>
+          </a:prstGeom>
+          <a:noFill/>
+        </p:spPr>
+        <p:txBody>
+          <a:bodyPr wrap="square" rtlCol="0">
+            <a:spAutoFit/>
+          </a:bodyPr>
+          <a:lstStyle/>
+          <a:p>
+            <a:pPr algn="ctr"/>
+            <a:r>
+              <a:rPr lang="en-US" sz="1100" dirty="0">
+                <a:latin typeface="Arial" panose="020B0604020202020204" pitchFamily="34" charset="0"/>
+                <a:cs typeface="Arial" panose="020B0604020202020204" pitchFamily="34" charset="0"/>
+              </a:rPr>
+              <a:t>Configuration Role</a:t>
+            </a:r>
+          </a:p>
+        </p:txBody>
+      </p:sp>
+      <p:pic>
+        <p:nvPicPr>
+          <p:cNvPr id="45" name="Graphic 44">
+            <a:extLst>
+              <a:ext uri="{FF2B5EF4-FFF2-40B4-BE49-F238E27FC236}">
+                <a16:creationId xmlns:a16="http://schemas.microsoft.com/office/drawing/2014/main" id="{C28EE8F8-227B-0272-04A5-504C1E35E717}"/>
+              </a:ext>
+            </a:extLst>
+          </p:cNvPr>
+          <p:cNvPicPr>
+            <a:picLocks noChangeAspect="1"/>
+          </p:cNvPicPr>
+          <p:nvPr/>
+        </p:nvPicPr>
+        <p:blipFill>
+          <a:blip r:embed="rId17">
+            <a:extLst>
+              <a:ext uri="{96DAC541-7B7A-43D3-8B79-37D633B846F1}">
+                <asvg:svgBlip xmlns:asvg="http://schemas.microsoft.com/office/drawing/2016/SVG/main" r:embed="rId18"/>
+              </a:ext>
+            </a:extLst>
+          </a:blip>
+          <a:stretch>
+            <a:fillRect/>
+          </a:stretch>
+        </p:blipFill>
+        <p:spPr>
+          <a:xfrm>
+            <a:off x="8915394" y="2519662"/>
+            <a:ext cx="469900" cy="469900"/>
+          </a:xfrm>
+          <a:prstGeom prst="rect">
+            <a:avLst/>
+          </a:prstGeom>
+        </p:spPr>
+      </p:pic>
+      <p:sp>
+        <p:nvSpPr>
+          <p:cNvPr id="170" name="Oval 169">
+            <a:extLst>
+              <a:ext uri="{FF2B5EF4-FFF2-40B4-BE49-F238E27FC236}">
+                <a16:creationId xmlns:a16="http://schemas.microsoft.com/office/drawing/2014/main" id="{97797EDC-C96B-4205-9EA5-4896D4E19CC8}"/>
+              </a:ext>
+            </a:extLst>
+          </p:cNvPr>
+          <p:cNvSpPr/>
+          <p:nvPr/>
+        </p:nvSpPr>
+        <p:spPr>
+          <a:xfrm>
+            <a:off x="2851114" y="1843129"/>
+            <a:ext cx="253435" cy="212902"/>
+          </a:xfrm>
+          <a:prstGeom prst="ellipse">
+            <a:avLst/>
+          </a:prstGeom>
+          <a:solidFill>
+            <a:schemeClr val="tx1"/>
+          </a:solidFill>
+          <a:ln>
+            <a:solidFill>
+              <a:schemeClr val="tx1"/>
+            </a:solidFill>
+          </a:ln>
+        </p:spPr>
+        <p:style>
+          <a:lnRef idx="2">
+            <a:schemeClr val="accent1">
+              <a:shade val="50000"/>
+            </a:schemeClr>
+          </a:lnRef>
+          <a:fillRef idx="1">
+            <a:schemeClr val="accent1"/>
+          </a:fillRef>
+          <a:effectRef idx="0">
+            <a:schemeClr val="accent1"/>
+          </a:effectRef>
+          <a:fontRef idx="minor">
+            <a:schemeClr val="lt1"/>
+          </a:fontRef>
+        </p:style>
+        <p:txBody>
+          <a:bodyPr lIns="0" tIns="0" rIns="0" bIns="0" rtlCol="0" anchor="ctr"/>
+          <a:lstStyle/>
+          <a:p>
+            <a:pPr algn="ctr"/>
+            <a:r>
+              <a:rPr lang="en-US" sz="800" dirty="0">
+                <a:latin typeface="Arial" panose="020B0604020202020204" pitchFamily="34" charset="0"/>
+                <a:cs typeface="Arial" panose="020B0604020202020204" pitchFamily="34" charset="0"/>
+              </a:rPr>
+              <a:t>1.9</a:t>
+            </a:r>
+          </a:p>
+        </p:txBody>
+      </p:sp>
+      <p:pic>
+        <p:nvPicPr>
+          <p:cNvPr id="2" name="Graphic 1">
+            <a:extLst>
+              <a:ext uri="{FF2B5EF4-FFF2-40B4-BE49-F238E27FC236}">
+                <a16:creationId xmlns:a16="http://schemas.microsoft.com/office/drawing/2014/main" id="{A85F3AAE-E32D-A9FD-BF13-A31E332CC209}"/>
+              </a:ext>
+            </a:extLst>
+          </p:cNvPr>
+          <p:cNvPicPr>
+            <a:picLocks noChangeAspect="1"/>
+          </p:cNvPicPr>
+          <p:nvPr/>
+        </p:nvPicPr>
+        <p:blipFill>
+          <a:blip r:embed="rId12">
+            <a:extLst>
+              <a:ext uri="{96DAC541-7B7A-43D3-8B79-37D633B846F1}">
+                <asvg:svgBlip xmlns:asvg="http://schemas.microsoft.com/office/drawing/2016/SVG/main" r:embed="rId13"/>
+              </a:ext>
+            </a:extLst>
+          </a:blip>
+          <a:stretch>
+            <a:fillRect/>
+          </a:stretch>
+        </p:blipFill>
+        <p:spPr>
+          <a:xfrm>
+            <a:off x="4265076" y="4781067"/>
+            <a:ext cx="442506" cy="391567"/>
+          </a:xfrm>
+          <a:prstGeom prst="rect">
+            <a:avLst/>
+          </a:prstGeom>
+          <a:effectLst>
+            <a:outerShdw blurRad="50800" dist="38100" dir="13500000" algn="br" rotWithShape="0">
+              <a:prstClr val="black">
+                <a:alpha val="40000"/>
+              </a:prstClr>
+            </a:outerShdw>
+          </a:effectLst>
+        </p:spPr>
+      </p:pic>
+      <p:sp>
+        <p:nvSpPr>
+          <p:cNvPr id="99" name="Rectangle 98">
+            <a:extLst>
+              <a:ext uri="{FF2B5EF4-FFF2-40B4-BE49-F238E27FC236}">
+                <a16:creationId xmlns:a16="http://schemas.microsoft.com/office/drawing/2014/main" id="{C03B0D71-46A9-CAB8-23CA-03441DD94C5D}"/>
+              </a:ext>
+            </a:extLst>
+          </p:cNvPr>
+          <p:cNvSpPr/>
+          <p:nvPr/>
+        </p:nvSpPr>
+        <p:spPr>
+          <a:xfrm>
+            <a:off x="4444070" y="5097937"/>
+            <a:ext cx="2441714" cy="1211596"/>
+          </a:xfrm>
+          <a:prstGeom prst="rect">
+            <a:avLst/>
+          </a:prstGeom>
+          <a:solidFill>
+            <a:schemeClr val="bg1"/>
+          </a:solidFill>
+          <a:ln w="12700">
+            <a:solidFill>
+              <a:srgbClr val="5B9CD5"/>
+            </a:solidFill>
+            <a:prstDash val="sysDash"/>
+          </a:ln>
+          <a:effectLst>
+            <a:outerShdw blurRad="50800" dist="38100" dir="13500000" algn="br" rotWithShape="0">
+              <a:prstClr val="black">
+                <a:alpha val="40000"/>
+              </a:prstClr>
+            </a:outerShdw>
+          </a:effectLst>
+        </p:spPr>
+        <p:style>
+          <a:lnRef idx="2">
+            <a:schemeClr val="accent1">
+              <a:shade val="50000"/>
+            </a:schemeClr>
+          </a:lnRef>
+          <a:fillRef idx="1">
+            <a:schemeClr val="accent1"/>
+          </a:fillRef>
+          <a:effectRef idx="0">
+            <a:schemeClr val="accent1"/>
+          </a:effectRef>
+          <a:fontRef idx="minor">
+            <a:schemeClr val="lt1"/>
+          </a:fontRef>
+        </p:style>
+        <p:txBody>
+          <a:bodyPr lIns="502920" tIns="91440"/>
+          <a:lstStyle/>
+          <a:p>
+            <a:pPr eaLnBrk="1" fontAlgn="auto" hangingPunct="1">
+              <a:spcBef>
+                <a:spcPts val="0"/>
+              </a:spcBef>
+              <a:spcAft>
+                <a:spcPts val="0"/>
+              </a:spcAft>
+              <a:defRPr/>
+            </a:pPr>
+            <a:r>
+              <a:rPr lang="en-US" sz="1200" dirty="0">
+                <a:solidFill>
+                  <a:srgbClr val="5B9CD5"/>
+                </a:solidFill>
+                <a:latin typeface="Arial" panose="020B0604020202020204" pitchFamily="34" charset="0"/>
+                <a:cs typeface="Arial" panose="020B0604020202020204" pitchFamily="34" charset="0"/>
+              </a:rPr>
+              <a:t>Region n</a:t>
+            </a:r>
+          </a:p>
+        </p:txBody>
+      </p:sp>
+      <p:sp>
+        <p:nvSpPr>
+          <p:cNvPr id="101" name="TextBox 100">
+            <a:extLst>
+              <a:ext uri="{FF2B5EF4-FFF2-40B4-BE49-F238E27FC236}">
+                <a16:creationId xmlns:a16="http://schemas.microsoft.com/office/drawing/2014/main" id="{A74ADE8E-4897-0A9C-D8A6-B3A0F7DEDAFF}"/>
+              </a:ext>
+            </a:extLst>
+          </p:cNvPr>
+          <p:cNvSpPr txBox="1"/>
+          <p:nvPr/>
+        </p:nvSpPr>
+        <p:spPr>
+          <a:xfrm>
+            <a:off x="5849492" y="5914604"/>
+            <a:ext cx="1504214" cy="430887"/>
+          </a:xfrm>
+          <a:prstGeom prst="rect">
+            <a:avLst/>
+          </a:prstGeom>
+          <a:noFill/>
+        </p:spPr>
+        <p:txBody>
+          <a:bodyPr wrap="square" rtlCol="0">
+            <a:spAutoFit/>
+          </a:bodyPr>
+          <a:lstStyle/>
+          <a:p>
+            <a:pPr algn="ctr"/>
+            <a:r>
+              <a:rPr lang="en-US" sz="1100" dirty="0">
+                <a:latin typeface="Arial" panose="020B0604020202020204" pitchFamily="34" charset="0"/>
+                <a:cs typeface="Arial" panose="020B0604020202020204" pitchFamily="34" charset="0"/>
+              </a:rPr>
+              <a:t>AWS </a:t>
+            </a:r>
+          </a:p>
+          <a:p>
+            <a:pPr algn="ctr"/>
+            <a:r>
+              <a:rPr lang="en-US" sz="1100" dirty="0">
+                <a:latin typeface="Arial" panose="020B0604020202020204" pitchFamily="34" charset="0"/>
+                <a:cs typeface="Arial" panose="020B0604020202020204" pitchFamily="34" charset="0"/>
+              </a:rPr>
+              <a:t>Config </a:t>
+            </a:r>
+          </a:p>
+        </p:txBody>
+      </p:sp>
+      <p:pic>
+        <p:nvPicPr>
+          <p:cNvPr id="25" name="Graphic 8">
+            <a:extLst>
+              <a:ext uri="{FF2B5EF4-FFF2-40B4-BE49-F238E27FC236}">
+                <a16:creationId xmlns:a16="http://schemas.microsoft.com/office/drawing/2014/main" id="{B3A940F9-11E8-BBC7-D543-93975E21C63D}"/>
+              </a:ext>
+            </a:extLst>
+          </p:cNvPr>
+          <p:cNvPicPr>
+            <a:picLocks noChangeAspect="1" noChangeArrowheads="1"/>
+          </p:cNvPicPr>
+          <p:nvPr/>
+        </p:nvPicPr>
+        <p:blipFill>
+          <a:blip r:embed="rId19">
+            <a:extLst>
+              <a:ext uri="{96DAC541-7B7A-43D3-8B79-37D633B846F1}">
+                <asvg:svgBlip xmlns:asvg="http://schemas.microsoft.com/office/drawing/2016/SVG/main" r:embed="rId20"/>
+              </a:ext>
+            </a:extLst>
+          </a:blip>
+          <a:srcRect/>
+          <a:stretch/>
+        </p:blipFill>
+        <p:spPr bwMode="auto">
+          <a:xfrm>
+            <a:off x="6361444" y="5511565"/>
+            <a:ext cx="458847" cy="458847"/>
+          </a:xfrm>
+          <a:prstGeom prst="rect">
+            <a:avLst/>
+          </a:prstGeom>
+          <a:noFill/>
+          <a:ln>
+            <a:noFill/>
+          </a:ln>
+          <a:extLst>
+            <a:ext uri="{909E8E84-426E-40DD-AFC4-6F175D3DCCD1}">
+              <a14:hiddenFill xmlns:a14="http://schemas.microsoft.com/office/drawing/2010/main">
+                <a:solidFill>
+                  <a:srgbClr val="FFFFFF"/>
+                </a:solidFill>
+              </a14:hiddenFill>
+            </a:ext>
+            <a:ext uri="{91240B29-F687-4F45-9708-019B960494DF}">
+              <a14:hiddenLine xmlns:a14="http://schemas.microsoft.com/office/drawing/2010/main" w="9525">
+                <a:solidFill>
+                  <a:srgbClr val="000000"/>
+                </a:solidFill>
+                <a:miter lim="800000"/>
+                <a:headEnd/>
+                <a:tailEnd/>
+              </a14:hiddenLine>
+            </a:ext>
+          </a:extLst>
+        </p:spPr>
+      </p:pic>
+      <p:sp>
+        <p:nvSpPr>
+          <p:cNvPr id="103" name="Oval 102">
+            <a:extLst>
+              <a:ext uri="{FF2B5EF4-FFF2-40B4-BE49-F238E27FC236}">
+                <a16:creationId xmlns:a16="http://schemas.microsoft.com/office/drawing/2014/main" id="{D000C133-7003-8DB2-4FC0-1B41AED12236}"/>
+              </a:ext>
+            </a:extLst>
+          </p:cNvPr>
+          <p:cNvSpPr/>
+          <p:nvPr/>
+        </p:nvSpPr>
+        <p:spPr>
+          <a:xfrm>
+            <a:off x="6231716" y="5423197"/>
+            <a:ext cx="253435" cy="212902"/>
+          </a:xfrm>
+          <a:prstGeom prst="ellipse">
+            <a:avLst/>
+          </a:prstGeom>
+          <a:solidFill>
+            <a:schemeClr val="tx1"/>
+          </a:solidFill>
+          <a:ln>
+            <a:solidFill>
+              <a:schemeClr val="tx1"/>
+            </a:solidFill>
+          </a:ln>
+        </p:spPr>
+        <p:style>
+          <a:lnRef idx="2">
+            <a:schemeClr val="accent1">
+              <a:shade val="50000"/>
+            </a:schemeClr>
+          </a:lnRef>
+          <a:fillRef idx="1">
+            <a:schemeClr val="accent1"/>
+          </a:fillRef>
+          <a:effectRef idx="0">
+            <a:schemeClr val="accent1"/>
+          </a:effectRef>
+          <a:fontRef idx="minor">
+            <a:schemeClr val="lt1"/>
+          </a:fontRef>
+        </p:style>
+        <p:txBody>
+          <a:bodyPr lIns="0" tIns="0" rIns="0" bIns="0" rtlCol="0" anchor="ctr"/>
+          <a:lstStyle/>
+          <a:p>
+            <a:pPr algn="ctr"/>
+            <a:r>
+              <a:rPr lang="en-US" sz="800" dirty="0">
+                <a:latin typeface="Arial" panose="020B0604020202020204" pitchFamily="34" charset="0"/>
+                <a:cs typeface="Arial" panose="020B0604020202020204" pitchFamily="34" charset="0"/>
+              </a:rPr>
+              <a:t>3.8</a:t>
+            </a:r>
+          </a:p>
+        </p:txBody>
+      </p:sp>
+      <p:pic>
+        <p:nvPicPr>
+          <p:cNvPr id="36" name="Graphic 7">
+            <a:extLst>
+              <a:ext uri="{FF2B5EF4-FFF2-40B4-BE49-F238E27FC236}">
+                <a16:creationId xmlns:a16="http://schemas.microsoft.com/office/drawing/2014/main" id="{30F64005-F015-BF94-01DA-63D7C4A4406F}"/>
+              </a:ext>
+            </a:extLst>
+          </p:cNvPr>
+          <p:cNvPicPr>
+            <a:picLocks noChangeAspect="1" noChangeArrowheads="1"/>
+          </p:cNvPicPr>
+          <p:nvPr/>
+        </p:nvPicPr>
+        <p:blipFill>
+          <a:blip r:embed="rId22">
+            <a:extLst>
+              <a:ext uri="{28A0092B-C50C-407E-A947-70E740481C1C}">
+                <a14:useLocalDpi xmlns:a14="http://schemas.microsoft.com/office/drawing/2010/main" val="0"/>
+              </a:ext>
+            </a:extLst>
+          </a:blip>
+          <a:srcRect/>
+          <a:stretch>
+            <a:fillRect/>
+          </a:stretch>
+        </p:blipFill>
+        <p:spPr bwMode="auto">
+          <a:xfrm>
+            <a:off x="5561630" y="5519749"/>
+            <a:ext cx="450663" cy="450663"/>
+          </a:xfrm>
+          <a:prstGeom prst="rect">
+            <a:avLst/>
+          </a:prstGeom>
+          <a:noFill/>
+          <a:ln>
+            <a:noFill/>
+          </a:ln>
+          <a:extLst>
+            <a:ext uri="{909E8E84-426E-40DD-AFC4-6F175D3DCCD1}">
+              <a14:hiddenFill xmlns:a14="http://schemas.microsoft.com/office/drawing/2010/main">
+                <a:solidFill>
+                  <a:srgbClr val="FFFFFF"/>
+                </a:solidFill>
+              </a14:hiddenFill>
+            </a:ext>
+            <a:ext uri="{91240B29-F687-4F45-9708-019B960494DF}">
+              <a14:hiddenLine xmlns:a14="http://schemas.microsoft.com/office/drawing/2010/main" w="9525">
+                <a:solidFill>
+                  <a:srgbClr val="000000"/>
+                </a:solidFill>
+                <a:miter lim="800000"/>
+                <a:headEnd/>
+                <a:tailEnd/>
+              </a14:hiddenLine>
+            </a:ext>
+          </a:extLst>
+        </p:spPr>
+      </p:pic>
+      <p:sp>
+        <p:nvSpPr>
+          <p:cNvPr id="37" name="TextBox 36">
+            <a:extLst>
+              <a:ext uri="{FF2B5EF4-FFF2-40B4-BE49-F238E27FC236}">
+                <a16:creationId xmlns:a16="http://schemas.microsoft.com/office/drawing/2014/main" id="{77098F96-AD47-76CF-7896-FA55D5941344}"/>
+              </a:ext>
+            </a:extLst>
+          </p:cNvPr>
+          <p:cNvSpPr txBox="1"/>
+          <p:nvPr/>
+        </p:nvSpPr>
+        <p:spPr>
+          <a:xfrm>
+            <a:off x="5224040" y="5931857"/>
+            <a:ext cx="1115962" cy="430887"/>
+          </a:xfrm>
+          <a:prstGeom prst="rect">
+            <a:avLst/>
+          </a:prstGeom>
+          <a:noFill/>
+        </p:spPr>
+        <p:txBody>
+          <a:bodyPr wrap="square" rtlCol="0">
+            <a:spAutoFit/>
+          </a:bodyPr>
+          <a:lstStyle/>
+          <a:p>
+            <a:pPr algn="ctr"/>
+            <a:r>
+              <a:rPr lang="en-US" sz="1100" dirty="0">
+                <a:latin typeface="Arial" panose="020B0604020202020204" pitchFamily="34" charset="0"/>
+                <a:cs typeface="Arial" panose="020B0604020202020204" pitchFamily="34" charset="0"/>
+              </a:rPr>
+              <a:t>SNS KMS </a:t>
+            </a:r>
+          </a:p>
+          <a:p>
+            <a:pPr algn="ctr"/>
+            <a:r>
+              <a:rPr lang="en-US" sz="1100" dirty="0">
+                <a:latin typeface="Arial" panose="020B0604020202020204" pitchFamily="34" charset="0"/>
+                <a:cs typeface="Arial" panose="020B0604020202020204" pitchFamily="34" charset="0"/>
+              </a:rPr>
+              <a:t>Key</a:t>
+            </a:r>
+          </a:p>
+        </p:txBody>
+      </p:sp>
+      <p:sp>
+        <p:nvSpPr>
+          <p:cNvPr id="38" name="Oval 37">
+            <a:extLst>
+              <a:ext uri="{FF2B5EF4-FFF2-40B4-BE49-F238E27FC236}">
+                <a16:creationId xmlns:a16="http://schemas.microsoft.com/office/drawing/2014/main" id="{4D62BE70-7F79-0946-0611-005B207927B3}"/>
+              </a:ext>
+            </a:extLst>
+          </p:cNvPr>
+          <p:cNvSpPr/>
+          <p:nvPr/>
+        </p:nvSpPr>
+        <p:spPr>
+          <a:xfrm>
+            <a:off x="5453616" y="5446940"/>
+            <a:ext cx="253435" cy="212902"/>
+          </a:xfrm>
+          <a:prstGeom prst="ellipse">
+            <a:avLst/>
+          </a:prstGeom>
+          <a:solidFill>
+            <a:schemeClr val="tx1"/>
+          </a:solidFill>
+          <a:ln>
+            <a:solidFill>
+              <a:schemeClr val="tx1"/>
+            </a:solidFill>
+          </a:ln>
+        </p:spPr>
+        <p:style>
+          <a:lnRef idx="2">
+            <a:schemeClr val="accent1">
+              <a:shade val="50000"/>
+            </a:schemeClr>
+          </a:lnRef>
+          <a:fillRef idx="1">
+            <a:schemeClr val="accent1"/>
+          </a:fillRef>
+          <a:effectRef idx="0">
+            <a:schemeClr val="accent1"/>
+          </a:effectRef>
+          <a:fontRef idx="minor">
+            <a:schemeClr val="lt1"/>
+          </a:fontRef>
+        </p:style>
+        <p:txBody>
+          <a:bodyPr lIns="0" tIns="0" rIns="0" bIns="0" rtlCol="0" anchor="ctr"/>
+          <a:lstStyle/>
+          <a:p>
+            <a:pPr algn="ctr"/>
+            <a:r>
+              <a:rPr lang="en-US" sz="800" dirty="0">
+                <a:latin typeface="Arial" panose="020B0604020202020204" pitchFamily="34" charset="0"/>
+                <a:cs typeface="Arial" panose="020B0604020202020204" pitchFamily="34" charset="0"/>
+              </a:rPr>
+              <a:t>3.7</a:t>
+            </a:r>
+          </a:p>
+        </p:txBody>
+      </p:sp>
+      <p:pic>
+        <p:nvPicPr>
+          <p:cNvPr id="100" name="Graphic 99">
+            <a:extLst>
+              <a:ext uri="{FF2B5EF4-FFF2-40B4-BE49-F238E27FC236}">
+                <a16:creationId xmlns:a16="http://schemas.microsoft.com/office/drawing/2014/main" id="{09B9FC02-6DB1-64F6-F1FE-F7C189505576}"/>
+              </a:ext>
+            </a:extLst>
+          </p:cNvPr>
+          <p:cNvPicPr>
+            <a:picLocks noChangeAspect="1"/>
+          </p:cNvPicPr>
+          <p:nvPr/>
+        </p:nvPicPr>
+        <p:blipFill>
+          <a:blip r:embed="rId12">
+            <a:extLst>
+              <a:ext uri="{96DAC541-7B7A-43D3-8B79-37D633B846F1}">
+                <asvg:svgBlip xmlns:asvg="http://schemas.microsoft.com/office/drawing/2016/SVG/main" r:embed="rId13"/>
+              </a:ext>
+            </a:extLst>
+          </a:blip>
+          <a:stretch>
+            <a:fillRect/>
+          </a:stretch>
+        </p:blipFill>
+        <p:spPr>
+          <a:xfrm>
+            <a:off x="4430870" y="5093527"/>
+            <a:ext cx="442506" cy="391567"/>
+          </a:xfrm>
+          <a:prstGeom prst="rect">
+            <a:avLst/>
+          </a:prstGeom>
+          <a:effectLst>
+            <a:outerShdw blurRad="50800" dist="38100" dir="13500000" algn="br" rotWithShape="0">
+              <a:prstClr val="black">
+                <a:alpha val="40000"/>
+              </a:prstClr>
+            </a:outerShdw>
+          </a:effectLst>
+        </p:spPr>
+      </p:pic>
+      <p:sp>
+        <p:nvSpPr>
+          <p:cNvPr id="5" name="TextBox 4">
+            <a:extLst>
+              <a:ext uri="{FF2B5EF4-FFF2-40B4-BE49-F238E27FC236}">
+                <a16:creationId xmlns:a16="http://schemas.microsoft.com/office/drawing/2014/main" id="{F85898DF-FE06-B871-7520-928FCB7C3AD4}"/>
+              </a:ext>
+            </a:extLst>
+          </p:cNvPr>
+          <p:cNvSpPr txBox="1"/>
+          <p:nvPr/>
+        </p:nvSpPr>
+        <p:spPr>
+          <a:xfrm>
+            <a:off x="7763762" y="5093527"/>
+            <a:ext cx="1233913" cy="430887"/>
+          </a:xfrm>
+          <a:prstGeom prst="rect">
+            <a:avLst/>
+          </a:prstGeom>
+          <a:noFill/>
+        </p:spPr>
+        <p:txBody>
+          <a:bodyPr wrap="square" rtlCol="0">
+            <a:spAutoFit/>
+          </a:bodyPr>
+          <a:lstStyle/>
+          <a:p>
+            <a:pPr algn="ctr"/>
+            <a:r>
+              <a:rPr lang="en-US" sz="1100" dirty="0">
+                <a:latin typeface="Arial" panose="020B0604020202020204" pitchFamily="34" charset="0"/>
+                <a:cs typeface="Arial" panose="020B0604020202020204" pitchFamily="34" charset="0"/>
+              </a:rPr>
+              <a:t>AWS CloudFormation</a:t>
+            </a:r>
+          </a:p>
+        </p:txBody>
+      </p:sp>
+      <p:pic>
+        <p:nvPicPr>
+          <p:cNvPr id="7" name="Graphic 6">
+            <a:extLst>
+              <a:ext uri="{FF2B5EF4-FFF2-40B4-BE49-F238E27FC236}">
+                <a16:creationId xmlns:a16="http://schemas.microsoft.com/office/drawing/2014/main" id="{7F8E8395-F0FD-2459-8B0B-206B29F4EA4E}"/>
+              </a:ext>
+            </a:extLst>
+          </p:cNvPr>
+          <p:cNvPicPr>
+            <a:picLocks noChangeAspect="1"/>
+          </p:cNvPicPr>
+          <p:nvPr/>
+        </p:nvPicPr>
+        <p:blipFill>
+          <a:blip r:embed="rId14">
+            <a:extLst>
+              <a:ext uri="{96DAC541-7B7A-43D3-8B79-37D633B846F1}">
+                <asvg:svgBlip xmlns:asvg="http://schemas.microsoft.com/office/drawing/2016/SVG/main" r:embed="rId15"/>
+              </a:ext>
+            </a:extLst>
+          </a:blip>
+          <a:stretch>
+            <a:fillRect/>
+          </a:stretch>
+        </p:blipFill>
+        <p:spPr>
+          <a:xfrm>
+            <a:off x="8164129" y="4652127"/>
+            <a:ext cx="457200" cy="457200"/>
+          </a:xfrm>
+          <a:prstGeom prst="rect">
+            <a:avLst/>
+          </a:prstGeom>
+        </p:spPr>
+      </p:pic>
+      <p:sp>
+        <p:nvSpPr>
+          <p:cNvPr id="9" name="Oval 8">
+            <a:extLst>
+              <a:ext uri="{FF2B5EF4-FFF2-40B4-BE49-F238E27FC236}">
+                <a16:creationId xmlns:a16="http://schemas.microsoft.com/office/drawing/2014/main" id="{66B62D17-C47D-420A-1668-9AFCC0E27D99}"/>
+              </a:ext>
+            </a:extLst>
+          </p:cNvPr>
+          <p:cNvSpPr/>
+          <p:nvPr/>
+        </p:nvSpPr>
+        <p:spPr>
+          <a:xfrm>
+            <a:off x="8073114" y="4571038"/>
+            <a:ext cx="253435" cy="212902"/>
+          </a:xfrm>
+          <a:prstGeom prst="ellipse">
+            <a:avLst/>
+          </a:prstGeom>
+          <a:solidFill>
+            <a:schemeClr val="tx1"/>
+          </a:solidFill>
+          <a:ln>
+            <a:solidFill>
+              <a:schemeClr val="tx1"/>
+            </a:solidFill>
+          </a:ln>
+        </p:spPr>
+        <p:style>
+          <a:lnRef idx="2">
+            <a:schemeClr val="accent1">
+              <a:shade val="50000"/>
+            </a:schemeClr>
+          </a:lnRef>
+          <a:fillRef idx="1">
+            <a:schemeClr val="accent1"/>
+          </a:fillRef>
+          <a:effectRef idx="0">
+            <a:schemeClr val="accent1"/>
+          </a:effectRef>
+          <a:fontRef idx="minor">
+            <a:schemeClr val="lt1"/>
+          </a:fontRef>
+        </p:style>
+        <p:txBody>
+          <a:bodyPr lIns="0" tIns="0" rIns="0" bIns="0" rtlCol="0" anchor="ctr"/>
+          <a:lstStyle/>
+          <a:p>
+            <a:pPr algn="ctr"/>
+            <a:r>
+              <a:rPr lang="en-US" sz="800" dirty="0">
+                <a:latin typeface="Arial" panose="020B0604020202020204" pitchFamily="34" charset="0"/>
+                <a:cs typeface="Arial" panose="020B0604020202020204" pitchFamily="34" charset="0"/>
+              </a:rPr>
+              <a:t>4.1</a:t>
+            </a:r>
+          </a:p>
+        </p:txBody>
+      </p:sp>
+      <p:sp>
+        <p:nvSpPr>
+          <p:cNvPr id="22" name="TextBox 21">
+            <a:extLst>
+              <a:ext uri="{FF2B5EF4-FFF2-40B4-BE49-F238E27FC236}">
+                <a16:creationId xmlns:a16="http://schemas.microsoft.com/office/drawing/2014/main" id="{F30231AB-D545-2D74-B8FB-112A1A36655B}"/>
+              </a:ext>
+            </a:extLst>
+          </p:cNvPr>
+          <p:cNvSpPr txBox="1"/>
+          <p:nvPr/>
+        </p:nvSpPr>
+        <p:spPr>
+          <a:xfrm>
+            <a:off x="2895309" y="5055489"/>
+            <a:ext cx="1504214" cy="430887"/>
+          </a:xfrm>
+          <a:prstGeom prst="rect">
+            <a:avLst/>
+          </a:prstGeom>
+          <a:noFill/>
+        </p:spPr>
+        <p:txBody>
+          <a:bodyPr wrap="square" rtlCol="0">
+            <a:spAutoFit/>
+          </a:bodyPr>
+          <a:lstStyle/>
+          <a:p>
+            <a:pPr algn="ctr"/>
+            <a:r>
+              <a:rPr lang="en-US" sz="1100" dirty="0">
+                <a:latin typeface="Arial" panose="020B0604020202020204" pitchFamily="34" charset="0"/>
+                <a:cs typeface="Arial" panose="020B0604020202020204" pitchFamily="34" charset="0"/>
+              </a:rPr>
+              <a:t>Config </a:t>
+            </a:r>
+          </a:p>
+          <a:p>
+            <a:pPr algn="ctr"/>
+            <a:r>
+              <a:rPr lang="en-US" sz="1100" dirty="0">
+                <a:latin typeface="Arial" panose="020B0604020202020204" pitchFamily="34" charset="0"/>
+                <a:cs typeface="Arial" panose="020B0604020202020204" pitchFamily="34" charset="0"/>
+              </a:rPr>
+              <a:t>Aggregator</a:t>
+            </a:r>
+          </a:p>
+        </p:txBody>
+      </p:sp>
+      <p:pic>
+        <p:nvPicPr>
+          <p:cNvPr id="23" name="Graphic 8">
+            <a:extLst>
+              <a:ext uri="{FF2B5EF4-FFF2-40B4-BE49-F238E27FC236}">
+                <a16:creationId xmlns:a16="http://schemas.microsoft.com/office/drawing/2014/main" id="{0A4BB5EA-9044-18F9-82E4-ED3DE32C5ACC}"/>
+              </a:ext>
+            </a:extLst>
+          </p:cNvPr>
+          <p:cNvPicPr>
+            <a:picLocks noChangeAspect="1" noChangeArrowheads="1"/>
+          </p:cNvPicPr>
+          <p:nvPr/>
+        </p:nvPicPr>
+        <p:blipFill>
+          <a:blip r:embed="rId19">
+            <a:extLst>
+              <a:ext uri="{96DAC541-7B7A-43D3-8B79-37D633B846F1}">
+                <asvg:svgBlip xmlns:asvg="http://schemas.microsoft.com/office/drawing/2016/SVG/main" r:embed="rId20"/>
+              </a:ext>
+            </a:extLst>
+          </a:blip>
+          <a:srcRect/>
+          <a:stretch/>
+        </p:blipFill>
+        <p:spPr bwMode="auto">
+          <a:xfrm>
+            <a:off x="3399195" y="4604401"/>
+            <a:ext cx="447767" cy="447767"/>
+          </a:xfrm>
+          <a:prstGeom prst="rect">
+            <a:avLst/>
+          </a:prstGeom>
+          <a:noFill/>
+          <a:ln>
+            <a:noFill/>
+          </a:ln>
+          <a:extLst>
+            <a:ext uri="{909E8E84-426E-40DD-AFC4-6F175D3DCCD1}">
+              <a14:hiddenFill xmlns:a14="http://schemas.microsoft.com/office/drawing/2010/main">
+                <a:solidFill>
+                  <a:srgbClr val="FFFFFF"/>
+                </a:solidFill>
+              </a14:hiddenFill>
+            </a:ext>
+            <a:ext uri="{91240B29-F687-4F45-9708-019B960494DF}">
+              <a14:hiddenLine xmlns:a14="http://schemas.microsoft.com/office/drawing/2010/main" w="9525">
+                <a:solidFill>
+                  <a:srgbClr val="000000"/>
+                </a:solidFill>
+                <a:miter lim="800000"/>
+                <a:headEnd/>
+                <a:tailEnd/>
+              </a14:hiddenLine>
+            </a:ext>
+          </a:extLst>
+        </p:spPr>
+      </p:pic>
+      <p:sp>
+        <p:nvSpPr>
+          <p:cNvPr id="24" name="Oval 23">
+            <a:extLst>
+              <a:ext uri="{FF2B5EF4-FFF2-40B4-BE49-F238E27FC236}">
+                <a16:creationId xmlns:a16="http://schemas.microsoft.com/office/drawing/2014/main" id="{54086077-7F12-AE28-F3E7-F6B133B70894}"/>
+              </a:ext>
+            </a:extLst>
+          </p:cNvPr>
+          <p:cNvSpPr/>
+          <p:nvPr/>
+        </p:nvSpPr>
+        <p:spPr>
+          <a:xfrm>
+            <a:off x="3288724" y="4510776"/>
+            <a:ext cx="253435" cy="212902"/>
+          </a:xfrm>
+          <a:prstGeom prst="ellipse">
+            <a:avLst/>
+          </a:prstGeom>
+          <a:solidFill>
+            <a:schemeClr val="tx1"/>
+          </a:solidFill>
+          <a:ln>
+            <a:solidFill>
+              <a:schemeClr val="tx1"/>
+            </a:solidFill>
+          </a:ln>
+        </p:spPr>
+        <p:style>
+          <a:lnRef idx="2">
+            <a:schemeClr val="accent1">
+              <a:shade val="50000"/>
+            </a:schemeClr>
+          </a:lnRef>
+          <a:fillRef idx="1">
+            <a:schemeClr val="accent1"/>
+          </a:fillRef>
+          <a:effectRef idx="0">
+            <a:schemeClr val="accent1"/>
+          </a:effectRef>
+          <a:fontRef idx="minor">
+            <a:schemeClr val="lt1"/>
+          </a:fontRef>
+        </p:style>
+        <p:txBody>
+          <a:bodyPr lIns="0" tIns="0" rIns="0" bIns="0" rtlCol="0" anchor="ctr"/>
+          <a:lstStyle/>
+          <a:p>
+            <a:pPr algn="ctr"/>
+            <a:r>
+              <a:rPr lang="en-US" sz="800" dirty="0">
+                <a:latin typeface="Arial" panose="020B0604020202020204" pitchFamily="34" charset="0"/>
+                <a:cs typeface="Arial" panose="020B0604020202020204" pitchFamily="34" charset="0"/>
+              </a:rPr>
+              <a:t>3.3</a:t>
+            </a:r>
+          </a:p>
+        </p:txBody>
+      </p:sp>
+      <p:sp>
+        <p:nvSpPr>
+          <p:cNvPr id="60" name="TextBox 59">
+            <a:extLst>
+              <a:ext uri="{FF2B5EF4-FFF2-40B4-BE49-F238E27FC236}">
+                <a16:creationId xmlns:a16="http://schemas.microsoft.com/office/drawing/2014/main" id="{BE3129B1-31E0-8868-831C-1A56112DC9AE}"/>
+              </a:ext>
+            </a:extLst>
+          </p:cNvPr>
+          <p:cNvSpPr txBox="1"/>
+          <p:nvPr/>
+        </p:nvSpPr>
+        <p:spPr>
+          <a:xfrm>
+            <a:off x="1967400" y="3256130"/>
+            <a:ext cx="1103001" cy="430887"/>
+          </a:xfrm>
+          <a:prstGeom prst="rect">
+            <a:avLst/>
+          </a:prstGeom>
+          <a:noFill/>
+        </p:spPr>
+        <p:txBody>
+          <a:bodyPr wrap="square" rtlCol="0">
+            <a:spAutoFit/>
+          </a:bodyPr>
+          <a:lstStyle/>
+          <a:p>
+            <a:pPr algn="ctr"/>
+            <a:r>
+              <a:rPr lang="en-US" sz="1100" dirty="0">
+                <a:latin typeface="Arial" panose="020B0604020202020204" pitchFamily="34" charset="0"/>
+                <a:cs typeface="Arial" panose="020B0604020202020204" pitchFamily="34" charset="0"/>
+              </a:rPr>
+              <a:t>Configuration Role</a:t>
+            </a:r>
+          </a:p>
+        </p:txBody>
+      </p:sp>
+      <p:pic>
+        <p:nvPicPr>
+          <p:cNvPr id="61" name="Graphic 60">
+            <a:extLst>
+              <a:ext uri="{FF2B5EF4-FFF2-40B4-BE49-F238E27FC236}">
+                <a16:creationId xmlns:a16="http://schemas.microsoft.com/office/drawing/2014/main" id="{355BEDDA-F9C0-FCE2-AC94-510D21CA5215}"/>
+              </a:ext>
+            </a:extLst>
+          </p:cNvPr>
+          <p:cNvPicPr>
+            <a:picLocks noChangeAspect="1"/>
+          </p:cNvPicPr>
+          <p:nvPr/>
+        </p:nvPicPr>
+        <p:blipFill>
+          <a:blip r:embed="rId17">
+            <a:extLst>
+              <a:ext uri="{96DAC541-7B7A-43D3-8B79-37D633B846F1}">
+                <asvg:svgBlip xmlns:asvg="http://schemas.microsoft.com/office/drawing/2016/SVG/main" r:embed="rId18"/>
+              </a:ext>
+            </a:extLst>
+          </a:blip>
+          <a:stretch>
+            <a:fillRect/>
+          </a:stretch>
+        </p:blipFill>
+        <p:spPr>
+          <a:xfrm>
+            <a:off x="2288532" y="2888455"/>
+            <a:ext cx="469900" cy="469900"/>
+          </a:xfrm>
+          <a:prstGeom prst="rect">
+            <a:avLst/>
+          </a:prstGeom>
+        </p:spPr>
+      </p:pic>
+      <p:sp>
+        <p:nvSpPr>
+          <p:cNvPr id="62" name="Oval 61">
+            <a:extLst>
+              <a:ext uri="{FF2B5EF4-FFF2-40B4-BE49-F238E27FC236}">
+                <a16:creationId xmlns:a16="http://schemas.microsoft.com/office/drawing/2014/main" id="{84CC7098-DD0B-457D-8EC4-281A8CD36CB3}"/>
+              </a:ext>
+            </a:extLst>
+          </p:cNvPr>
+          <p:cNvSpPr/>
+          <p:nvPr/>
+        </p:nvSpPr>
+        <p:spPr>
+          <a:xfrm>
+            <a:off x="2155894" y="2854701"/>
+            <a:ext cx="253435" cy="212902"/>
+          </a:xfrm>
+          <a:prstGeom prst="ellipse">
+            <a:avLst/>
+          </a:prstGeom>
+          <a:solidFill>
+            <a:schemeClr val="tx1"/>
+          </a:solidFill>
+          <a:ln>
+            <a:solidFill>
+              <a:schemeClr val="tx1"/>
+            </a:solidFill>
+          </a:ln>
+        </p:spPr>
+        <p:style>
+          <a:lnRef idx="2">
+            <a:schemeClr val="accent1">
+              <a:shade val="50000"/>
+            </a:schemeClr>
+          </a:lnRef>
+          <a:fillRef idx="1">
+            <a:schemeClr val="accent1"/>
+          </a:fillRef>
+          <a:effectRef idx="0">
+            <a:schemeClr val="accent1"/>
+          </a:effectRef>
+          <a:fontRef idx="minor">
+            <a:schemeClr val="lt1"/>
+          </a:fontRef>
+        </p:style>
+        <p:txBody>
+          <a:bodyPr lIns="0" tIns="0" rIns="0" bIns="0" rtlCol="0" anchor="ctr"/>
+          <a:lstStyle/>
+          <a:p>
+            <a:pPr algn="ctr"/>
+            <a:r>
+              <a:rPr lang="en-US" sz="800" dirty="0">
+                <a:latin typeface="Arial" panose="020B0604020202020204" pitchFamily="34" charset="0"/>
+                <a:cs typeface="Arial" panose="020B0604020202020204" pitchFamily="34" charset="0"/>
+              </a:rPr>
+              <a:t>1.3</a:t>
+            </a:r>
+          </a:p>
+        </p:txBody>
+      </p:sp>
+      <p:cxnSp>
+        <p:nvCxnSpPr>
+          <p:cNvPr id="65" name="Straight Arrow Connector 64">
+            <a:extLst>
+              <a:ext uri="{FF2B5EF4-FFF2-40B4-BE49-F238E27FC236}">
+                <a16:creationId xmlns:a16="http://schemas.microsoft.com/office/drawing/2014/main" id="{7AE7F20E-2158-846B-17A3-5960D872E911}"/>
+              </a:ext>
+            </a:extLst>
+          </p:cNvPr>
+          <p:cNvCxnSpPr>
+            <a:cxnSpLocks/>
+          </p:cNvCxnSpPr>
+          <p:nvPr/>
+        </p:nvCxnSpPr>
+        <p:spPr>
+          <a:xfrm>
+            <a:off x="4515940" y="1228077"/>
+            <a:ext cx="463335" cy="0"/>
+          </a:xfrm>
+          <a:prstGeom prst="straightConnector1">
+            <a:avLst/>
+          </a:prstGeom>
+          <a:ln>
+            <a:tailEnd type="triangle"/>
+          </a:ln>
+        </p:spPr>
+        <p:style>
+          <a:lnRef idx="1">
+            <a:schemeClr val="dk1"/>
+          </a:lnRef>
+          <a:fillRef idx="0">
+            <a:schemeClr val="dk1"/>
+          </a:fillRef>
+          <a:effectRef idx="0">
+            <a:schemeClr val="dk1"/>
+          </a:effectRef>
+          <a:fontRef idx="minor">
+            <a:schemeClr val="tx1"/>
+          </a:fontRef>
+        </p:style>
+      </p:cxnSp>
+      <p:sp>
+        <p:nvSpPr>
+          <p:cNvPr id="71" name="Oval 70">
+            <a:extLst>
+              <a:ext uri="{FF2B5EF4-FFF2-40B4-BE49-F238E27FC236}">
+                <a16:creationId xmlns:a16="http://schemas.microsoft.com/office/drawing/2014/main" id="{02D355C9-C25E-60AC-3C12-F876AF4A19B8}"/>
+              </a:ext>
+            </a:extLst>
+          </p:cNvPr>
+          <p:cNvSpPr/>
+          <p:nvPr/>
+        </p:nvSpPr>
+        <p:spPr>
+          <a:xfrm>
+            <a:off x="8846931" y="2408332"/>
+            <a:ext cx="253435" cy="212902"/>
+          </a:xfrm>
+          <a:prstGeom prst="ellipse">
+            <a:avLst/>
+          </a:prstGeom>
+          <a:solidFill>
+            <a:schemeClr val="tx1"/>
+          </a:solidFill>
+          <a:ln>
+            <a:solidFill>
+              <a:schemeClr val="tx1"/>
+            </a:solidFill>
+          </a:ln>
+        </p:spPr>
+        <p:style>
+          <a:lnRef idx="2">
+            <a:schemeClr val="accent1">
+              <a:shade val="50000"/>
+            </a:schemeClr>
+          </a:lnRef>
+          <a:fillRef idx="1">
+            <a:schemeClr val="accent1"/>
+          </a:fillRef>
+          <a:effectRef idx="0">
+            <a:schemeClr val="accent1"/>
+          </a:effectRef>
+          <a:fontRef idx="minor">
+            <a:schemeClr val="lt1"/>
+          </a:fontRef>
+        </p:style>
+        <p:txBody>
+          <a:bodyPr lIns="0" tIns="0" rIns="0" bIns="0" rtlCol="0" anchor="ctr"/>
+          <a:lstStyle/>
+          <a:p>
+            <a:pPr algn="ctr"/>
+            <a:r>
+              <a:rPr lang="en-US" sz="800" dirty="0">
+                <a:latin typeface="Arial" panose="020B0604020202020204" pitchFamily="34" charset="0"/>
+                <a:cs typeface="Arial" panose="020B0604020202020204" pitchFamily="34" charset="0"/>
+              </a:rPr>
+              <a:t>2.3</a:t>
+            </a:r>
+          </a:p>
+        </p:txBody>
+      </p:sp>
+      <p:pic>
+        <p:nvPicPr>
+          <p:cNvPr id="72" name="Graphic 71">
+            <a:extLst>
+              <a:ext uri="{FF2B5EF4-FFF2-40B4-BE49-F238E27FC236}">
+                <a16:creationId xmlns:a16="http://schemas.microsoft.com/office/drawing/2014/main" id="{A2FCFDE6-8EA4-CF02-29A8-8562827C873E}"/>
+              </a:ext>
+            </a:extLst>
+          </p:cNvPr>
+          <p:cNvPicPr>
+            <a:picLocks noChangeAspect="1"/>
+          </p:cNvPicPr>
+          <p:nvPr/>
+        </p:nvPicPr>
+        <p:blipFill>
+          <a:blip r:embed="rId5">
+            <a:extLst>
+              <a:ext uri="{96DAC541-7B7A-43D3-8B79-37D633B846F1}">
+                <asvg:svgBlip xmlns:asvg="http://schemas.microsoft.com/office/drawing/2016/SVG/main" r:embed="rId6"/>
+              </a:ext>
+            </a:extLst>
+          </a:blip>
+          <a:stretch>
+            <a:fillRect/>
+          </a:stretch>
+        </p:blipFill>
+        <p:spPr>
+          <a:xfrm>
+            <a:off x="654509" y="3883421"/>
+            <a:ext cx="424469" cy="424469"/>
+          </a:xfrm>
+          <a:prstGeom prst="rect">
+            <a:avLst/>
+          </a:prstGeom>
+        </p:spPr>
+      </p:pic>
+      <p:pic>
+        <p:nvPicPr>
+          <p:cNvPr id="3" name="Graphic 17">
+            <a:extLst>
+              <a:ext uri="{FF2B5EF4-FFF2-40B4-BE49-F238E27FC236}">
+                <a16:creationId xmlns:a16="http://schemas.microsoft.com/office/drawing/2014/main" id="{EA99C0AD-E82C-DA26-BCE0-1783D9BFD0CC}"/>
+              </a:ext>
+            </a:extLst>
+          </p:cNvPr>
+          <p:cNvPicPr>
+            <a:picLocks noChangeAspect="1" noChangeArrowheads="1"/>
+          </p:cNvPicPr>
+          <p:nvPr/>
+        </p:nvPicPr>
+        <p:blipFill>
+          <a:blip r:embed="rId9">
+            <a:extLst>
+              <a:ext uri="{28A0092B-C50C-407E-A947-70E740481C1C}">
+                <a14:useLocalDpi xmlns:a14="http://schemas.microsoft.com/office/drawing/2010/main" val="0"/>
+              </a:ext>
+            </a:extLst>
+          </a:blip>
+          <a:srcRect/>
+          <a:stretch>
+            <a:fillRect/>
+          </a:stretch>
+        </p:blipFill>
+        <p:spPr bwMode="auto">
+          <a:xfrm>
+            <a:off x="2978487" y="1012264"/>
+            <a:ext cx="457200" cy="457200"/>
+          </a:xfrm>
+          <a:prstGeom prst="rect">
+            <a:avLst/>
+          </a:prstGeom>
+          <a:noFill/>
+          <a:ln>
+            <a:noFill/>
+          </a:ln>
+          <a:extLst>
+            <a:ext uri="{909E8E84-426E-40DD-AFC4-6F175D3DCCD1}">
+              <a14:hiddenFill xmlns:a14="http://schemas.microsoft.com/office/drawing/2010/main">
+                <a:solidFill>
+                  <a:srgbClr val="FFFFFF"/>
+                </a:solidFill>
+              </a14:hiddenFill>
+            </a:ext>
+            <a:ext uri="{91240B29-F687-4F45-9708-019B960494DF}">
+              <a14:hiddenLine xmlns:a14="http://schemas.microsoft.com/office/drawing/2010/main" w="9525">
+                <a:solidFill>
+                  <a:srgbClr val="000000"/>
+                </a:solidFill>
+                <a:miter lim="800000"/>
+                <a:headEnd/>
+                <a:tailEnd/>
+              </a14:hiddenLine>
+            </a:ext>
+          </a:extLst>
+        </p:spPr>
+      </p:pic>
+      <p:sp>
+        <p:nvSpPr>
+          <p:cNvPr id="46" name="TextBox 2">
+            <a:extLst>
+              <a:ext uri="{FF2B5EF4-FFF2-40B4-BE49-F238E27FC236}">
+                <a16:creationId xmlns:a16="http://schemas.microsoft.com/office/drawing/2014/main" id="{115D1AF1-970E-549A-00C1-EE2CB6012B61}"/>
+              </a:ext>
+            </a:extLst>
+          </p:cNvPr>
+          <p:cNvSpPr txBox="1"/>
+          <p:nvPr/>
+        </p:nvSpPr>
+        <p:spPr>
+          <a:xfrm>
+            <a:off x="2768168" y="1397431"/>
+            <a:ext cx="917042" cy="261610"/>
           </a:xfrm>
           <a:prstGeom prst="rect">
             <a:avLst/>
@@ -9267,17 +10781,59 @@
                 <a:latin typeface="Arial" panose="020B0604020202020204" pitchFamily="34" charset="0"/>
                 <a:cs typeface="Arial" panose="020B0604020202020204" pitchFamily="34" charset="0"/>
               </a:rPr>
-              <a:t>Config Topic</a:t>
-            </a:r>
-          </a:p>
-        </p:txBody>
-      </p:sp>
-      <p:sp>
-        <p:nvSpPr>
-          <p:cNvPr id="28" name="Oval 27">
-            <a:extLst>
-              <a:ext uri="{FF2B5EF4-FFF2-40B4-BE49-F238E27FC236}">
-                <a16:creationId xmlns:a16="http://schemas.microsoft.com/office/drawing/2014/main" id="{3E03BD11-1DE0-10C6-6FB8-EDAC2E6F682E}"/>
+              <a:t>SNS Topic</a:t>
+            </a:r>
+          </a:p>
+        </p:txBody>
+      </p:sp>
+      <p:cxnSp>
+        <p:nvCxnSpPr>
+          <p:cNvPr id="47" name="Straight Arrow Connector 46">
+            <a:extLst>
+              <a:ext uri="{FF2B5EF4-FFF2-40B4-BE49-F238E27FC236}">
+                <a16:creationId xmlns:a16="http://schemas.microsoft.com/office/drawing/2014/main" id="{5C88D182-910C-8DF9-F27B-11D76BE5AB6B}"/>
+              </a:ext>
+            </a:extLst>
+          </p:cNvPr>
+          <p:cNvCxnSpPr>
+            <a:cxnSpLocks/>
+          </p:cNvCxnSpPr>
+          <p:nvPr/>
+        </p:nvCxnSpPr>
+        <p:spPr>
+          <a:xfrm>
+            <a:off x="3589230" y="1609783"/>
+            <a:ext cx="331112" cy="210076"/>
+          </a:xfrm>
+          <a:prstGeom prst="straightConnector1">
+            <a:avLst/>
+          </a:prstGeom>
+          <a:ln>
+            <a:headEnd type="triangle"/>
+            <a:tailEnd type="triangle"/>
+          </a:ln>
+        </p:spPr>
+        <p:style>
+          <a:lnRef idx="1">
+            <a:schemeClr val="dk1"/>
+          </a:lnRef>
+          <a:fillRef idx="0">
+            <a:schemeClr val="dk1"/>
+          </a:fillRef>
+          <a:effectRef idx="0">
+            <a:schemeClr val="dk1"/>
+          </a:effectRef>
+          <a:fontRef idx="minor">
+            <a:schemeClr val="tx1"/>
+          </a:fontRef>
+        </p:style>
+      </p:cxnSp>
+      <p:sp>
+        <p:nvSpPr>
+          <p:cNvPr id="48" name="Oval 47">
+            <a:extLst>
+              <a:ext uri="{FF2B5EF4-FFF2-40B4-BE49-F238E27FC236}">
+                <a16:creationId xmlns:a16="http://schemas.microsoft.com/office/drawing/2014/main" id="{A1797B0A-C041-ABE9-13B6-14E89A674BE1}"/>
               </a:ext>
             </a:extLst>
           </p:cNvPr>
@@ -9286,7 +10842,7 @@
         </p:nvSpPr>
         <p:spPr>
           <a:xfrm>
-            <a:off x="2595986" y="4547283"/>
+            <a:off x="2871707" y="973468"/>
             <a:ext cx="253435" cy="212902"/>
           </a:xfrm>
           <a:prstGeom prst="ellipse">
@@ -9327,162 +10883,17 @@
                 <a:latin typeface="Arial" panose="020B0604020202020204" pitchFamily="34" charset="0"/>
                 <a:cs typeface="Arial" panose="020B0604020202020204" pitchFamily="34" charset="0"/>
               </a:rPr>
-              <a:t>3.2</a:t>
-            </a:r>
-          </a:p>
-        </p:txBody>
-      </p:sp>
-      <p:sp>
-        <p:nvSpPr>
-          <p:cNvPr id="29" name="TextBox 28">
-            <a:extLst>
-              <a:ext uri="{FF2B5EF4-FFF2-40B4-BE49-F238E27FC236}">
-                <a16:creationId xmlns:a16="http://schemas.microsoft.com/office/drawing/2014/main" id="{F441BD57-985B-3F49-99C3-BF3B9E891322}"/>
-              </a:ext>
-            </a:extLst>
-          </p:cNvPr>
-          <p:cNvSpPr txBox="1"/>
-          <p:nvPr/>
-        </p:nvSpPr>
-        <p:spPr>
-          <a:xfrm>
-            <a:off x="2202298" y="5975148"/>
-            <a:ext cx="1405120" cy="430887"/>
-          </a:xfrm>
-          <a:prstGeom prst="rect">
-            <a:avLst/>
-          </a:prstGeom>
-          <a:noFill/>
-        </p:spPr>
-        <p:txBody>
-          <a:bodyPr wrap="square" rtlCol="0">
-            <a:spAutoFit/>
-          </a:bodyPr>
-          <a:lstStyle/>
-          <a:p>
-            <a:pPr algn="ctr"/>
-            <a:r>
-              <a:rPr lang="en-US" sz="1100" dirty="0">
-                <a:latin typeface="Arial" panose="020B0604020202020204" pitchFamily="34" charset="0"/>
-                <a:cs typeface="Arial" panose="020B0604020202020204" pitchFamily="34" charset="0"/>
-              </a:rPr>
-              <a:t>Config </a:t>
-            </a:r>
-          </a:p>
-          <a:p>
-            <a:pPr algn="ctr"/>
-            <a:r>
-              <a:rPr lang="en-US" sz="1100" dirty="0">
-                <a:latin typeface="Arial" panose="020B0604020202020204" pitchFamily="34" charset="0"/>
-                <a:cs typeface="Arial" panose="020B0604020202020204" pitchFamily="34" charset="0"/>
-              </a:rPr>
-              <a:t>Aggregator Role</a:t>
+              <a:t>1.6</a:t>
             </a:r>
           </a:p>
         </p:txBody>
       </p:sp>
       <p:pic>
         <p:nvPicPr>
-          <p:cNvPr id="30" name="Graphic 29">
-            <a:extLst>
-              <a:ext uri="{FF2B5EF4-FFF2-40B4-BE49-F238E27FC236}">
-                <a16:creationId xmlns:a16="http://schemas.microsoft.com/office/drawing/2014/main" id="{EC7991A4-D5C4-088B-091C-5C2EC8F034B9}"/>
-              </a:ext>
-            </a:extLst>
-          </p:cNvPr>
-          <p:cNvPicPr>
-            <a:picLocks noChangeAspect="1"/>
-          </p:cNvPicPr>
-          <p:nvPr/>
-        </p:nvPicPr>
-        <p:blipFill>
-          <a:blip r:embed="rId17">
-            <a:extLst>
-              <a:ext uri="{96DAC541-7B7A-43D3-8B79-37D633B846F1}">
-                <asvg:svgBlip xmlns:asvg="http://schemas.microsoft.com/office/drawing/2016/SVG/main" r:embed="rId18"/>
-              </a:ext>
-            </a:extLst>
-          </a:blip>
-          <a:stretch>
-            <a:fillRect/>
-          </a:stretch>
-        </p:blipFill>
-        <p:spPr>
-          <a:xfrm>
-            <a:off x="2649809" y="5665384"/>
-            <a:ext cx="469900" cy="469900"/>
-          </a:xfrm>
-          <a:prstGeom prst="rect">
-            <a:avLst/>
-          </a:prstGeom>
-        </p:spPr>
-      </p:pic>
-      <p:sp>
-        <p:nvSpPr>
-          <p:cNvPr id="31" name="Oval 30">
-            <a:extLst>
-              <a:ext uri="{FF2B5EF4-FFF2-40B4-BE49-F238E27FC236}">
-                <a16:creationId xmlns:a16="http://schemas.microsoft.com/office/drawing/2014/main" id="{71712401-EE44-D9B6-6171-3CB782CF2E00}"/>
-              </a:ext>
-            </a:extLst>
-          </p:cNvPr>
-          <p:cNvSpPr/>
-          <p:nvPr/>
-        </p:nvSpPr>
-        <p:spPr>
-          <a:xfrm>
-            <a:off x="2587881" y="5543327"/>
-            <a:ext cx="253435" cy="212902"/>
-          </a:xfrm>
-          <a:prstGeom prst="ellipse">
-            <a:avLst/>
-          </a:prstGeom>
-          <a:solidFill>
-            <a:schemeClr val="tx1"/>
-          </a:solidFill>
-          <a:ln>
-            <a:solidFill>
-              <a:schemeClr val="tx1"/>
-            </a:solidFill>
-          </a:ln>
-        </p:spPr>
-        <p:style>
-          <a:lnRef idx="2">
-            <a:schemeClr val="accent1">
-              <a:shade val="50000"/>
-            </a:schemeClr>
-          </a:lnRef>
-          <a:fillRef idx="1">
-            <a:schemeClr val="accent1"/>
-          </a:fillRef>
-          <a:effectRef idx="0">
-            <a:schemeClr val="accent1"/>
-          </a:effectRef>
-          <a:fontRef idx="minor">
-            <a:schemeClr val="lt1"/>
-          </a:fontRef>
-        </p:style>
-        <p:txBody>
-          <a:bodyPr lIns="0" tIns="0" rIns="0" bIns="0" rtlCol="0" anchor="ctr"/>
-          <a:lstStyle/>
-          <a:p>
-            <a:pPr algn="ctr"/>
-            <a:r>
-              <a:rPr lang="en-US" sz="800" dirty="0">
-                <a:latin typeface="Arial" panose="020B0604020202020204" pitchFamily="34" charset="0"/>
-                <a:cs typeface="Arial" panose="020B0604020202020204" pitchFamily="34" charset="0"/>
-              </a:rPr>
-              <a:t>3.5</a:t>
-            </a:r>
-          </a:p>
-        </p:txBody>
-      </p:sp>
-      <p:pic>
-        <p:nvPicPr>
-          <p:cNvPr id="32" name="Graphic 7">
-            <a:extLst>
-              <a:ext uri="{FF2B5EF4-FFF2-40B4-BE49-F238E27FC236}">
-                <a16:creationId xmlns:a16="http://schemas.microsoft.com/office/drawing/2014/main" id="{285D0C81-7FE5-E018-1499-16DDA2CA65A1}"/>
+          <p:cNvPr id="26" name="Graphic 17">
+            <a:extLst>
+              <a:ext uri="{FF2B5EF4-FFF2-40B4-BE49-F238E27FC236}">
+                <a16:creationId xmlns:a16="http://schemas.microsoft.com/office/drawing/2014/main" id="{7564EB38-E6C9-BEA3-06C8-2CA7A178281D}"/>
               </a:ext>
             </a:extLst>
           </p:cNvPr>
@@ -9492,7 +10903,7 @@
           <p:nvPr/>
         </p:nvPicPr>
         <p:blipFill>
-          <a:blip r:embed="rId22">
+          <a:blip r:embed="rId9">
             <a:extLst>
               <a:ext uri="{28A0092B-C50C-407E-A947-70E740481C1C}">
                 <a14:useLocalDpi xmlns:a14="http://schemas.microsoft.com/office/drawing/2010/main" val="0"/>
@@ -9506,8 +10917,8 @@
         </p:blipFill>
         <p:spPr bwMode="auto">
           <a:xfrm>
-            <a:off x="3898444" y="4623896"/>
-            <a:ext cx="398722" cy="398722"/>
+            <a:off x="4746191" y="5486401"/>
+            <a:ext cx="457200" cy="457200"/>
           </a:xfrm>
           <a:prstGeom prst="rect">
             <a:avLst/>
@@ -9539,10 +10950,10 @@
       </p:pic>
       <p:sp>
         <p:nvSpPr>
-          <p:cNvPr id="40" name="TextBox 39">
-            <a:extLst>
-              <a:ext uri="{FF2B5EF4-FFF2-40B4-BE49-F238E27FC236}">
-                <a16:creationId xmlns:a16="http://schemas.microsoft.com/office/drawing/2014/main" id="{9036CCF1-19D8-E915-FD29-2D54271D0B79}"/>
+          <p:cNvPr id="27" name="TextBox 2">
+            <a:extLst>
+              <a:ext uri="{FF2B5EF4-FFF2-40B4-BE49-F238E27FC236}">
+                <a16:creationId xmlns:a16="http://schemas.microsoft.com/office/drawing/2014/main" id="{869D045B-78C3-F872-E3CD-EF106730F8EF}"/>
               </a:ext>
             </a:extLst>
           </p:cNvPr>
@@ -9551,19 +10962,95 @@
         </p:nvSpPr>
         <p:spPr>
           <a:xfrm>
-            <a:off x="3554370" y="5068023"/>
-            <a:ext cx="1115962" cy="430887"/>
+            <a:off x="4317615" y="5910967"/>
+            <a:ext cx="1273984" cy="261610"/>
           </a:xfrm>
           <a:prstGeom prst="rect">
             <a:avLst/>
           </a:prstGeom>
           <a:noFill/>
         </p:spPr>
+        <p:style>
+          <a:lnRef idx="0">
+            <a:scrgbClr r="0" g="0" b="0"/>
+          </a:lnRef>
+          <a:fillRef idx="0">
+            <a:scrgbClr r="0" g="0" b="0"/>
+          </a:fillRef>
+          <a:effectRef idx="0">
+            <a:scrgbClr r="0" g="0" b="0"/>
+          </a:effectRef>
+          <a:fontRef idx="major"/>
+        </p:style>
         <p:txBody>
           <a:bodyPr wrap="square" rtlCol="0">
             <a:spAutoFit/>
           </a:bodyPr>
-          <a:lstStyle/>
+          <a:lstStyle>
+            <a:lvl1pPr>
+              <a:defRPr>
+                <a:latin typeface="+mj-lt"/>
+                <a:ea typeface="+mj-ea"/>
+                <a:cs typeface="+mj-cs"/>
+              </a:defRPr>
+            </a:lvl1pPr>
+            <a:lvl2pPr>
+              <a:defRPr>
+                <a:latin typeface="+mj-lt"/>
+                <a:ea typeface="+mj-ea"/>
+                <a:cs typeface="+mj-cs"/>
+              </a:defRPr>
+            </a:lvl2pPr>
+            <a:lvl3pPr>
+              <a:defRPr>
+                <a:latin typeface="+mj-lt"/>
+                <a:ea typeface="+mj-ea"/>
+                <a:cs typeface="+mj-cs"/>
+              </a:defRPr>
+            </a:lvl3pPr>
+            <a:lvl4pPr>
+              <a:defRPr>
+                <a:latin typeface="+mj-lt"/>
+                <a:ea typeface="+mj-ea"/>
+                <a:cs typeface="+mj-cs"/>
+              </a:defRPr>
+            </a:lvl4pPr>
+            <a:lvl5pPr>
+              <a:defRPr>
+                <a:latin typeface="+mj-lt"/>
+                <a:ea typeface="+mj-ea"/>
+                <a:cs typeface="+mj-cs"/>
+              </a:defRPr>
+            </a:lvl5pPr>
+            <a:lvl6pPr>
+              <a:defRPr>
+                <a:latin typeface="+mj-lt"/>
+                <a:ea typeface="+mj-ea"/>
+                <a:cs typeface="+mj-cs"/>
+              </a:defRPr>
+            </a:lvl6pPr>
+            <a:lvl7pPr>
+              <a:defRPr>
+                <a:latin typeface="+mj-lt"/>
+                <a:ea typeface="+mj-ea"/>
+                <a:cs typeface="+mj-cs"/>
+              </a:defRPr>
+            </a:lvl7pPr>
+            <a:lvl8pPr>
+              <a:defRPr>
+                <a:latin typeface="+mj-lt"/>
+                <a:ea typeface="+mj-ea"/>
+                <a:cs typeface="+mj-cs"/>
+              </a:defRPr>
+            </a:lvl8pPr>
+            <a:lvl9pPr>
+              <a:defRPr>
+                <a:latin typeface="+mj-lt"/>
+                <a:ea typeface="+mj-ea"/>
+                <a:cs typeface="+mj-cs"/>
+              </a:defRPr>
+            </a:lvl9pPr>
+          </a:lstStyle>
           <a:p>
             <a:pPr algn="ctr"/>
             <a:r>
@@ -9571,17 +11058,17 @@
                 <a:latin typeface="Arial" panose="020B0604020202020204" pitchFamily="34" charset="0"/>
                 <a:cs typeface="Arial" panose="020B0604020202020204" pitchFamily="34" charset="0"/>
               </a:rPr>
-              <a:t>Delivery KMS Key</a:t>
-            </a:r>
-          </a:p>
-        </p:txBody>
-      </p:sp>
-      <p:sp>
-        <p:nvSpPr>
-          <p:cNvPr id="43" name="Oval 42">
-            <a:extLst>
-              <a:ext uri="{FF2B5EF4-FFF2-40B4-BE49-F238E27FC236}">
-                <a16:creationId xmlns:a16="http://schemas.microsoft.com/office/drawing/2014/main" id="{53D48C63-48F3-8838-3DEE-58DA4DA1F93F}"/>
+              <a:t>Config Topic</a:t>
+            </a:r>
+          </a:p>
+        </p:txBody>
+      </p:sp>
+      <p:sp>
+        <p:nvSpPr>
+          <p:cNvPr id="28" name="Oval 27">
+            <a:extLst>
+              <a:ext uri="{FF2B5EF4-FFF2-40B4-BE49-F238E27FC236}">
+                <a16:creationId xmlns:a16="http://schemas.microsoft.com/office/drawing/2014/main" id="{3E03BD11-1DE0-10C6-6FB8-EDAC2E6F682E}"/>
               </a:ext>
             </a:extLst>
           </p:cNvPr>
@@ -9590,7 +11077,7 @@
         </p:nvSpPr>
         <p:spPr>
           <a:xfrm>
-            <a:off x="3764777" y="4541201"/>
+            <a:off x="4629128" y="5422861"/>
             <a:ext cx="253435" cy="212902"/>
           </a:xfrm>
           <a:prstGeom prst="ellipse">
@@ -9631,1221 +11118,11 @@
                 <a:latin typeface="Arial" panose="020B0604020202020204" pitchFamily="34" charset="0"/>
                 <a:cs typeface="Arial" panose="020B0604020202020204" pitchFamily="34" charset="0"/>
               </a:rPr>
-              <a:t>3.3</a:t>
-            </a:r>
-          </a:p>
-        </p:txBody>
-      </p:sp>
-      <p:sp>
-        <p:nvSpPr>
-          <p:cNvPr id="44" name="TextBox 43">
-            <a:extLst>
-              <a:ext uri="{FF2B5EF4-FFF2-40B4-BE49-F238E27FC236}">
-                <a16:creationId xmlns:a16="http://schemas.microsoft.com/office/drawing/2014/main" id="{EFAE6A75-3526-ABBF-1A4A-28677634242C}"/>
-              </a:ext>
-            </a:extLst>
-          </p:cNvPr>
-          <p:cNvSpPr txBox="1"/>
-          <p:nvPr/>
-        </p:nvSpPr>
-        <p:spPr>
-          <a:xfrm>
-            <a:off x="8633467" y="2875526"/>
-            <a:ext cx="1103001" cy="430887"/>
-          </a:xfrm>
-          <a:prstGeom prst="rect">
-            <a:avLst/>
-          </a:prstGeom>
-          <a:noFill/>
-        </p:spPr>
-        <p:txBody>
-          <a:bodyPr wrap="square" rtlCol="0">
-            <a:spAutoFit/>
-          </a:bodyPr>
-          <a:lstStyle/>
-          <a:p>
-            <a:pPr algn="ctr"/>
-            <a:r>
-              <a:rPr lang="en-US" sz="1100" dirty="0">
-                <a:latin typeface="Arial" panose="020B0604020202020204" pitchFamily="34" charset="0"/>
-                <a:cs typeface="Arial" panose="020B0604020202020204" pitchFamily="34" charset="0"/>
-              </a:rPr>
-              <a:t>Configuration Role</a:t>
-            </a:r>
-          </a:p>
-        </p:txBody>
-      </p:sp>
-      <p:pic>
-        <p:nvPicPr>
-          <p:cNvPr id="45" name="Graphic 44">
-            <a:extLst>
-              <a:ext uri="{FF2B5EF4-FFF2-40B4-BE49-F238E27FC236}">
-                <a16:creationId xmlns:a16="http://schemas.microsoft.com/office/drawing/2014/main" id="{C28EE8F8-227B-0272-04A5-504C1E35E717}"/>
-              </a:ext>
-            </a:extLst>
-          </p:cNvPr>
-          <p:cNvPicPr>
-            <a:picLocks noChangeAspect="1"/>
-          </p:cNvPicPr>
-          <p:nvPr/>
-        </p:nvPicPr>
-        <p:blipFill>
-          <a:blip r:embed="rId17">
-            <a:extLst>
-              <a:ext uri="{96DAC541-7B7A-43D3-8B79-37D633B846F1}">
-                <asvg:svgBlip xmlns:asvg="http://schemas.microsoft.com/office/drawing/2016/SVG/main" r:embed="rId18"/>
-              </a:ext>
-            </a:extLst>
-          </a:blip>
-          <a:stretch>
-            <a:fillRect/>
-          </a:stretch>
-        </p:blipFill>
-        <p:spPr>
-          <a:xfrm>
-            <a:off x="8915394" y="2519662"/>
-            <a:ext cx="469900" cy="469900"/>
-          </a:xfrm>
-          <a:prstGeom prst="rect">
-            <a:avLst/>
-          </a:prstGeom>
-        </p:spPr>
-      </p:pic>
-      <p:sp>
-        <p:nvSpPr>
-          <p:cNvPr id="170" name="Oval 169">
-            <a:extLst>
-              <a:ext uri="{FF2B5EF4-FFF2-40B4-BE49-F238E27FC236}">
-                <a16:creationId xmlns:a16="http://schemas.microsoft.com/office/drawing/2014/main" id="{97797EDC-C96B-4205-9EA5-4896D4E19CC8}"/>
-              </a:ext>
-            </a:extLst>
-          </p:cNvPr>
-          <p:cNvSpPr/>
-          <p:nvPr/>
-        </p:nvSpPr>
-        <p:spPr>
-          <a:xfrm>
-            <a:off x="2851114" y="1843129"/>
-            <a:ext cx="253435" cy="212902"/>
-          </a:xfrm>
-          <a:prstGeom prst="ellipse">
-            <a:avLst/>
-          </a:prstGeom>
-          <a:solidFill>
-            <a:schemeClr val="tx1"/>
-          </a:solidFill>
-          <a:ln>
-            <a:solidFill>
-              <a:schemeClr val="tx1"/>
-            </a:solidFill>
-          </a:ln>
-        </p:spPr>
-        <p:style>
-          <a:lnRef idx="2">
-            <a:schemeClr val="accent1">
-              <a:shade val="50000"/>
-            </a:schemeClr>
-          </a:lnRef>
-          <a:fillRef idx="1">
-            <a:schemeClr val="accent1"/>
-          </a:fillRef>
-          <a:effectRef idx="0">
-            <a:schemeClr val="accent1"/>
-          </a:effectRef>
-          <a:fontRef idx="minor">
-            <a:schemeClr val="lt1"/>
-          </a:fontRef>
-        </p:style>
-        <p:txBody>
-          <a:bodyPr lIns="0" tIns="0" rIns="0" bIns="0" rtlCol="0" anchor="ctr"/>
-          <a:lstStyle/>
-          <a:p>
-            <a:pPr algn="ctr"/>
-            <a:r>
-              <a:rPr lang="en-US" sz="800" dirty="0">
-                <a:latin typeface="Arial" panose="020B0604020202020204" pitchFamily="34" charset="0"/>
-                <a:cs typeface="Arial" panose="020B0604020202020204" pitchFamily="34" charset="0"/>
-              </a:rPr>
-              <a:t>1.8</a:t>
-            </a:r>
-          </a:p>
-        </p:txBody>
-      </p:sp>
-      <p:pic>
-        <p:nvPicPr>
-          <p:cNvPr id="2" name="Graphic 1">
-            <a:extLst>
-              <a:ext uri="{FF2B5EF4-FFF2-40B4-BE49-F238E27FC236}">
-                <a16:creationId xmlns:a16="http://schemas.microsoft.com/office/drawing/2014/main" id="{A85F3AAE-E32D-A9FD-BF13-A31E332CC209}"/>
-              </a:ext>
-            </a:extLst>
-          </p:cNvPr>
-          <p:cNvPicPr>
-            <a:picLocks noChangeAspect="1"/>
-          </p:cNvPicPr>
-          <p:nvPr/>
-        </p:nvPicPr>
-        <p:blipFill>
-          <a:blip r:embed="rId12">
-            <a:extLst>
-              <a:ext uri="{96DAC541-7B7A-43D3-8B79-37D633B846F1}">
-                <asvg:svgBlip xmlns:asvg="http://schemas.microsoft.com/office/drawing/2016/SVG/main" r:embed="rId13"/>
-              </a:ext>
-            </a:extLst>
-          </a:blip>
-          <a:stretch>
-            <a:fillRect/>
-          </a:stretch>
-        </p:blipFill>
-        <p:spPr>
-          <a:xfrm>
-            <a:off x="4807674" y="4786924"/>
-            <a:ext cx="442506" cy="391567"/>
-          </a:xfrm>
-          <a:prstGeom prst="rect">
-            <a:avLst/>
-          </a:prstGeom>
-          <a:effectLst>
-            <a:outerShdw blurRad="50800" dist="38100" dir="13500000" algn="br" rotWithShape="0">
-              <a:prstClr val="black">
-                <a:alpha val="40000"/>
-              </a:prstClr>
-            </a:outerShdw>
-          </a:effectLst>
-        </p:spPr>
-      </p:pic>
-      <p:sp>
-        <p:nvSpPr>
-          <p:cNvPr id="99" name="Rectangle 98">
-            <a:extLst>
-              <a:ext uri="{FF2B5EF4-FFF2-40B4-BE49-F238E27FC236}">
-                <a16:creationId xmlns:a16="http://schemas.microsoft.com/office/drawing/2014/main" id="{C03B0D71-46A9-CAB8-23CA-03441DD94C5D}"/>
-              </a:ext>
-            </a:extLst>
-          </p:cNvPr>
-          <p:cNvSpPr/>
-          <p:nvPr/>
-        </p:nvSpPr>
-        <p:spPr>
-          <a:xfrm>
-            <a:off x="4940408" y="5097937"/>
-            <a:ext cx="1945375" cy="1211596"/>
-          </a:xfrm>
-          <a:prstGeom prst="rect">
-            <a:avLst/>
-          </a:prstGeom>
-          <a:solidFill>
-            <a:schemeClr val="bg1"/>
-          </a:solidFill>
-          <a:ln w="12700">
-            <a:solidFill>
-              <a:srgbClr val="5B9CD5"/>
-            </a:solidFill>
-            <a:prstDash val="sysDash"/>
-          </a:ln>
-          <a:effectLst>
-            <a:outerShdw blurRad="50800" dist="38100" dir="13500000" algn="br" rotWithShape="0">
-              <a:prstClr val="black">
-                <a:alpha val="40000"/>
-              </a:prstClr>
-            </a:outerShdw>
-          </a:effectLst>
-        </p:spPr>
-        <p:style>
-          <a:lnRef idx="2">
-            <a:schemeClr val="accent1">
-              <a:shade val="50000"/>
-            </a:schemeClr>
-          </a:lnRef>
-          <a:fillRef idx="1">
-            <a:schemeClr val="accent1"/>
-          </a:fillRef>
-          <a:effectRef idx="0">
-            <a:schemeClr val="accent1"/>
-          </a:effectRef>
-          <a:fontRef idx="minor">
-            <a:schemeClr val="lt1"/>
-          </a:fontRef>
-        </p:style>
-        <p:txBody>
-          <a:bodyPr lIns="502920" tIns="91440"/>
-          <a:lstStyle/>
-          <a:p>
-            <a:pPr eaLnBrk="1" fontAlgn="auto" hangingPunct="1">
-              <a:spcBef>
-                <a:spcPts val="0"/>
-              </a:spcBef>
-              <a:spcAft>
-                <a:spcPts val="0"/>
-              </a:spcAft>
-              <a:defRPr/>
-            </a:pPr>
-            <a:r>
-              <a:rPr lang="en-US" sz="1200" dirty="0">
-                <a:solidFill>
-                  <a:srgbClr val="5B9CD5"/>
-                </a:solidFill>
-                <a:latin typeface="Arial" panose="020B0604020202020204" pitchFamily="34" charset="0"/>
-                <a:cs typeface="Arial" panose="020B0604020202020204" pitchFamily="34" charset="0"/>
-              </a:rPr>
-              <a:t>Region n</a:t>
-            </a:r>
-          </a:p>
-        </p:txBody>
-      </p:sp>
-      <p:sp>
-        <p:nvSpPr>
-          <p:cNvPr id="101" name="TextBox 100">
-            <a:extLst>
-              <a:ext uri="{FF2B5EF4-FFF2-40B4-BE49-F238E27FC236}">
-                <a16:creationId xmlns:a16="http://schemas.microsoft.com/office/drawing/2014/main" id="{A74ADE8E-4897-0A9C-D8A6-B3A0F7DEDAFF}"/>
-              </a:ext>
-            </a:extLst>
-          </p:cNvPr>
-          <p:cNvSpPr txBox="1"/>
-          <p:nvPr/>
-        </p:nvSpPr>
-        <p:spPr>
-          <a:xfrm>
-            <a:off x="5719603" y="5878646"/>
-            <a:ext cx="1504214" cy="430887"/>
-          </a:xfrm>
-          <a:prstGeom prst="rect">
-            <a:avLst/>
-          </a:prstGeom>
-          <a:noFill/>
-        </p:spPr>
-        <p:txBody>
-          <a:bodyPr wrap="square" rtlCol="0">
-            <a:spAutoFit/>
-          </a:bodyPr>
-          <a:lstStyle/>
-          <a:p>
-            <a:pPr algn="ctr"/>
-            <a:r>
-              <a:rPr lang="en-US" sz="1100" dirty="0">
-                <a:latin typeface="Arial" panose="020B0604020202020204" pitchFamily="34" charset="0"/>
-                <a:cs typeface="Arial" panose="020B0604020202020204" pitchFamily="34" charset="0"/>
-              </a:rPr>
-              <a:t>AWS </a:t>
-            </a:r>
-          </a:p>
-          <a:p>
-            <a:pPr algn="ctr"/>
-            <a:r>
-              <a:rPr lang="en-US" sz="1100" dirty="0">
-                <a:latin typeface="Arial" panose="020B0604020202020204" pitchFamily="34" charset="0"/>
-                <a:cs typeface="Arial" panose="020B0604020202020204" pitchFamily="34" charset="0"/>
-              </a:rPr>
-              <a:t>Config </a:t>
-            </a:r>
-          </a:p>
-        </p:txBody>
-      </p:sp>
-      <p:pic>
-        <p:nvPicPr>
-          <p:cNvPr id="25" name="Graphic 8">
-            <a:extLst>
-              <a:ext uri="{FF2B5EF4-FFF2-40B4-BE49-F238E27FC236}">
-                <a16:creationId xmlns:a16="http://schemas.microsoft.com/office/drawing/2014/main" id="{B3A940F9-11E8-BBC7-D543-93975E21C63D}"/>
-              </a:ext>
-            </a:extLst>
-          </p:cNvPr>
-          <p:cNvPicPr>
-            <a:picLocks noChangeAspect="1" noChangeArrowheads="1"/>
-          </p:cNvPicPr>
-          <p:nvPr/>
-        </p:nvPicPr>
-        <p:blipFill>
-          <a:blip r:embed="rId19">
-            <a:extLst>
-              <a:ext uri="{96DAC541-7B7A-43D3-8B79-37D633B846F1}">
-                <asvg:svgBlip xmlns:asvg="http://schemas.microsoft.com/office/drawing/2016/SVG/main" r:embed="rId20"/>
-              </a:ext>
-            </a:extLst>
-          </a:blip>
-          <a:srcRect/>
-          <a:stretch/>
-        </p:blipFill>
-        <p:spPr bwMode="auto">
-          <a:xfrm>
-            <a:off x="6231555" y="5475607"/>
-            <a:ext cx="458847" cy="458847"/>
-          </a:xfrm>
-          <a:prstGeom prst="rect">
-            <a:avLst/>
-          </a:prstGeom>
-          <a:noFill/>
-          <a:ln>
-            <a:noFill/>
-          </a:ln>
-          <a:extLst>
-            <a:ext uri="{909E8E84-426E-40DD-AFC4-6F175D3DCCD1}">
-              <a14:hiddenFill xmlns:a14="http://schemas.microsoft.com/office/drawing/2010/main">
-                <a:solidFill>
-                  <a:srgbClr val="FFFFFF"/>
-                </a:solidFill>
-              </a14:hiddenFill>
-            </a:ext>
-            <a:ext uri="{91240B29-F687-4F45-9708-019B960494DF}">
-              <a14:hiddenLine xmlns:a14="http://schemas.microsoft.com/office/drawing/2010/main" w="9525">
-                <a:solidFill>
-                  <a:srgbClr val="000000"/>
-                </a:solidFill>
-                <a:miter lim="800000"/>
-                <a:headEnd/>
-                <a:tailEnd/>
-              </a14:hiddenLine>
-            </a:ext>
-          </a:extLst>
-        </p:spPr>
-      </p:pic>
-      <p:sp>
-        <p:nvSpPr>
-          <p:cNvPr id="103" name="Oval 102">
-            <a:extLst>
-              <a:ext uri="{FF2B5EF4-FFF2-40B4-BE49-F238E27FC236}">
-                <a16:creationId xmlns:a16="http://schemas.microsoft.com/office/drawing/2014/main" id="{D000C133-7003-8DB2-4FC0-1B41AED12236}"/>
-              </a:ext>
-            </a:extLst>
-          </p:cNvPr>
-          <p:cNvSpPr/>
-          <p:nvPr/>
-        </p:nvSpPr>
-        <p:spPr>
-          <a:xfrm>
-            <a:off x="6101827" y="5387239"/>
-            <a:ext cx="253435" cy="212902"/>
-          </a:xfrm>
-          <a:prstGeom prst="ellipse">
-            <a:avLst/>
-          </a:prstGeom>
-          <a:solidFill>
-            <a:schemeClr val="tx1"/>
-          </a:solidFill>
-          <a:ln>
-            <a:solidFill>
-              <a:schemeClr val="tx1"/>
-            </a:solidFill>
-          </a:ln>
-        </p:spPr>
-        <p:style>
-          <a:lnRef idx="2">
-            <a:schemeClr val="accent1">
-              <a:shade val="50000"/>
-            </a:schemeClr>
-          </a:lnRef>
-          <a:fillRef idx="1">
-            <a:schemeClr val="accent1"/>
-          </a:fillRef>
-          <a:effectRef idx="0">
-            <a:schemeClr val="accent1"/>
-          </a:effectRef>
-          <a:fontRef idx="minor">
-            <a:schemeClr val="lt1"/>
-          </a:fontRef>
-        </p:style>
-        <p:txBody>
-          <a:bodyPr lIns="0" tIns="0" rIns="0" bIns="0" rtlCol="0" anchor="ctr"/>
-          <a:lstStyle/>
-          <a:p>
-            <a:pPr algn="ctr"/>
-            <a:r>
-              <a:rPr lang="en-US" sz="800" dirty="0">
-                <a:latin typeface="Arial" panose="020B0604020202020204" pitchFamily="34" charset="0"/>
-                <a:cs typeface="Arial" panose="020B0604020202020204" pitchFamily="34" charset="0"/>
-              </a:rPr>
-              <a:t>3.8</a:t>
-            </a:r>
-          </a:p>
-        </p:txBody>
-      </p:sp>
-      <p:pic>
-        <p:nvPicPr>
-          <p:cNvPr id="36" name="Graphic 7">
-            <a:extLst>
-              <a:ext uri="{FF2B5EF4-FFF2-40B4-BE49-F238E27FC236}">
-                <a16:creationId xmlns:a16="http://schemas.microsoft.com/office/drawing/2014/main" id="{30F64005-F015-BF94-01DA-63D7C4A4406F}"/>
-              </a:ext>
-            </a:extLst>
-          </p:cNvPr>
-          <p:cNvPicPr>
-            <a:picLocks noChangeAspect="1" noChangeArrowheads="1"/>
-          </p:cNvPicPr>
-          <p:nvPr/>
-        </p:nvPicPr>
-        <p:blipFill>
-          <a:blip r:embed="rId22">
-            <a:extLst>
-              <a:ext uri="{28A0092B-C50C-407E-A947-70E740481C1C}">
-                <a14:useLocalDpi xmlns:a14="http://schemas.microsoft.com/office/drawing/2010/main" val="0"/>
-              </a:ext>
-            </a:extLst>
-          </a:blip>
-          <a:srcRect/>
-          <a:stretch>
-            <a:fillRect/>
-          </a:stretch>
-        </p:blipFill>
-        <p:spPr bwMode="auto">
-          <a:xfrm>
-            <a:off x="5499212" y="5466538"/>
-            <a:ext cx="450663" cy="450663"/>
-          </a:xfrm>
-          <a:prstGeom prst="rect">
-            <a:avLst/>
-          </a:prstGeom>
-          <a:noFill/>
-          <a:ln>
-            <a:noFill/>
-          </a:ln>
-          <a:extLst>
-            <a:ext uri="{909E8E84-426E-40DD-AFC4-6F175D3DCCD1}">
-              <a14:hiddenFill xmlns:a14="http://schemas.microsoft.com/office/drawing/2010/main">
-                <a:solidFill>
-                  <a:srgbClr val="FFFFFF"/>
-                </a:solidFill>
-              </a14:hiddenFill>
-            </a:ext>
-            <a:ext uri="{91240B29-F687-4F45-9708-019B960494DF}">
-              <a14:hiddenLine xmlns:a14="http://schemas.microsoft.com/office/drawing/2010/main" w="9525">
-                <a:solidFill>
-                  <a:srgbClr val="000000"/>
-                </a:solidFill>
-                <a:miter lim="800000"/>
-                <a:headEnd/>
-                <a:tailEnd/>
-              </a14:hiddenLine>
-            </a:ext>
-          </a:extLst>
-        </p:spPr>
-      </p:pic>
-      <p:sp>
-        <p:nvSpPr>
-          <p:cNvPr id="37" name="TextBox 36">
-            <a:extLst>
-              <a:ext uri="{FF2B5EF4-FFF2-40B4-BE49-F238E27FC236}">
-                <a16:creationId xmlns:a16="http://schemas.microsoft.com/office/drawing/2014/main" id="{77098F96-AD47-76CF-7896-FA55D5941344}"/>
-              </a:ext>
-            </a:extLst>
-          </p:cNvPr>
-          <p:cNvSpPr txBox="1"/>
-          <p:nvPr/>
-        </p:nvSpPr>
-        <p:spPr>
-          <a:xfrm>
-            <a:off x="5161622" y="5878646"/>
-            <a:ext cx="1115962" cy="430887"/>
-          </a:xfrm>
-          <a:prstGeom prst="rect">
-            <a:avLst/>
-          </a:prstGeom>
-          <a:noFill/>
-        </p:spPr>
-        <p:txBody>
-          <a:bodyPr wrap="square" rtlCol="0">
-            <a:spAutoFit/>
-          </a:bodyPr>
-          <a:lstStyle/>
-          <a:p>
-            <a:pPr algn="ctr"/>
-            <a:r>
-              <a:rPr lang="en-US" sz="1100" dirty="0">
-                <a:latin typeface="Arial" panose="020B0604020202020204" pitchFamily="34" charset="0"/>
-                <a:cs typeface="Arial" panose="020B0604020202020204" pitchFamily="34" charset="0"/>
-              </a:rPr>
-              <a:t>SNS KMS </a:t>
-            </a:r>
-          </a:p>
-          <a:p>
-            <a:pPr algn="ctr"/>
-            <a:r>
-              <a:rPr lang="en-US" sz="1100" dirty="0">
-                <a:latin typeface="Arial" panose="020B0604020202020204" pitchFamily="34" charset="0"/>
-                <a:cs typeface="Arial" panose="020B0604020202020204" pitchFamily="34" charset="0"/>
-              </a:rPr>
-              <a:t>Key</a:t>
-            </a:r>
-          </a:p>
-        </p:txBody>
-      </p:sp>
-      <p:sp>
-        <p:nvSpPr>
-          <p:cNvPr id="38" name="Oval 37">
-            <a:extLst>
-              <a:ext uri="{FF2B5EF4-FFF2-40B4-BE49-F238E27FC236}">
-                <a16:creationId xmlns:a16="http://schemas.microsoft.com/office/drawing/2014/main" id="{4D62BE70-7F79-0946-0611-005B207927B3}"/>
-              </a:ext>
-            </a:extLst>
-          </p:cNvPr>
-          <p:cNvSpPr/>
-          <p:nvPr/>
-        </p:nvSpPr>
-        <p:spPr>
-          <a:xfrm>
-            <a:off x="5391198" y="5393729"/>
-            <a:ext cx="253435" cy="212902"/>
-          </a:xfrm>
-          <a:prstGeom prst="ellipse">
-            <a:avLst/>
-          </a:prstGeom>
-          <a:solidFill>
-            <a:schemeClr val="tx1"/>
-          </a:solidFill>
-          <a:ln>
-            <a:solidFill>
-              <a:schemeClr val="tx1"/>
-            </a:solidFill>
-          </a:ln>
-        </p:spPr>
-        <p:style>
-          <a:lnRef idx="2">
-            <a:schemeClr val="accent1">
-              <a:shade val="50000"/>
-            </a:schemeClr>
-          </a:lnRef>
-          <a:fillRef idx="1">
-            <a:schemeClr val="accent1"/>
-          </a:fillRef>
-          <a:effectRef idx="0">
-            <a:schemeClr val="accent1"/>
-          </a:effectRef>
-          <a:fontRef idx="minor">
-            <a:schemeClr val="lt1"/>
-          </a:fontRef>
-        </p:style>
-        <p:txBody>
-          <a:bodyPr lIns="0" tIns="0" rIns="0" bIns="0" rtlCol="0" anchor="ctr"/>
-          <a:lstStyle/>
-          <a:p>
-            <a:pPr algn="ctr"/>
-            <a:r>
-              <a:rPr lang="en-US" sz="800" dirty="0">
-                <a:latin typeface="Arial" panose="020B0604020202020204" pitchFamily="34" charset="0"/>
-                <a:cs typeface="Arial" panose="020B0604020202020204" pitchFamily="34" charset="0"/>
-              </a:rPr>
-              <a:t>3.7</a:t>
-            </a:r>
-          </a:p>
-        </p:txBody>
-      </p:sp>
-      <p:pic>
-        <p:nvPicPr>
-          <p:cNvPr id="100" name="Graphic 99">
-            <a:extLst>
-              <a:ext uri="{FF2B5EF4-FFF2-40B4-BE49-F238E27FC236}">
-                <a16:creationId xmlns:a16="http://schemas.microsoft.com/office/drawing/2014/main" id="{09B9FC02-6DB1-64F6-F1FE-F7C189505576}"/>
-              </a:ext>
-            </a:extLst>
-          </p:cNvPr>
-          <p:cNvPicPr>
-            <a:picLocks noChangeAspect="1"/>
-          </p:cNvPicPr>
-          <p:nvPr/>
-        </p:nvPicPr>
-        <p:blipFill>
-          <a:blip r:embed="rId12">
-            <a:extLst>
-              <a:ext uri="{96DAC541-7B7A-43D3-8B79-37D633B846F1}">
-                <asvg:svgBlip xmlns:asvg="http://schemas.microsoft.com/office/drawing/2016/SVG/main" r:embed="rId13"/>
-              </a:ext>
-            </a:extLst>
-          </a:blip>
-          <a:stretch>
-            <a:fillRect/>
-          </a:stretch>
-        </p:blipFill>
-        <p:spPr>
-          <a:xfrm>
-            <a:off x="4926856" y="5093527"/>
-            <a:ext cx="442506" cy="391567"/>
-          </a:xfrm>
-          <a:prstGeom prst="rect">
-            <a:avLst/>
-          </a:prstGeom>
-          <a:effectLst>
-            <a:outerShdw blurRad="50800" dist="38100" dir="13500000" algn="br" rotWithShape="0">
-              <a:prstClr val="black">
-                <a:alpha val="40000"/>
-              </a:prstClr>
-            </a:outerShdw>
-          </a:effectLst>
-        </p:spPr>
-      </p:pic>
-      <p:sp>
-        <p:nvSpPr>
-          <p:cNvPr id="5" name="TextBox 4">
-            <a:extLst>
-              <a:ext uri="{FF2B5EF4-FFF2-40B4-BE49-F238E27FC236}">
-                <a16:creationId xmlns:a16="http://schemas.microsoft.com/office/drawing/2014/main" id="{F85898DF-FE06-B871-7520-928FCB7C3AD4}"/>
-              </a:ext>
-            </a:extLst>
-          </p:cNvPr>
-          <p:cNvSpPr txBox="1"/>
-          <p:nvPr/>
-        </p:nvSpPr>
-        <p:spPr>
-          <a:xfrm>
-            <a:off x="7763762" y="5093527"/>
-            <a:ext cx="1233913" cy="430887"/>
-          </a:xfrm>
-          <a:prstGeom prst="rect">
-            <a:avLst/>
-          </a:prstGeom>
-          <a:noFill/>
-        </p:spPr>
-        <p:txBody>
-          <a:bodyPr wrap="square" rtlCol="0">
-            <a:spAutoFit/>
-          </a:bodyPr>
-          <a:lstStyle/>
-          <a:p>
-            <a:pPr algn="ctr"/>
-            <a:r>
-              <a:rPr lang="en-US" sz="1100" dirty="0">
-                <a:latin typeface="Arial" panose="020B0604020202020204" pitchFamily="34" charset="0"/>
-                <a:cs typeface="Arial" panose="020B0604020202020204" pitchFamily="34" charset="0"/>
-              </a:rPr>
-              <a:t>AWS CloudFormation</a:t>
-            </a:r>
-          </a:p>
-        </p:txBody>
-      </p:sp>
-      <p:pic>
-        <p:nvPicPr>
-          <p:cNvPr id="7" name="Graphic 6">
-            <a:extLst>
-              <a:ext uri="{FF2B5EF4-FFF2-40B4-BE49-F238E27FC236}">
-                <a16:creationId xmlns:a16="http://schemas.microsoft.com/office/drawing/2014/main" id="{7F8E8395-F0FD-2459-8B0B-206B29F4EA4E}"/>
-              </a:ext>
-            </a:extLst>
-          </p:cNvPr>
-          <p:cNvPicPr>
-            <a:picLocks noChangeAspect="1"/>
-          </p:cNvPicPr>
-          <p:nvPr/>
-        </p:nvPicPr>
-        <p:blipFill>
-          <a:blip r:embed="rId14">
-            <a:extLst>
-              <a:ext uri="{96DAC541-7B7A-43D3-8B79-37D633B846F1}">
-                <asvg:svgBlip xmlns:asvg="http://schemas.microsoft.com/office/drawing/2016/SVG/main" r:embed="rId15"/>
-              </a:ext>
-            </a:extLst>
-          </a:blip>
-          <a:stretch>
-            <a:fillRect/>
-          </a:stretch>
-        </p:blipFill>
-        <p:spPr>
-          <a:xfrm>
-            <a:off x="8164129" y="4652127"/>
-            <a:ext cx="457200" cy="457200"/>
-          </a:xfrm>
-          <a:prstGeom prst="rect">
-            <a:avLst/>
-          </a:prstGeom>
-        </p:spPr>
-      </p:pic>
-      <p:sp>
-        <p:nvSpPr>
-          <p:cNvPr id="9" name="Oval 8">
-            <a:extLst>
-              <a:ext uri="{FF2B5EF4-FFF2-40B4-BE49-F238E27FC236}">
-                <a16:creationId xmlns:a16="http://schemas.microsoft.com/office/drawing/2014/main" id="{66B62D17-C47D-420A-1668-9AFCC0E27D99}"/>
-              </a:ext>
-            </a:extLst>
-          </p:cNvPr>
-          <p:cNvSpPr/>
-          <p:nvPr/>
-        </p:nvSpPr>
-        <p:spPr>
-          <a:xfrm>
-            <a:off x="8073114" y="4571038"/>
-            <a:ext cx="253435" cy="212902"/>
-          </a:xfrm>
-          <a:prstGeom prst="ellipse">
-            <a:avLst/>
-          </a:prstGeom>
-          <a:solidFill>
-            <a:schemeClr val="tx1"/>
-          </a:solidFill>
-          <a:ln>
-            <a:solidFill>
-              <a:schemeClr val="tx1"/>
-            </a:solidFill>
-          </a:ln>
-        </p:spPr>
-        <p:style>
-          <a:lnRef idx="2">
-            <a:schemeClr val="accent1">
-              <a:shade val="50000"/>
-            </a:schemeClr>
-          </a:lnRef>
-          <a:fillRef idx="1">
-            <a:schemeClr val="accent1"/>
-          </a:fillRef>
-          <a:effectRef idx="0">
-            <a:schemeClr val="accent1"/>
-          </a:effectRef>
-          <a:fontRef idx="minor">
-            <a:schemeClr val="lt1"/>
-          </a:fontRef>
-        </p:style>
-        <p:txBody>
-          <a:bodyPr lIns="0" tIns="0" rIns="0" bIns="0" rtlCol="0" anchor="ctr"/>
-          <a:lstStyle/>
-          <a:p>
-            <a:pPr algn="ctr"/>
-            <a:r>
-              <a:rPr lang="en-US" sz="800" dirty="0">
-                <a:latin typeface="Arial" panose="020B0604020202020204" pitchFamily="34" charset="0"/>
-                <a:cs typeface="Arial" panose="020B0604020202020204" pitchFamily="34" charset="0"/>
-              </a:rPr>
-              <a:t>4.1</a:t>
-            </a:r>
-          </a:p>
-        </p:txBody>
-      </p:sp>
-      <p:sp>
-        <p:nvSpPr>
-          <p:cNvPr id="22" name="TextBox 21">
-            <a:extLst>
-              <a:ext uri="{FF2B5EF4-FFF2-40B4-BE49-F238E27FC236}">
-                <a16:creationId xmlns:a16="http://schemas.microsoft.com/office/drawing/2014/main" id="{F30231AB-D545-2D74-B8FB-112A1A36655B}"/>
-              </a:ext>
-            </a:extLst>
-          </p:cNvPr>
-          <p:cNvSpPr txBox="1"/>
-          <p:nvPr/>
-        </p:nvSpPr>
-        <p:spPr>
-          <a:xfrm>
-            <a:off x="3372692" y="5977879"/>
-            <a:ext cx="1504214" cy="430887"/>
-          </a:xfrm>
-          <a:prstGeom prst="rect">
-            <a:avLst/>
-          </a:prstGeom>
-          <a:noFill/>
-        </p:spPr>
-        <p:txBody>
-          <a:bodyPr wrap="square" rtlCol="0">
-            <a:spAutoFit/>
-          </a:bodyPr>
-          <a:lstStyle/>
-          <a:p>
-            <a:pPr algn="ctr"/>
-            <a:r>
-              <a:rPr lang="en-US" sz="1100" dirty="0">
-                <a:latin typeface="Arial" panose="020B0604020202020204" pitchFamily="34" charset="0"/>
-                <a:cs typeface="Arial" panose="020B0604020202020204" pitchFamily="34" charset="0"/>
-              </a:rPr>
-              <a:t>Config </a:t>
-            </a:r>
-          </a:p>
-          <a:p>
-            <a:pPr algn="ctr"/>
-            <a:r>
-              <a:rPr lang="en-US" sz="1100" dirty="0">
-                <a:latin typeface="Arial" panose="020B0604020202020204" pitchFamily="34" charset="0"/>
-                <a:cs typeface="Arial" panose="020B0604020202020204" pitchFamily="34" charset="0"/>
-              </a:rPr>
-              <a:t>Aggregator</a:t>
-            </a:r>
-          </a:p>
-        </p:txBody>
-      </p:sp>
-      <p:pic>
-        <p:nvPicPr>
-          <p:cNvPr id="23" name="Graphic 8">
-            <a:extLst>
-              <a:ext uri="{FF2B5EF4-FFF2-40B4-BE49-F238E27FC236}">
-                <a16:creationId xmlns:a16="http://schemas.microsoft.com/office/drawing/2014/main" id="{0A4BB5EA-9044-18F9-82E4-ED3DE32C5ACC}"/>
-              </a:ext>
-            </a:extLst>
-          </p:cNvPr>
-          <p:cNvPicPr>
-            <a:picLocks noChangeAspect="1" noChangeArrowheads="1"/>
-          </p:cNvPicPr>
-          <p:nvPr/>
-        </p:nvPicPr>
-        <p:blipFill>
-          <a:blip r:embed="rId19">
-            <a:extLst>
-              <a:ext uri="{96DAC541-7B7A-43D3-8B79-37D633B846F1}">
-                <asvg:svgBlip xmlns:asvg="http://schemas.microsoft.com/office/drawing/2016/SVG/main" r:embed="rId20"/>
-              </a:ext>
-            </a:extLst>
-          </a:blip>
-          <a:srcRect/>
-          <a:stretch/>
-        </p:blipFill>
-        <p:spPr bwMode="auto">
-          <a:xfrm>
-            <a:off x="3924332" y="5617829"/>
-            <a:ext cx="408383" cy="408383"/>
-          </a:xfrm>
-          <a:prstGeom prst="rect">
-            <a:avLst/>
-          </a:prstGeom>
-          <a:noFill/>
-          <a:ln>
-            <a:noFill/>
-          </a:ln>
-          <a:extLst>
-            <a:ext uri="{909E8E84-426E-40DD-AFC4-6F175D3DCCD1}">
-              <a14:hiddenFill xmlns:a14="http://schemas.microsoft.com/office/drawing/2010/main">
-                <a:solidFill>
-                  <a:srgbClr val="FFFFFF"/>
-                </a:solidFill>
-              </a14:hiddenFill>
-            </a:ext>
-            <a:ext uri="{91240B29-F687-4F45-9708-019B960494DF}">
-              <a14:hiddenLine xmlns:a14="http://schemas.microsoft.com/office/drawing/2010/main" w="9525">
-                <a:solidFill>
-                  <a:srgbClr val="000000"/>
-                </a:solidFill>
-                <a:miter lim="800000"/>
-                <a:headEnd/>
-                <a:tailEnd/>
-              </a14:hiddenLine>
-            </a:ext>
-          </a:extLst>
-        </p:spPr>
-      </p:pic>
-      <p:sp>
-        <p:nvSpPr>
-          <p:cNvPr id="24" name="Oval 23">
-            <a:extLst>
-              <a:ext uri="{FF2B5EF4-FFF2-40B4-BE49-F238E27FC236}">
-                <a16:creationId xmlns:a16="http://schemas.microsoft.com/office/drawing/2014/main" id="{54086077-7F12-AE28-F3E7-F6B133B70894}"/>
-              </a:ext>
-            </a:extLst>
-          </p:cNvPr>
-          <p:cNvSpPr/>
-          <p:nvPr/>
-        </p:nvSpPr>
-        <p:spPr>
-          <a:xfrm>
-            <a:off x="3799642" y="5522665"/>
-            <a:ext cx="253435" cy="212902"/>
-          </a:xfrm>
-          <a:prstGeom prst="ellipse">
-            <a:avLst/>
-          </a:prstGeom>
-          <a:solidFill>
-            <a:schemeClr val="tx1"/>
-          </a:solidFill>
-          <a:ln>
-            <a:solidFill>
-              <a:schemeClr val="tx1"/>
-            </a:solidFill>
-          </a:ln>
-        </p:spPr>
-        <p:style>
-          <a:lnRef idx="2">
-            <a:schemeClr val="accent1">
-              <a:shade val="50000"/>
-            </a:schemeClr>
-          </a:lnRef>
-          <a:fillRef idx="1">
-            <a:schemeClr val="accent1"/>
-          </a:fillRef>
-          <a:effectRef idx="0">
-            <a:schemeClr val="accent1"/>
-          </a:effectRef>
-          <a:fontRef idx="minor">
-            <a:schemeClr val="lt1"/>
-          </a:fontRef>
-        </p:style>
-        <p:txBody>
-          <a:bodyPr lIns="0" tIns="0" rIns="0" bIns="0" rtlCol="0" anchor="ctr"/>
-          <a:lstStyle/>
-          <a:p>
-            <a:pPr algn="ctr"/>
-            <a:r>
-              <a:rPr lang="en-US" sz="800" dirty="0">
-                <a:latin typeface="Arial" panose="020B0604020202020204" pitchFamily="34" charset="0"/>
-                <a:cs typeface="Arial" panose="020B0604020202020204" pitchFamily="34" charset="0"/>
-              </a:rPr>
               <a:t>3.6</a:t>
             </a:r>
           </a:p>
         </p:txBody>
       </p:sp>
-      <p:sp>
-        <p:nvSpPr>
-          <p:cNvPr id="60" name="TextBox 59">
-            <a:extLst>
-              <a:ext uri="{FF2B5EF4-FFF2-40B4-BE49-F238E27FC236}">
-                <a16:creationId xmlns:a16="http://schemas.microsoft.com/office/drawing/2014/main" id="{BE3129B1-31E0-8868-831C-1A56112DC9AE}"/>
-              </a:ext>
-            </a:extLst>
-          </p:cNvPr>
-          <p:cNvSpPr txBox="1"/>
-          <p:nvPr/>
-        </p:nvSpPr>
-        <p:spPr>
-          <a:xfrm>
-            <a:off x="1967400" y="3256130"/>
-            <a:ext cx="1103001" cy="430887"/>
-          </a:xfrm>
-          <a:prstGeom prst="rect">
-            <a:avLst/>
-          </a:prstGeom>
-          <a:noFill/>
-        </p:spPr>
-        <p:txBody>
-          <a:bodyPr wrap="square" rtlCol="0">
-            <a:spAutoFit/>
-          </a:bodyPr>
-          <a:lstStyle/>
-          <a:p>
-            <a:pPr algn="ctr"/>
-            <a:r>
-              <a:rPr lang="en-US" sz="1100" dirty="0">
-                <a:latin typeface="Arial" panose="020B0604020202020204" pitchFamily="34" charset="0"/>
-                <a:cs typeface="Arial" panose="020B0604020202020204" pitchFamily="34" charset="0"/>
-              </a:rPr>
-              <a:t>Configuration Role</a:t>
-            </a:r>
-          </a:p>
-        </p:txBody>
-      </p:sp>
-      <p:pic>
-        <p:nvPicPr>
-          <p:cNvPr id="61" name="Graphic 60">
-            <a:extLst>
-              <a:ext uri="{FF2B5EF4-FFF2-40B4-BE49-F238E27FC236}">
-                <a16:creationId xmlns:a16="http://schemas.microsoft.com/office/drawing/2014/main" id="{355BEDDA-F9C0-FCE2-AC94-510D21CA5215}"/>
-              </a:ext>
-            </a:extLst>
-          </p:cNvPr>
-          <p:cNvPicPr>
-            <a:picLocks noChangeAspect="1"/>
-          </p:cNvPicPr>
-          <p:nvPr/>
-        </p:nvPicPr>
-        <p:blipFill>
-          <a:blip r:embed="rId17">
-            <a:extLst>
-              <a:ext uri="{96DAC541-7B7A-43D3-8B79-37D633B846F1}">
-                <asvg:svgBlip xmlns:asvg="http://schemas.microsoft.com/office/drawing/2016/SVG/main" r:embed="rId18"/>
-              </a:ext>
-            </a:extLst>
-          </a:blip>
-          <a:stretch>
-            <a:fillRect/>
-          </a:stretch>
-        </p:blipFill>
-        <p:spPr>
-          <a:xfrm>
-            <a:off x="2288532" y="2888455"/>
-            <a:ext cx="469900" cy="469900"/>
-          </a:xfrm>
-          <a:prstGeom prst="rect">
-            <a:avLst/>
-          </a:prstGeom>
-        </p:spPr>
-      </p:pic>
-      <p:sp>
-        <p:nvSpPr>
-          <p:cNvPr id="62" name="Oval 61">
-            <a:extLst>
-              <a:ext uri="{FF2B5EF4-FFF2-40B4-BE49-F238E27FC236}">
-                <a16:creationId xmlns:a16="http://schemas.microsoft.com/office/drawing/2014/main" id="{84CC7098-DD0B-457D-8EC4-281A8CD36CB3}"/>
-              </a:ext>
-            </a:extLst>
-          </p:cNvPr>
-          <p:cNvSpPr/>
-          <p:nvPr/>
-        </p:nvSpPr>
-        <p:spPr>
-          <a:xfrm>
-            <a:off x="2155894" y="2854701"/>
-            <a:ext cx="253435" cy="212902"/>
-          </a:xfrm>
-          <a:prstGeom prst="ellipse">
-            <a:avLst/>
-          </a:prstGeom>
-          <a:solidFill>
-            <a:schemeClr val="tx1"/>
-          </a:solidFill>
-          <a:ln>
-            <a:solidFill>
-              <a:schemeClr val="tx1"/>
-            </a:solidFill>
-          </a:ln>
-        </p:spPr>
-        <p:style>
-          <a:lnRef idx="2">
-            <a:schemeClr val="accent1">
-              <a:shade val="50000"/>
-            </a:schemeClr>
-          </a:lnRef>
-          <a:fillRef idx="1">
-            <a:schemeClr val="accent1"/>
-          </a:fillRef>
-          <a:effectRef idx="0">
-            <a:schemeClr val="accent1"/>
-          </a:effectRef>
-          <a:fontRef idx="minor">
-            <a:schemeClr val="lt1"/>
-          </a:fontRef>
-        </p:style>
-        <p:txBody>
-          <a:bodyPr lIns="0" tIns="0" rIns="0" bIns="0" rtlCol="0" anchor="ctr"/>
-          <a:lstStyle/>
-          <a:p>
-            <a:pPr algn="ctr"/>
-            <a:r>
-              <a:rPr lang="en-US" sz="800" dirty="0">
-                <a:latin typeface="Arial" panose="020B0604020202020204" pitchFamily="34" charset="0"/>
-                <a:cs typeface="Arial" panose="020B0604020202020204" pitchFamily="34" charset="0"/>
-              </a:rPr>
-              <a:t>1.3</a:t>
-            </a:r>
-          </a:p>
-        </p:txBody>
-      </p:sp>
-      <p:cxnSp>
-        <p:nvCxnSpPr>
-          <p:cNvPr id="65" name="Straight Arrow Connector 64">
-            <a:extLst>
-              <a:ext uri="{FF2B5EF4-FFF2-40B4-BE49-F238E27FC236}">
-                <a16:creationId xmlns:a16="http://schemas.microsoft.com/office/drawing/2014/main" id="{7AE7F20E-2158-846B-17A3-5960D872E911}"/>
-              </a:ext>
-            </a:extLst>
-          </p:cNvPr>
-          <p:cNvCxnSpPr>
-            <a:cxnSpLocks/>
-          </p:cNvCxnSpPr>
-          <p:nvPr/>
-        </p:nvCxnSpPr>
-        <p:spPr>
-          <a:xfrm>
-            <a:off x="4515940" y="1228077"/>
-            <a:ext cx="463335" cy="0"/>
-          </a:xfrm>
-          <a:prstGeom prst="straightConnector1">
-            <a:avLst/>
-          </a:prstGeom>
-          <a:ln>
-            <a:tailEnd type="triangle"/>
-          </a:ln>
-        </p:spPr>
-        <p:style>
-          <a:lnRef idx="1">
-            <a:schemeClr val="dk1"/>
-          </a:lnRef>
-          <a:fillRef idx="0">
-            <a:schemeClr val="dk1"/>
-          </a:fillRef>
-          <a:effectRef idx="0">
-            <a:schemeClr val="dk1"/>
-          </a:effectRef>
-          <a:fontRef idx="minor">
-            <a:schemeClr val="tx1"/>
-          </a:fontRef>
-        </p:style>
-      </p:cxnSp>
-      <p:sp>
-        <p:nvSpPr>
-          <p:cNvPr id="71" name="Oval 70">
-            <a:extLst>
-              <a:ext uri="{FF2B5EF4-FFF2-40B4-BE49-F238E27FC236}">
-                <a16:creationId xmlns:a16="http://schemas.microsoft.com/office/drawing/2014/main" id="{02D355C9-C25E-60AC-3C12-F876AF4A19B8}"/>
-              </a:ext>
-            </a:extLst>
-          </p:cNvPr>
-          <p:cNvSpPr/>
-          <p:nvPr/>
-        </p:nvSpPr>
-        <p:spPr>
-          <a:xfrm>
-            <a:off x="8846931" y="2408332"/>
-            <a:ext cx="253435" cy="212902"/>
-          </a:xfrm>
-          <a:prstGeom prst="ellipse">
-            <a:avLst/>
-          </a:prstGeom>
-          <a:solidFill>
-            <a:schemeClr val="tx1"/>
-          </a:solidFill>
-          <a:ln>
-            <a:solidFill>
-              <a:schemeClr val="tx1"/>
-            </a:solidFill>
-          </a:ln>
-        </p:spPr>
-        <p:style>
-          <a:lnRef idx="2">
-            <a:schemeClr val="accent1">
-              <a:shade val="50000"/>
-            </a:schemeClr>
-          </a:lnRef>
-          <a:fillRef idx="1">
-            <a:schemeClr val="accent1"/>
-          </a:fillRef>
-          <a:effectRef idx="0">
-            <a:schemeClr val="accent1"/>
-          </a:effectRef>
-          <a:fontRef idx="minor">
-            <a:schemeClr val="lt1"/>
-          </a:fontRef>
-        </p:style>
-        <p:txBody>
-          <a:bodyPr lIns="0" tIns="0" rIns="0" bIns="0" rtlCol="0" anchor="ctr"/>
-          <a:lstStyle/>
-          <a:p>
-            <a:pPr algn="ctr"/>
-            <a:r>
-              <a:rPr lang="en-US" sz="800" dirty="0">
-                <a:latin typeface="Arial" panose="020B0604020202020204" pitchFamily="34" charset="0"/>
-                <a:cs typeface="Arial" panose="020B0604020202020204" pitchFamily="34" charset="0"/>
-              </a:rPr>
-              <a:t>2.3</a:t>
-            </a:r>
-          </a:p>
-        </p:txBody>
-      </p:sp>
-      <p:pic>
-        <p:nvPicPr>
-          <p:cNvPr id="72" name="Graphic 71">
-            <a:extLst>
-              <a:ext uri="{FF2B5EF4-FFF2-40B4-BE49-F238E27FC236}">
-                <a16:creationId xmlns:a16="http://schemas.microsoft.com/office/drawing/2014/main" id="{A2FCFDE6-8EA4-CF02-29A8-8562827C873E}"/>
-              </a:ext>
-            </a:extLst>
-          </p:cNvPr>
-          <p:cNvPicPr>
-            <a:picLocks noChangeAspect="1"/>
-          </p:cNvPicPr>
-          <p:nvPr/>
-        </p:nvPicPr>
-        <p:blipFill>
-          <a:blip r:embed="rId5">
-            <a:extLst>
-              <a:ext uri="{96DAC541-7B7A-43D3-8B79-37D633B846F1}">
-                <asvg:svgBlip xmlns:asvg="http://schemas.microsoft.com/office/drawing/2016/SVG/main" r:embed="rId6"/>
-              </a:ext>
-            </a:extLst>
-          </a:blip>
-          <a:stretch>
-            <a:fillRect/>
-          </a:stretch>
-        </p:blipFill>
-        <p:spPr>
-          <a:xfrm>
-            <a:off x="654509" y="3883421"/>
-            <a:ext cx="424469" cy="424469"/>
-          </a:xfrm>
-          <a:prstGeom prst="rect">
-            <a:avLst/>
-          </a:prstGeom>
-        </p:spPr>
-      </p:pic>
     </p:spTree>
     <p:extLst>
       <p:ext uri="{BB962C8B-B14F-4D97-AF65-F5344CB8AC3E}">

</xml_diff>

<commit_message>
added sns fanout update to the branch
</commit_message>
<xml_diff>
--- a/aws_sra_examples/solutions/config/config_org/documentation/sra-config-org.pptx
+++ b/aws_sra_examples/solutions/config/config_org/documentation/sra-config-org.pptx
@@ -208,7 +208,7 @@
           <a:p>
             <a:fld id="{FD8D84E3-00BA-4A46-8256-7E527D8B4480}" type="datetimeFigureOut">
               <a:rPr lang="en-US" smtClean="0"/>
-              <a:t>11/2/23</a:t>
+              <a:t>1/17/24</a:t>
             </a:fld>
             <a:endParaRPr lang="en-US"/>
           </a:p>
@@ -706,7 +706,7 @@
           <a:p>
             <a:fld id="{9FE185F7-9B28-9F45-9F43-9CB5A0B99390}" type="datetimeFigureOut">
               <a:rPr lang="en-US" smtClean="0"/>
-              <a:t>11/2/23</a:t>
+              <a:t>1/17/24</a:t>
             </a:fld>
             <a:endParaRPr lang="en-US"/>
           </a:p>
@@ -904,7 +904,7 @@
           <a:p>
             <a:fld id="{9FE185F7-9B28-9F45-9F43-9CB5A0B99390}" type="datetimeFigureOut">
               <a:rPr lang="en-US" smtClean="0"/>
-              <a:t>11/2/23</a:t>
+              <a:t>1/17/24</a:t>
             </a:fld>
             <a:endParaRPr lang="en-US"/>
           </a:p>
@@ -1112,7 +1112,7 @@
           <a:p>
             <a:fld id="{9FE185F7-9B28-9F45-9F43-9CB5A0B99390}" type="datetimeFigureOut">
               <a:rPr lang="en-US" smtClean="0"/>
-              <a:t>11/2/23</a:t>
+              <a:t>1/17/24</a:t>
             </a:fld>
             <a:endParaRPr lang="en-US"/>
           </a:p>
@@ -1310,7 +1310,7 @@
           <a:p>
             <a:fld id="{9FE185F7-9B28-9F45-9F43-9CB5A0B99390}" type="datetimeFigureOut">
               <a:rPr lang="en-US" smtClean="0"/>
-              <a:t>11/2/23</a:t>
+              <a:t>1/17/24</a:t>
             </a:fld>
             <a:endParaRPr lang="en-US"/>
           </a:p>
@@ -1585,7 +1585,7 @@
           <a:p>
             <a:fld id="{9FE185F7-9B28-9F45-9F43-9CB5A0B99390}" type="datetimeFigureOut">
               <a:rPr lang="en-US" smtClean="0"/>
-              <a:t>11/2/23</a:t>
+              <a:t>1/17/24</a:t>
             </a:fld>
             <a:endParaRPr lang="en-US"/>
           </a:p>
@@ -1850,7 +1850,7 @@
           <a:p>
             <a:fld id="{9FE185F7-9B28-9F45-9F43-9CB5A0B99390}" type="datetimeFigureOut">
               <a:rPr lang="en-US" smtClean="0"/>
-              <a:t>11/2/23</a:t>
+              <a:t>1/17/24</a:t>
             </a:fld>
             <a:endParaRPr lang="en-US"/>
           </a:p>
@@ -2262,7 +2262,7 @@
           <a:p>
             <a:fld id="{9FE185F7-9B28-9F45-9F43-9CB5A0B99390}" type="datetimeFigureOut">
               <a:rPr lang="en-US" smtClean="0"/>
-              <a:t>11/2/23</a:t>
+              <a:t>1/17/24</a:t>
             </a:fld>
             <a:endParaRPr lang="en-US"/>
           </a:p>
@@ -2403,7 +2403,7 @@
           <a:p>
             <a:fld id="{9FE185F7-9B28-9F45-9F43-9CB5A0B99390}" type="datetimeFigureOut">
               <a:rPr lang="en-US" smtClean="0"/>
-              <a:t>11/2/23</a:t>
+              <a:t>1/17/24</a:t>
             </a:fld>
             <a:endParaRPr lang="en-US"/>
           </a:p>
@@ -2516,7 +2516,7 @@
           <a:p>
             <a:fld id="{9FE185F7-9B28-9F45-9F43-9CB5A0B99390}" type="datetimeFigureOut">
               <a:rPr lang="en-US" smtClean="0"/>
-              <a:t>11/2/23</a:t>
+              <a:t>1/17/24</a:t>
             </a:fld>
             <a:endParaRPr lang="en-US"/>
           </a:p>
@@ -2827,7 +2827,7 @@
           <a:p>
             <a:fld id="{9FE185F7-9B28-9F45-9F43-9CB5A0B99390}" type="datetimeFigureOut">
               <a:rPr lang="en-US" smtClean="0"/>
-              <a:t>11/2/23</a:t>
+              <a:t>1/17/24</a:t>
             </a:fld>
             <a:endParaRPr lang="en-US"/>
           </a:p>
@@ -3115,7 +3115,7 @@
           <a:p>
             <a:fld id="{9FE185F7-9B28-9F45-9F43-9CB5A0B99390}" type="datetimeFigureOut">
               <a:rPr lang="en-US" smtClean="0"/>
-              <a:t>11/2/23</a:t>
+              <a:t>1/17/24</a:t>
             </a:fld>
             <a:endParaRPr lang="en-US"/>
           </a:p>
@@ -3356,7 +3356,7 @@
           <a:p>
             <a:fld id="{9FE185F7-9B28-9F45-9F43-9CB5A0B99390}" type="datetimeFigureOut">
               <a:rPr lang="en-US" smtClean="0"/>
-              <a:t>11/2/23</a:t>
+              <a:t>1/17/24</a:t>
             </a:fld>
             <a:endParaRPr lang="en-US"/>
           </a:p>
@@ -4878,7 +4878,7 @@
                 <a:latin typeface="Arial" panose="020B0604020202020204" pitchFamily="34" charset="0"/>
                 <a:cs typeface="Arial" panose="020B0604020202020204" pitchFamily="34" charset="0"/>
               </a:rPr>
-              <a:t>1.6</a:t>
+              <a:t>1.7</a:t>
             </a:r>
           </a:p>
         </p:txBody>
@@ -4938,7 +4938,7 @@
                 <a:latin typeface="Arial" panose="020B0604020202020204" pitchFamily="34" charset="0"/>
                 <a:cs typeface="Arial" panose="020B0604020202020204" pitchFamily="34" charset="0"/>
               </a:rPr>
-              <a:t>1.7</a:t>
+              <a:t>1.8</a:t>
             </a:r>
           </a:p>
         </p:txBody>
@@ -7483,7 +7483,7 @@
         </p:nvSpPr>
         <p:spPr>
           <a:xfrm>
-            <a:off x="1308997" y="4545942"/>
+            <a:off x="1300149" y="4531107"/>
             <a:ext cx="253435" cy="212902"/>
           </a:xfrm>
           <a:prstGeom prst="ellipse">
@@ -7853,8 +7853,8 @@
         </p:nvSpPr>
         <p:spPr>
           <a:xfrm>
-            <a:off x="4727568" y="4476815"/>
-            <a:ext cx="1981450" cy="1493707"/>
+            <a:off x="4092705" y="4476815"/>
+            <a:ext cx="2616313" cy="1493707"/>
           </a:xfrm>
           <a:prstGeom prst="rect">
             <a:avLst/>
@@ -7946,7 +7946,7 @@
         </p:blipFill>
         <p:spPr>
           <a:xfrm>
-            <a:off x="4729712" y="4476434"/>
+            <a:off x="4082851" y="4481705"/>
             <a:ext cx="442506" cy="391567"/>
           </a:xfrm>
           <a:prstGeom prst="rect">
@@ -7975,8 +7975,8 @@
         </p:nvSpPr>
         <p:spPr>
           <a:xfrm>
-            <a:off x="4816752" y="4789779"/>
-            <a:ext cx="1981450" cy="1366400"/>
+            <a:off x="4275769" y="4789779"/>
+            <a:ext cx="2522433" cy="1366400"/>
           </a:xfrm>
           <a:prstGeom prst="rect">
             <a:avLst/>
@@ -8695,7 +8695,7 @@
                 <a:latin typeface="Arial" panose="020B0604020202020204" pitchFamily="34" charset="0"/>
                 <a:cs typeface="Arial" panose="020B0604020202020204" pitchFamily="34" charset="0"/>
               </a:rPr>
-              <a:t>1.9</a:t>
+              <a:t>1.10</a:t>
             </a:r>
           </a:p>
         </p:txBody>
@@ -9097,12 +9097,157 @@
           </a:fontRef>
         </p:style>
       </p:cxnSp>
+      <p:sp>
+        <p:nvSpPr>
+          <p:cNvPr id="29" name="TextBox 28">
+            <a:extLst>
+              <a:ext uri="{FF2B5EF4-FFF2-40B4-BE49-F238E27FC236}">
+                <a16:creationId xmlns:a16="http://schemas.microsoft.com/office/drawing/2014/main" id="{F441BD57-985B-3F49-99C3-BF3B9E891322}"/>
+              </a:ext>
+            </a:extLst>
+          </p:cNvPr>
+          <p:cNvSpPr txBox="1"/>
+          <p:nvPr/>
+        </p:nvSpPr>
+        <p:spPr>
+          <a:xfrm>
+            <a:off x="1994024" y="5945492"/>
+            <a:ext cx="1405120" cy="430887"/>
+          </a:xfrm>
+          <a:prstGeom prst="rect">
+            <a:avLst/>
+          </a:prstGeom>
+          <a:noFill/>
+        </p:spPr>
+        <p:txBody>
+          <a:bodyPr wrap="square" rtlCol="0">
+            <a:spAutoFit/>
+          </a:bodyPr>
+          <a:lstStyle/>
+          <a:p>
+            <a:pPr algn="ctr"/>
+            <a:r>
+              <a:rPr lang="en-US" sz="1100" dirty="0">
+                <a:latin typeface="Arial" panose="020B0604020202020204" pitchFamily="34" charset="0"/>
+                <a:cs typeface="Arial" panose="020B0604020202020204" pitchFamily="34" charset="0"/>
+              </a:rPr>
+              <a:t>Config </a:t>
+            </a:r>
+          </a:p>
+          <a:p>
+            <a:pPr algn="ctr"/>
+            <a:r>
+              <a:rPr lang="en-US" sz="1100" dirty="0">
+                <a:latin typeface="Arial" panose="020B0604020202020204" pitchFamily="34" charset="0"/>
+                <a:cs typeface="Arial" panose="020B0604020202020204" pitchFamily="34" charset="0"/>
+              </a:rPr>
+              <a:t>Aggregator Role</a:t>
+            </a:r>
+          </a:p>
+        </p:txBody>
+      </p:sp>
       <p:pic>
         <p:nvPicPr>
-          <p:cNvPr id="26" name="Graphic 17">
-            <a:extLst>
-              <a:ext uri="{FF2B5EF4-FFF2-40B4-BE49-F238E27FC236}">
-                <a16:creationId xmlns:a16="http://schemas.microsoft.com/office/drawing/2014/main" id="{7564EB38-E6C9-BEA3-06C8-2CA7A178281D}"/>
+          <p:cNvPr id="30" name="Graphic 29">
+            <a:extLst>
+              <a:ext uri="{FF2B5EF4-FFF2-40B4-BE49-F238E27FC236}">
+                <a16:creationId xmlns:a16="http://schemas.microsoft.com/office/drawing/2014/main" id="{EC7991A4-D5C4-088B-091C-5C2EC8F034B9}"/>
+              </a:ext>
+            </a:extLst>
+          </p:cNvPr>
+          <p:cNvPicPr>
+            <a:picLocks noChangeAspect="1"/>
+          </p:cNvPicPr>
+          <p:nvPr/>
+        </p:nvPicPr>
+        <p:blipFill>
+          <a:blip r:embed="rId17">
+            <a:extLst>
+              <a:ext uri="{96DAC541-7B7A-43D3-8B79-37D633B846F1}">
+                <asvg:svgBlip xmlns:asvg="http://schemas.microsoft.com/office/drawing/2016/SVG/main" r:embed="rId18"/>
+              </a:ext>
+            </a:extLst>
+          </a:blip>
+          <a:stretch>
+            <a:fillRect/>
+          </a:stretch>
+        </p:blipFill>
+        <p:spPr>
+          <a:xfrm>
+            <a:off x="2453666" y="5639415"/>
+            <a:ext cx="469900" cy="469900"/>
+          </a:xfrm>
+          <a:prstGeom prst="rect">
+            <a:avLst/>
+          </a:prstGeom>
+        </p:spPr>
+      </p:pic>
+      <p:sp>
+        <p:nvSpPr>
+          <p:cNvPr id="31" name="Oval 30">
+            <a:extLst>
+              <a:ext uri="{FF2B5EF4-FFF2-40B4-BE49-F238E27FC236}">
+                <a16:creationId xmlns:a16="http://schemas.microsoft.com/office/drawing/2014/main" id="{71712401-EE44-D9B6-6171-3CB782CF2E00}"/>
+              </a:ext>
+            </a:extLst>
+          </p:cNvPr>
+          <p:cNvSpPr/>
+          <p:nvPr/>
+        </p:nvSpPr>
+        <p:spPr>
+          <a:xfrm>
+            <a:off x="2356750" y="5552189"/>
+            <a:ext cx="253435" cy="212902"/>
+          </a:xfrm>
+          <a:prstGeom prst="ellipse">
+            <a:avLst/>
+          </a:prstGeom>
+          <a:solidFill>
+            <a:schemeClr val="tx1"/>
+          </a:solidFill>
+          <a:ln>
+            <a:solidFill>
+              <a:schemeClr val="tx1"/>
+            </a:solidFill>
+          </a:ln>
+        </p:spPr>
+        <p:style>
+          <a:lnRef idx="2">
+            <a:schemeClr val="accent1">
+              <a:shade val="50000"/>
+            </a:schemeClr>
+          </a:lnRef>
+          <a:fillRef idx="1">
+            <a:schemeClr val="accent1"/>
+          </a:fillRef>
+          <a:effectRef idx="0">
+            <a:schemeClr val="accent1"/>
+          </a:effectRef>
+          <a:fontRef idx="minor">
+            <a:schemeClr val="lt1"/>
+          </a:fontRef>
+        </p:style>
+        <p:txBody>
+          <a:bodyPr lIns="0" tIns="0" rIns="0" bIns="0" rtlCol="0" anchor="ctr"/>
+          <a:lstStyle/>
+          <a:p>
+            <a:pPr algn="ctr"/>
+            <a:r>
+              <a:rPr lang="en-US" sz="800" dirty="0">
+                <a:latin typeface="Arial" panose="020B0604020202020204" pitchFamily="34" charset="0"/>
+                <a:cs typeface="Arial" panose="020B0604020202020204" pitchFamily="34" charset="0"/>
+              </a:rPr>
+              <a:t>3.5</a:t>
+            </a:r>
+          </a:p>
+        </p:txBody>
+      </p:sp>
+      <p:pic>
+        <p:nvPicPr>
+          <p:cNvPr id="32" name="Graphic 7">
+            <a:extLst>
+              <a:ext uri="{FF2B5EF4-FFF2-40B4-BE49-F238E27FC236}">
+                <a16:creationId xmlns:a16="http://schemas.microsoft.com/office/drawing/2014/main" id="{285D0C81-7FE5-E018-1499-16DDA2CA65A1}"/>
               </a:ext>
             </a:extLst>
           </p:cNvPr>
@@ -9112,7 +9257,7 @@
           <p:nvPr/>
         </p:nvPicPr>
         <p:blipFill>
-          <a:blip r:embed="rId9">
+          <a:blip r:embed="rId22">
             <a:extLst>
               <a:ext uri="{28A0092B-C50C-407E-A947-70E740481C1C}">
                 <a14:useLocalDpi xmlns:a14="http://schemas.microsoft.com/office/drawing/2010/main" val="0"/>
@@ -9126,7 +9271,7 @@
         </p:blipFill>
         <p:spPr bwMode="auto">
           <a:xfrm>
-            <a:off x="2713049" y="4610823"/>
+            <a:off x="2457751" y="4608783"/>
             <a:ext cx="457200" cy="457200"/>
           </a:xfrm>
           <a:prstGeom prst="rect">
@@ -9159,10 +9304,10 @@
       </p:pic>
       <p:sp>
         <p:nvSpPr>
-          <p:cNvPr id="27" name="TextBox 2">
-            <a:extLst>
-              <a:ext uri="{FF2B5EF4-FFF2-40B4-BE49-F238E27FC236}">
-                <a16:creationId xmlns:a16="http://schemas.microsoft.com/office/drawing/2014/main" id="{869D045B-78C3-F872-E3CD-EF106730F8EF}"/>
+          <p:cNvPr id="40" name="TextBox 39">
+            <a:extLst>
+              <a:ext uri="{FF2B5EF4-FFF2-40B4-BE49-F238E27FC236}">
+                <a16:creationId xmlns:a16="http://schemas.microsoft.com/office/drawing/2014/main" id="{9036CCF1-19D8-E915-FD29-2D54271D0B79}"/>
               </a:ext>
             </a:extLst>
           </p:cNvPr>
@@ -9171,8 +9316,1377 @@
         </p:nvSpPr>
         <p:spPr>
           <a:xfrm>
-            <a:off x="2284636" y="5074014"/>
-            <a:ext cx="1273984" cy="261610"/>
+            <a:off x="2150353" y="5060627"/>
+            <a:ext cx="1115962" cy="430887"/>
+          </a:xfrm>
+          <a:prstGeom prst="rect">
+            <a:avLst/>
+          </a:prstGeom>
+          <a:noFill/>
+        </p:spPr>
+        <p:txBody>
+          <a:bodyPr wrap="square" rtlCol="0">
+            <a:spAutoFit/>
+          </a:bodyPr>
+          <a:lstStyle/>
+          <a:p>
+            <a:pPr algn="ctr"/>
+            <a:r>
+              <a:rPr lang="en-US" sz="1100" dirty="0">
+                <a:latin typeface="Arial" panose="020B0604020202020204" pitchFamily="34" charset="0"/>
+                <a:cs typeface="Arial" panose="020B0604020202020204" pitchFamily="34" charset="0"/>
+              </a:rPr>
+              <a:t>Delivery KMS Key</a:t>
+            </a:r>
+          </a:p>
+        </p:txBody>
+      </p:sp>
+      <p:sp>
+        <p:nvSpPr>
+          <p:cNvPr id="43" name="Oval 42">
+            <a:extLst>
+              <a:ext uri="{FF2B5EF4-FFF2-40B4-BE49-F238E27FC236}">
+                <a16:creationId xmlns:a16="http://schemas.microsoft.com/office/drawing/2014/main" id="{53D48C63-48F3-8838-3DEE-58DA4DA1F93F}"/>
+              </a:ext>
+            </a:extLst>
+          </p:cNvPr>
+          <p:cNvSpPr/>
+          <p:nvPr/>
+        </p:nvSpPr>
+        <p:spPr>
+          <a:xfrm>
+            <a:off x="2360760" y="4533805"/>
+            <a:ext cx="253435" cy="212902"/>
+          </a:xfrm>
+          <a:prstGeom prst="ellipse">
+            <a:avLst/>
+          </a:prstGeom>
+          <a:solidFill>
+            <a:schemeClr val="tx1"/>
+          </a:solidFill>
+          <a:ln>
+            <a:solidFill>
+              <a:schemeClr val="tx1"/>
+            </a:solidFill>
+          </a:ln>
+        </p:spPr>
+        <p:style>
+          <a:lnRef idx="2">
+            <a:schemeClr val="accent1">
+              <a:shade val="50000"/>
+            </a:schemeClr>
+          </a:lnRef>
+          <a:fillRef idx="1">
+            <a:schemeClr val="accent1"/>
+          </a:fillRef>
+          <a:effectRef idx="0">
+            <a:schemeClr val="accent1"/>
+          </a:effectRef>
+          <a:fontRef idx="minor">
+            <a:schemeClr val="lt1"/>
+          </a:fontRef>
+        </p:style>
+        <p:txBody>
+          <a:bodyPr lIns="0" tIns="0" rIns="0" bIns="0" rtlCol="0" anchor="ctr"/>
+          <a:lstStyle/>
+          <a:p>
+            <a:pPr algn="ctr"/>
+            <a:r>
+              <a:rPr lang="en-US" sz="800" dirty="0">
+                <a:latin typeface="Arial" panose="020B0604020202020204" pitchFamily="34" charset="0"/>
+                <a:cs typeface="Arial" panose="020B0604020202020204" pitchFamily="34" charset="0"/>
+              </a:rPr>
+              <a:t>3.2</a:t>
+            </a:r>
+          </a:p>
+        </p:txBody>
+      </p:sp>
+      <p:sp>
+        <p:nvSpPr>
+          <p:cNvPr id="44" name="TextBox 43">
+            <a:extLst>
+              <a:ext uri="{FF2B5EF4-FFF2-40B4-BE49-F238E27FC236}">
+                <a16:creationId xmlns:a16="http://schemas.microsoft.com/office/drawing/2014/main" id="{EFAE6A75-3526-ABBF-1A4A-28677634242C}"/>
+              </a:ext>
+            </a:extLst>
+          </p:cNvPr>
+          <p:cNvSpPr txBox="1"/>
+          <p:nvPr/>
+        </p:nvSpPr>
+        <p:spPr>
+          <a:xfrm>
+            <a:off x="8633467" y="2875526"/>
+            <a:ext cx="1103001" cy="430887"/>
+          </a:xfrm>
+          <a:prstGeom prst="rect">
+            <a:avLst/>
+          </a:prstGeom>
+          <a:noFill/>
+        </p:spPr>
+        <p:txBody>
+          <a:bodyPr wrap="square" rtlCol="0">
+            <a:spAutoFit/>
+          </a:bodyPr>
+          <a:lstStyle/>
+          <a:p>
+            <a:pPr algn="ctr"/>
+            <a:r>
+              <a:rPr lang="en-US" sz="1100" dirty="0">
+                <a:latin typeface="Arial" panose="020B0604020202020204" pitchFamily="34" charset="0"/>
+                <a:cs typeface="Arial" panose="020B0604020202020204" pitchFamily="34" charset="0"/>
+              </a:rPr>
+              <a:t>Configuration Role</a:t>
+            </a:r>
+          </a:p>
+        </p:txBody>
+      </p:sp>
+      <p:pic>
+        <p:nvPicPr>
+          <p:cNvPr id="45" name="Graphic 44">
+            <a:extLst>
+              <a:ext uri="{FF2B5EF4-FFF2-40B4-BE49-F238E27FC236}">
+                <a16:creationId xmlns:a16="http://schemas.microsoft.com/office/drawing/2014/main" id="{C28EE8F8-227B-0272-04A5-504C1E35E717}"/>
+              </a:ext>
+            </a:extLst>
+          </p:cNvPr>
+          <p:cNvPicPr>
+            <a:picLocks noChangeAspect="1"/>
+          </p:cNvPicPr>
+          <p:nvPr/>
+        </p:nvPicPr>
+        <p:blipFill>
+          <a:blip r:embed="rId17">
+            <a:extLst>
+              <a:ext uri="{96DAC541-7B7A-43D3-8B79-37D633B846F1}">
+                <asvg:svgBlip xmlns:asvg="http://schemas.microsoft.com/office/drawing/2016/SVG/main" r:embed="rId18"/>
+              </a:ext>
+            </a:extLst>
+          </a:blip>
+          <a:stretch>
+            <a:fillRect/>
+          </a:stretch>
+        </p:blipFill>
+        <p:spPr>
+          <a:xfrm>
+            <a:off x="8915394" y="2519662"/>
+            <a:ext cx="469900" cy="469900"/>
+          </a:xfrm>
+          <a:prstGeom prst="rect">
+            <a:avLst/>
+          </a:prstGeom>
+        </p:spPr>
+      </p:pic>
+      <p:sp>
+        <p:nvSpPr>
+          <p:cNvPr id="170" name="Oval 169">
+            <a:extLst>
+              <a:ext uri="{FF2B5EF4-FFF2-40B4-BE49-F238E27FC236}">
+                <a16:creationId xmlns:a16="http://schemas.microsoft.com/office/drawing/2014/main" id="{97797EDC-C96B-4205-9EA5-4896D4E19CC8}"/>
+              </a:ext>
+            </a:extLst>
+          </p:cNvPr>
+          <p:cNvSpPr/>
+          <p:nvPr/>
+        </p:nvSpPr>
+        <p:spPr>
+          <a:xfrm>
+            <a:off x="2851114" y="1843129"/>
+            <a:ext cx="253435" cy="212902"/>
+          </a:xfrm>
+          <a:prstGeom prst="ellipse">
+            <a:avLst/>
+          </a:prstGeom>
+          <a:solidFill>
+            <a:schemeClr val="tx1"/>
+          </a:solidFill>
+          <a:ln>
+            <a:solidFill>
+              <a:schemeClr val="tx1"/>
+            </a:solidFill>
+          </a:ln>
+        </p:spPr>
+        <p:style>
+          <a:lnRef idx="2">
+            <a:schemeClr val="accent1">
+              <a:shade val="50000"/>
+            </a:schemeClr>
+          </a:lnRef>
+          <a:fillRef idx="1">
+            <a:schemeClr val="accent1"/>
+          </a:fillRef>
+          <a:effectRef idx="0">
+            <a:schemeClr val="accent1"/>
+          </a:effectRef>
+          <a:fontRef idx="minor">
+            <a:schemeClr val="lt1"/>
+          </a:fontRef>
+        </p:style>
+        <p:txBody>
+          <a:bodyPr lIns="0" tIns="0" rIns="0" bIns="0" rtlCol="0" anchor="ctr"/>
+          <a:lstStyle/>
+          <a:p>
+            <a:pPr algn="ctr"/>
+            <a:r>
+              <a:rPr lang="en-US" sz="800" dirty="0">
+                <a:latin typeface="Arial" panose="020B0604020202020204" pitchFamily="34" charset="0"/>
+                <a:cs typeface="Arial" panose="020B0604020202020204" pitchFamily="34" charset="0"/>
+              </a:rPr>
+              <a:t>1.9</a:t>
+            </a:r>
+          </a:p>
+        </p:txBody>
+      </p:sp>
+      <p:pic>
+        <p:nvPicPr>
+          <p:cNvPr id="2" name="Graphic 1">
+            <a:extLst>
+              <a:ext uri="{FF2B5EF4-FFF2-40B4-BE49-F238E27FC236}">
+                <a16:creationId xmlns:a16="http://schemas.microsoft.com/office/drawing/2014/main" id="{A85F3AAE-E32D-A9FD-BF13-A31E332CC209}"/>
+              </a:ext>
+            </a:extLst>
+          </p:cNvPr>
+          <p:cNvPicPr>
+            <a:picLocks noChangeAspect="1"/>
+          </p:cNvPicPr>
+          <p:nvPr/>
+        </p:nvPicPr>
+        <p:blipFill>
+          <a:blip r:embed="rId12">
+            <a:extLst>
+              <a:ext uri="{96DAC541-7B7A-43D3-8B79-37D633B846F1}">
+                <asvg:svgBlip xmlns:asvg="http://schemas.microsoft.com/office/drawing/2016/SVG/main" r:embed="rId13"/>
+              </a:ext>
+            </a:extLst>
+          </a:blip>
+          <a:stretch>
+            <a:fillRect/>
+          </a:stretch>
+        </p:blipFill>
+        <p:spPr>
+          <a:xfrm>
+            <a:off x="4265076" y="4781067"/>
+            <a:ext cx="442506" cy="391567"/>
+          </a:xfrm>
+          <a:prstGeom prst="rect">
+            <a:avLst/>
+          </a:prstGeom>
+          <a:effectLst>
+            <a:outerShdw blurRad="50800" dist="38100" dir="13500000" algn="br" rotWithShape="0">
+              <a:prstClr val="black">
+                <a:alpha val="40000"/>
+              </a:prstClr>
+            </a:outerShdw>
+          </a:effectLst>
+        </p:spPr>
+      </p:pic>
+      <p:sp>
+        <p:nvSpPr>
+          <p:cNvPr id="99" name="Rectangle 98">
+            <a:extLst>
+              <a:ext uri="{FF2B5EF4-FFF2-40B4-BE49-F238E27FC236}">
+                <a16:creationId xmlns:a16="http://schemas.microsoft.com/office/drawing/2014/main" id="{C03B0D71-46A9-CAB8-23CA-03441DD94C5D}"/>
+              </a:ext>
+            </a:extLst>
+          </p:cNvPr>
+          <p:cNvSpPr/>
+          <p:nvPr/>
+        </p:nvSpPr>
+        <p:spPr>
+          <a:xfrm>
+            <a:off x="4444070" y="5097937"/>
+            <a:ext cx="2441714" cy="1211596"/>
+          </a:xfrm>
+          <a:prstGeom prst="rect">
+            <a:avLst/>
+          </a:prstGeom>
+          <a:solidFill>
+            <a:schemeClr val="bg1"/>
+          </a:solidFill>
+          <a:ln w="12700">
+            <a:solidFill>
+              <a:srgbClr val="5B9CD5"/>
+            </a:solidFill>
+            <a:prstDash val="sysDash"/>
+          </a:ln>
+          <a:effectLst>
+            <a:outerShdw blurRad="50800" dist="38100" dir="13500000" algn="br" rotWithShape="0">
+              <a:prstClr val="black">
+                <a:alpha val="40000"/>
+              </a:prstClr>
+            </a:outerShdw>
+          </a:effectLst>
+        </p:spPr>
+        <p:style>
+          <a:lnRef idx="2">
+            <a:schemeClr val="accent1">
+              <a:shade val="50000"/>
+            </a:schemeClr>
+          </a:lnRef>
+          <a:fillRef idx="1">
+            <a:schemeClr val="accent1"/>
+          </a:fillRef>
+          <a:effectRef idx="0">
+            <a:schemeClr val="accent1"/>
+          </a:effectRef>
+          <a:fontRef idx="minor">
+            <a:schemeClr val="lt1"/>
+          </a:fontRef>
+        </p:style>
+        <p:txBody>
+          <a:bodyPr lIns="502920" tIns="91440"/>
+          <a:lstStyle/>
+          <a:p>
+            <a:pPr eaLnBrk="1" fontAlgn="auto" hangingPunct="1">
+              <a:spcBef>
+                <a:spcPts val="0"/>
+              </a:spcBef>
+              <a:spcAft>
+                <a:spcPts val="0"/>
+              </a:spcAft>
+              <a:defRPr/>
+            </a:pPr>
+            <a:r>
+              <a:rPr lang="en-US" sz="1200" dirty="0">
+                <a:solidFill>
+                  <a:srgbClr val="5B9CD5"/>
+                </a:solidFill>
+                <a:latin typeface="Arial" panose="020B0604020202020204" pitchFamily="34" charset="0"/>
+                <a:cs typeface="Arial" panose="020B0604020202020204" pitchFamily="34" charset="0"/>
+              </a:rPr>
+              <a:t>Region n</a:t>
+            </a:r>
+          </a:p>
+        </p:txBody>
+      </p:sp>
+      <p:sp>
+        <p:nvSpPr>
+          <p:cNvPr id="101" name="TextBox 100">
+            <a:extLst>
+              <a:ext uri="{FF2B5EF4-FFF2-40B4-BE49-F238E27FC236}">
+                <a16:creationId xmlns:a16="http://schemas.microsoft.com/office/drawing/2014/main" id="{A74ADE8E-4897-0A9C-D8A6-B3A0F7DEDAFF}"/>
+              </a:ext>
+            </a:extLst>
+          </p:cNvPr>
+          <p:cNvSpPr txBox="1"/>
+          <p:nvPr/>
+        </p:nvSpPr>
+        <p:spPr>
+          <a:xfrm>
+            <a:off x="5849492" y="5914604"/>
+            <a:ext cx="1504214" cy="430887"/>
+          </a:xfrm>
+          <a:prstGeom prst="rect">
+            <a:avLst/>
+          </a:prstGeom>
+          <a:noFill/>
+        </p:spPr>
+        <p:txBody>
+          <a:bodyPr wrap="square" rtlCol="0">
+            <a:spAutoFit/>
+          </a:bodyPr>
+          <a:lstStyle/>
+          <a:p>
+            <a:pPr algn="ctr"/>
+            <a:r>
+              <a:rPr lang="en-US" sz="1100" dirty="0">
+                <a:latin typeface="Arial" panose="020B0604020202020204" pitchFamily="34" charset="0"/>
+                <a:cs typeface="Arial" panose="020B0604020202020204" pitchFamily="34" charset="0"/>
+              </a:rPr>
+              <a:t>AWS </a:t>
+            </a:r>
+          </a:p>
+          <a:p>
+            <a:pPr algn="ctr"/>
+            <a:r>
+              <a:rPr lang="en-US" sz="1100" dirty="0">
+                <a:latin typeface="Arial" panose="020B0604020202020204" pitchFamily="34" charset="0"/>
+                <a:cs typeface="Arial" panose="020B0604020202020204" pitchFamily="34" charset="0"/>
+              </a:rPr>
+              <a:t>Config </a:t>
+            </a:r>
+          </a:p>
+        </p:txBody>
+      </p:sp>
+      <p:pic>
+        <p:nvPicPr>
+          <p:cNvPr id="25" name="Graphic 8">
+            <a:extLst>
+              <a:ext uri="{FF2B5EF4-FFF2-40B4-BE49-F238E27FC236}">
+                <a16:creationId xmlns:a16="http://schemas.microsoft.com/office/drawing/2014/main" id="{B3A940F9-11E8-BBC7-D543-93975E21C63D}"/>
+              </a:ext>
+            </a:extLst>
+          </p:cNvPr>
+          <p:cNvPicPr>
+            <a:picLocks noChangeAspect="1" noChangeArrowheads="1"/>
+          </p:cNvPicPr>
+          <p:nvPr/>
+        </p:nvPicPr>
+        <p:blipFill>
+          <a:blip r:embed="rId19">
+            <a:extLst>
+              <a:ext uri="{96DAC541-7B7A-43D3-8B79-37D633B846F1}">
+                <asvg:svgBlip xmlns:asvg="http://schemas.microsoft.com/office/drawing/2016/SVG/main" r:embed="rId20"/>
+              </a:ext>
+            </a:extLst>
+          </a:blip>
+          <a:srcRect/>
+          <a:stretch/>
+        </p:blipFill>
+        <p:spPr bwMode="auto">
+          <a:xfrm>
+            <a:off x="6361444" y="5511565"/>
+            <a:ext cx="458847" cy="458847"/>
+          </a:xfrm>
+          <a:prstGeom prst="rect">
+            <a:avLst/>
+          </a:prstGeom>
+          <a:noFill/>
+          <a:ln>
+            <a:noFill/>
+          </a:ln>
+          <a:extLst>
+            <a:ext uri="{909E8E84-426E-40DD-AFC4-6F175D3DCCD1}">
+              <a14:hiddenFill xmlns:a14="http://schemas.microsoft.com/office/drawing/2010/main">
+                <a:solidFill>
+                  <a:srgbClr val="FFFFFF"/>
+                </a:solidFill>
+              </a14:hiddenFill>
+            </a:ext>
+            <a:ext uri="{91240B29-F687-4F45-9708-019B960494DF}">
+              <a14:hiddenLine xmlns:a14="http://schemas.microsoft.com/office/drawing/2010/main" w="9525">
+                <a:solidFill>
+                  <a:srgbClr val="000000"/>
+                </a:solidFill>
+                <a:miter lim="800000"/>
+                <a:headEnd/>
+                <a:tailEnd/>
+              </a14:hiddenLine>
+            </a:ext>
+          </a:extLst>
+        </p:spPr>
+      </p:pic>
+      <p:sp>
+        <p:nvSpPr>
+          <p:cNvPr id="103" name="Oval 102">
+            <a:extLst>
+              <a:ext uri="{FF2B5EF4-FFF2-40B4-BE49-F238E27FC236}">
+                <a16:creationId xmlns:a16="http://schemas.microsoft.com/office/drawing/2014/main" id="{D000C133-7003-8DB2-4FC0-1B41AED12236}"/>
+              </a:ext>
+            </a:extLst>
+          </p:cNvPr>
+          <p:cNvSpPr/>
+          <p:nvPr/>
+        </p:nvSpPr>
+        <p:spPr>
+          <a:xfrm>
+            <a:off x="6231716" y="5423197"/>
+            <a:ext cx="253435" cy="212902"/>
+          </a:xfrm>
+          <a:prstGeom prst="ellipse">
+            <a:avLst/>
+          </a:prstGeom>
+          <a:solidFill>
+            <a:schemeClr val="tx1"/>
+          </a:solidFill>
+          <a:ln>
+            <a:solidFill>
+              <a:schemeClr val="tx1"/>
+            </a:solidFill>
+          </a:ln>
+        </p:spPr>
+        <p:style>
+          <a:lnRef idx="2">
+            <a:schemeClr val="accent1">
+              <a:shade val="50000"/>
+            </a:schemeClr>
+          </a:lnRef>
+          <a:fillRef idx="1">
+            <a:schemeClr val="accent1"/>
+          </a:fillRef>
+          <a:effectRef idx="0">
+            <a:schemeClr val="accent1"/>
+          </a:effectRef>
+          <a:fontRef idx="minor">
+            <a:schemeClr val="lt1"/>
+          </a:fontRef>
+        </p:style>
+        <p:txBody>
+          <a:bodyPr lIns="0" tIns="0" rIns="0" bIns="0" rtlCol="0" anchor="ctr"/>
+          <a:lstStyle/>
+          <a:p>
+            <a:pPr algn="ctr"/>
+            <a:r>
+              <a:rPr lang="en-US" sz="800" dirty="0">
+                <a:latin typeface="Arial" panose="020B0604020202020204" pitchFamily="34" charset="0"/>
+                <a:cs typeface="Arial" panose="020B0604020202020204" pitchFamily="34" charset="0"/>
+              </a:rPr>
+              <a:t>3.8</a:t>
+            </a:r>
+          </a:p>
+        </p:txBody>
+      </p:sp>
+      <p:pic>
+        <p:nvPicPr>
+          <p:cNvPr id="36" name="Graphic 7">
+            <a:extLst>
+              <a:ext uri="{FF2B5EF4-FFF2-40B4-BE49-F238E27FC236}">
+                <a16:creationId xmlns:a16="http://schemas.microsoft.com/office/drawing/2014/main" id="{30F64005-F015-BF94-01DA-63D7C4A4406F}"/>
+              </a:ext>
+            </a:extLst>
+          </p:cNvPr>
+          <p:cNvPicPr>
+            <a:picLocks noChangeAspect="1" noChangeArrowheads="1"/>
+          </p:cNvPicPr>
+          <p:nvPr/>
+        </p:nvPicPr>
+        <p:blipFill>
+          <a:blip r:embed="rId22">
+            <a:extLst>
+              <a:ext uri="{28A0092B-C50C-407E-A947-70E740481C1C}">
+                <a14:useLocalDpi xmlns:a14="http://schemas.microsoft.com/office/drawing/2010/main" val="0"/>
+              </a:ext>
+            </a:extLst>
+          </a:blip>
+          <a:srcRect/>
+          <a:stretch>
+            <a:fillRect/>
+          </a:stretch>
+        </p:blipFill>
+        <p:spPr bwMode="auto">
+          <a:xfrm>
+            <a:off x="5561630" y="5519749"/>
+            <a:ext cx="450663" cy="450663"/>
+          </a:xfrm>
+          <a:prstGeom prst="rect">
+            <a:avLst/>
+          </a:prstGeom>
+          <a:noFill/>
+          <a:ln>
+            <a:noFill/>
+          </a:ln>
+          <a:extLst>
+            <a:ext uri="{909E8E84-426E-40DD-AFC4-6F175D3DCCD1}">
+              <a14:hiddenFill xmlns:a14="http://schemas.microsoft.com/office/drawing/2010/main">
+                <a:solidFill>
+                  <a:srgbClr val="FFFFFF"/>
+                </a:solidFill>
+              </a14:hiddenFill>
+            </a:ext>
+            <a:ext uri="{91240B29-F687-4F45-9708-019B960494DF}">
+              <a14:hiddenLine xmlns:a14="http://schemas.microsoft.com/office/drawing/2010/main" w="9525">
+                <a:solidFill>
+                  <a:srgbClr val="000000"/>
+                </a:solidFill>
+                <a:miter lim="800000"/>
+                <a:headEnd/>
+                <a:tailEnd/>
+              </a14:hiddenLine>
+            </a:ext>
+          </a:extLst>
+        </p:spPr>
+      </p:pic>
+      <p:sp>
+        <p:nvSpPr>
+          <p:cNvPr id="37" name="TextBox 36">
+            <a:extLst>
+              <a:ext uri="{FF2B5EF4-FFF2-40B4-BE49-F238E27FC236}">
+                <a16:creationId xmlns:a16="http://schemas.microsoft.com/office/drawing/2014/main" id="{77098F96-AD47-76CF-7896-FA55D5941344}"/>
+              </a:ext>
+            </a:extLst>
+          </p:cNvPr>
+          <p:cNvSpPr txBox="1"/>
+          <p:nvPr/>
+        </p:nvSpPr>
+        <p:spPr>
+          <a:xfrm>
+            <a:off x="5224040" y="5931857"/>
+            <a:ext cx="1115962" cy="430887"/>
+          </a:xfrm>
+          <a:prstGeom prst="rect">
+            <a:avLst/>
+          </a:prstGeom>
+          <a:noFill/>
+        </p:spPr>
+        <p:txBody>
+          <a:bodyPr wrap="square" rtlCol="0">
+            <a:spAutoFit/>
+          </a:bodyPr>
+          <a:lstStyle/>
+          <a:p>
+            <a:pPr algn="ctr"/>
+            <a:r>
+              <a:rPr lang="en-US" sz="1100" dirty="0">
+                <a:latin typeface="Arial" panose="020B0604020202020204" pitchFamily="34" charset="0"/>
+                <a:cs typeface="Arial" panose="020B0604020202020204" pitchFamily="34" charset="0"/>
+              </a:rPr>
+              <a:t>SNS KMS </a:t>
+            </a:r>
+          </a:p>
+          <a:p>
+            <a:pPr algn="ctr"/>
+            <a:r>
+              <a:rPr lang="en-US" sz="1100" dirty="0">
+                <a:latin typeface="Arial" panose="020B0604020202020204" pitchFamily="34" charset="0"/>
+                <a:cs typeface="Arial" panose="020B0604020202020204" pitchFamily="34" charset="0"/>
+              </a:rPr>
+              <a:t>Key</a:t>
+            </a:r>
+          </a:p>
+        </p:txBody>
+      </p:sp>
+      <p:sp>
+        <p:nvSpPr>
+          <p:cNvPr id="38" name="Oval 37">
+            <a:extLst>
+              <a:ext uri="{FF2B5EF4-FFF2-40B4-BE49-F238E27FC236}">
+                <a16:creationId xmlns:a16="http://schemas.microsoft.com/office/drawing/2014/main" id="{4D62BE70-7F79-0946-0611-005B207927B3}"/>
+              </a:ext>
+            </a:extLst>
+          </p:cNvPr>
+          <p:cNvSpPr/>
+          <p:nvPr/>
+        </p:nvSpPr>
+        <p:spPr>
+          <a:xfrm>
+            <a:off x="5453616" y="5446940"/>
+            <a:ext cx="253435" cy="212902"/>
+          </a:xfrm>
+          <a:prstGeom prst="ellipse">
+            <a:avLst/>
+          </a:prstGeom>
+          <a:solidFill>
+            <a:schemeClr val="tx1"/>
+          </a:solidFill>
+          <a:ln>
+            <a:solidFill>
+              <a:schemeClr val="tx1"/>
+            </a:solidFill>
+          </a:ln>
+        </p:spPr>
+        <p:style>
+          <a:lnRef idx="2">
+            <a:schemeClr val="accent1">
+              <a:shade val="50000"/>
+            </a:schemeClr>
+          </a:lnRef>
+          <a:fillRef idx="1">
+            <a:schemeClr val="accent1"/>
+          </a:fillRef>
+          <a:effectRef idx="0">
+            <a:schemeClr val="accent1"/>
+          </a:effectRef>
+          <a:fontRef idx="minor">
+            <a:schemeClr val="lt1"/>
+          </a:fontRef>
+        </p:style>
+        <p:txBody>
+          <a:bodyPr lIns="0" tIns="0" rIns="0" bIns="0" rtlCol="0" anchor="ctr"/>
+          <a:lstStyle/>
+          <a:p>
+            <a:pPr algn="ctr"/>
+            <a:r>
+              <a:rPr lang="en-US" sz="800" dirty="0">
+                <a:latin typeface="Arial" panose="020B0604020202020204" pitchFamily="34" charset="0"/>
+                <a:cs typeface="Arial" panose="020B0604020202020204" pitchFamily="34" charset="0"/>
+              </a:rPr>
+              <a:t>3.7</a:t>
+            </a:r>
+          </a:p>
+        </p:txBody>
+      </p:sp>
+      <p:pic>
+        <p:nvPicPr>
+          <p:cNvPr id="100" name="Graphic 99">
+            <a:extLst>
+              <a:ext uri="{FF2B5EF4-FFF2-40B4-BE49-F238E27FC236}">
+                <a16:creationId xmlns:a16="http://schemas.microsoft.com/office/drawing/2014/main" id="{09B9FC02-6DB1-64F6-F1FE-F7C189505576}"/>
+              </a:ext>
+            </a:extLst>
+          </p:cNvPr>
+          <p:cNvPicPr>
+            <a:picLocks noChangeAspect="1"/>
+          </p:cNvPicPr>
+          <p:nvPr/>
+        </p:nvPicPr>
+        <p:blipFill>
+          <a:blip r:embed="rId12">
+            <a:extLst>
+              <a:ext uri="{96DAC541-7B7A-43D3-8B79-37D633B846F1}">
+                <asvg:svgBlip xmlns:asvg="http://schemas.microsoft.com/office/drawing/2016/SVG/main" r:embed="rId13"/>
+              </a:ext>
+            </a:extLst>
+          </a:blip>
+          <a:stretch>
+            <a:fillRect/>
+          </a:stretch>
+        </p:blipFill>
+        <p:spPr>
+          <a:xfrm>
+            <a:off x="4430870" y="5093527"/>
+            <a:ext cx="442506" cy="391567"/>
+          </a:xfrm>
+          <a:prstGeom prst="rect">
+            <a:avLst/>
+          </a:prstGeom>
+          <a:effectLst>
+            <a:outerShdw blurRad="50800" dist="38100" dir="13500000" algn="br" rotWithShape="0">
+              <a:prstClr val="black">
+                <a:alpha val="40000"/>
+              </a:prstClr>
+            </a:outerShdw>
+          </a:effectLst>
+        </p:spPr>
+      </p:pic>
+      <p:sp>
+        <p:nvSpPr>
+          <p:cNvPr id="5" name="TextBox 4">
+            <a:extLst>
+              <a:ext uri="{FF2B5EF4-FFF2-40B4-BE49-F238E27FC236}">
+                <a16:creationId xmlns:a16="http://schemas.microsoft.com/office/drawing/2014/main" id="{F85898DF-FE06-B871-7520-928FCB7C3AD4}"/>
+              </a:ext>
+            </a:extLst>
+          </p:cNvPr>
+          <p:cNvSpPr txBox="1"/>
+          <p:nvPr/>
+        </p:nvSpPr>
+        <p:spPr>
+          <a:xfrm>
+            <a:off x="7763762" y="5093527"/>
+            <a:ext cx="1233913" cy="430887"/>
+          </a:xfrm>
+          <a:prstGeom prst="rect">
+            <a:avLst/>
+          </a:prstGeom>
+          <a:noFill/>
+        </p:spPr>
+        <p:txBody>
+          <a:bodyPr wrap="square" rtlCol="0">
+            <a:spAutoFit/>
+          </a:bodyPr>
+          <a:lstStyle/>
+          <a:p>
+            <a:pPr algn="ctr"/>
+            <a:r>
+              <a:rPr lang="en-US" sz="1100" dirty="0">
+                <a:latin typeface="Arial" panose="020B0604020202020204" pitchFamily="34" charset="0"/>
+                <a:cs typeface="Arial" panose="020B0604020202020204" pitchFamily="34" charset="0"/>
+              </a:rPr>
+              <a:t>AWS CloudFormation</a:t>
+            </a:r>
+          </a:p>
+        </p:txBody>
+      </p:sp>
+      <p:pic>
+        <p:nvPicPr>
+          <p:cNvPr id="7" name="Graphic 6">
+            <a:extLst>
+              <a:ext uri="{FF2B5EF4-FFF2-40B4-BE49-F238E27FC236}">
+                <a16:creationId xmlns:a16="http://schemas.microsoft.com/office/drawing/2014/main" id="{7F8E8395-F0FD-2459-8B0B-206B29F4EA4E}"/>
+              </a:ext>
+            </a:extLst>
+          </p:cNvPr>
+          <p:cNvPicPr>
+            <a:picLocks noChangeAspect="1"/>
+          </p:cNvPicPr>
+          <p:nvPr/>
+        </p:nvPicPr>
+        <p:blipFill>
+          <a:blip r:embed="rId14">
+            <a:extLst>
+              <a:ext uri="{96DAC541-7B7A-43D3-8B79-37D633B846F1}">
+                <asvg:svgBlip xmlns:asvg="http://schemas.microsoft.com/office/drawing/2016/SVG/main" r:embed="rId15"/>
+              </a:ext>
+            </a:extLst>
+          </a:blip>
+          <a:stretch>
+            <a:fillRect/>
+          </a:stretch>
+        </p:blipFill>
+        <p:spPr>
+          <a:xfrm>
+            <a:off x="8164129" y="4652127"/>
+            <a:ext cx="457200" cy="457200"/>
+          </a:xfrm>
+          <a:prstGeom prst="rect">
+            <a:avLst/>
+          </a:prstGeom>
+        </p:spPr>
+      </p:pic>
+      <p:sp>
+        <p:nvSpPr>
+          <p:cNvPr id="9" name="Oval 8">
+            <a:extLst>
+              <a:ext uri="{FF2B5EF4-FFF2-40B4-BE49-F238E27FC236}">
+                <a16:creationId xmlns:a16="http://schemas.microsoft.com/office/drawing/2014/main" id="{66B62D17-C47D-420A-1668-9AFCC0E27D99}"/>
+              </a:ext>
+            </a:extLst>
+          </p:cNvPr>
+          <p:cNvSpPr/>
+          <p:nvPr/>
+        </p:nvSpPr>
+        <p:spPr>
+          <a:xfrm>
+            <a:off x="8073114" y="4571038"/>
+            <a:ext cx="253435" cy="212902"/>
+          </a:xfrm>
+          <a:prstGeom prst="ellipse">
+            <a:avLst/>
+          </a:prstGeom>
+          <a:solidFill>
+            <a:schemeClr val="tx1"/>
+          </a:solidFill>
+          <a:ln>
+            <a:solidFill>
+              <a:schemeClr val="tx1"/>
+            </a:solidFill>
+          </a:ln>
+        </p:spPr>
+        <p:style>
+          <a:lnRef idx="2">
+            <a:schemeClr val="accent1">
+              <a:shade val="50000"/>
+            </a:schemeClr>
+          </a:lnRef>
+          <a:fillRef idx="1">
+            <a:schemeClr val="accent1"/>
+          </a:fillRef>
+          <a:effectRef idx="0">
+            <a:schemeClr val="accent1"/>
+          </a:effectRef>
+          <a:fontRef idx="minor">
+            <a:schemeClr val="lt1"/>
+          </a:fontRef>
+        </p:style>
+        <p:txBody>
+          <a:bodyPr lIns="0" tIns="0" rIns="0" bIns="0" rtlCol="0" anchor="ctr"/>
+          <a:lstStyle/>
+          <a:p>
+            <a:pPr algn="ctr"/>
+            <a:r>
+              <a:rPr lang="en-US" sz="800" dirty="0">
+                <a:latin typeface="Arial" panose="020B0604020202020204" pitchFamily="34" charset="0"/>
+                <a:cs typeface="Arial" panose="020B0604020202020204" pitchFamily="34" charset="0"/>
+              </a:rPr>
+              <a:t>4.1</a:t>
+            </a:r>
+          </a:p>
+        </p:txBody>
+      </p:sp>
+      <p:sp>
+        <p:nvSpPr>
+          <p:cNvPr id="22" name="TextBox 21">
+            <a:extLst>
+              <a:ext uri="{FF2B5EF4-FFF2-40B4-BE49-F238E27FC236}">
+                <a16:creationId xmlns:a16="http://schemas.microsoft.com/office/drawing/2014/main" id="{F30231AB-D545-2D74-B8FB-112A1A36655B}"/>
+              </a:ext>
+            </a:extLst>
+          </p:cNvPr>
+          <p:cNvSpPr txBox="1"/>
+          <p:nvPr/>
+        </p:nvSpPr>
+        <p:spPr>
+          <a:xfrm>
+            <a:off x="2895309" y="5055489"/>
+            <a:ext cx="1504214" cy="430887"/>
+          </a:xfrm>
+          <a:prstGeom prst="rect">
+            <a:avLst/>
+          </a:prstGeom>
+          <a:noFill/>
+        </p:spPr>
+        <p:txBody>
+          <a:bodyPr wrap="square" rtlCol="0">
+            <a:spAutoFit/>
+          </a:bodyPr>
+          <a:lstStyle/>
+          <a:p>
+            <a:pPr algn="ctr"/>
+            <a:r>
+              <a:rPr lang="en-US" sz="1100" dirty="0">
+                <a:latin typeface="Arial" panose="020B0604020202020204" pitchFamily="34" charset="0"/>
+                <a:cs typeface="Arial" panose="020B0604020202020204" pitchFamily="34" charset="0"/>
+              </a:rPr>
+              <a:t>Config </a:t>
+            </a:r>
+          </a:p>
+          <a:p>
+            <a:pPr algn="ctr"/>
+            <a:r>
+              <a:rPr lang="en-US" sz="1100" dirty="0">
+                <a:latin typeface="Arial" panose="020B0604020202020204" pitchFamily="34" charset="0"/>
+                <a:cs typeface="Arial" panose="020B0604020202020204" pitchFamily="34" charset="0"/>
+              </a:rPr>
+              <a:t>Aggregator</a:t>
+            </a:r>
+          </a:p>
+        </p:txBody>
+      </p:sp>
+      <p:pic>
+        <p:nvPicPr>
+          <p:cNvPr id="23" name="Graphic 8">
+            <a:extLst>
+              <a:ext uri="{FF2B5EF4-FFF2-40B4-BE49-F238E27FC236}">
+                <a16:creationId xmlns:a16="http://schemas.microsoft.com/office/drawing/2014/main" id="{0A4BB5EA-9044-18F9-82E4-ED3DE32C5ACC}"/>
+              </a:ext>
+            </a:extLst>
+          </p:cNvPr>
+          <p:cNvPicPr>
+            <a:picLocks noChangeAspect="1" noChangeArrowheads="1"/>
+          </p:cNvPicPr>
+          <p:nvPr/>
+        </p:nvPicPr>
+        <p:blipFill>
+          <a:blip r:embed="rId19">
+            <a:extLst>
+              <a:ext uri="{96DAC541-7B7A-43D3-8B79-37D633B846F1}">
+                <asvg:svgBlip xmlns:asvg="http://schemas.microsoft.com/office/drawing/2016/SVG/main" r:embed="rId20"/>
+              </a:ext>
+            </a:extLst>
+          </a:blip>
+          <a:srcRect/>
+          <a:stretch/>
+        </p:blipFill>
+        <p:spPr bwMode="auto">
+          <a:xfrm>
+            <a:off x="3399195" y="4604401"/>
+            <a:ext cx="447767" cy="447767"/>
+          </a:xfrm>
+          <a:prstGeom prst="rect">
+            <a:avLst/>
+          </a:prstGeom>
+          <a:noFill/>
+          <a:ln>
+            <a:noFill/>
+          </a:ln>
+          <a:extLst>
+            <a:ext uri="{909E8E84-426E-40DD-AFC4-6F175D3DCCD1}">
+              <a14:hiddenFill xmlns:a14="http://schemas.microsoft.com/office/drawing/2010/main">
+                <a:solidFill>
+                  <a:srgbClr val="FFFFFF"/>
+                </a:solidFill>
+              </a14:hiddenFill>
+            </a:ext>
+            <a:ext uri="{91240B29-F687-4F45-9708-019B960494DF}">
+              <a14:hiddenLine xmlns:a14="http://schemas.microsoft.com/office/drawing/2010/main" w="9525">
+                <a:solidFill>
+                  <a:srgbClr val="000000"/>
+                </a:solidFill>
+                <a:miter lim="800000"/>
+                <a:headEnd/>
+                <a:tailEnd/>
+              </a14:hiddenLine>
+            </a:ext>
+          </a:extLst>
+        </p:spPr>
+      </p:pic>
+      <p:sp>
+        <p:nvSpPr>
+          <p:cNvPr id="24" name="Oval 23">
+            <a:extLst>
+              <a:ext uri="{FF2B5EF4-FFF2-40B4-BE49-F238E27FC236}">
+                <a16:creationId xmlns:a16="http://schemas.microsoft.com/office/drawing/2014/main" id="{54086077-7F12-AE28-F3E7-F6B133B70894}"/>
+              </a:ext>
+            </a:extLst>
+          </p:cNvPr>
+          <p:cNvSpPr/>
+          <p:nvPr/>
+        </p:nvSpPr>
+        <p:spPr>
+          <a:xfrm>
+            <a:off x="3288724" y="4510776"/>
+            <a:ext cx="253435" cy="212902"/>
+          </a:xfrm>
+          <a:prstGeom prst="ellipse">
+            <a:avLst/>
+          </a:prstGeom>
+          <a:solidFill>
+            <a:schemeClr val="tx1"/>
+          </a:solidFill>
+          <a:ln>
+            <a:solidFill>
+              <a:schemeClr val="tx1"/>
+            </a:solidFill>
+          </a:ln>
+        </p:spPr>
+        <p:style>
+          <a:lnRef idx="2">
+            <a:schemeClr val="accent1">
+              <a:shade val="50000"/>
+            </a:schemeClr>
+          </a:lnRef>
+          <a:fillRef idx="1">
+            <a:schemeClr val="accent1"/>
+          </a:fillRef>
+          <a:effectRef idx="0">
+            <a:schemeClr val="accent1"/>
+          </a:effectRef>
+          <a:fontRef idx="minor">
+            <a:schemeClr val="lt1"/>
+          </a:fontRef>
+        </p:style>
+        <p:txBody>
+          <a:bodyPr lIns="0" tIns="0" rIns="0" bIns="0" rtlCol="0" anchor="ctr"/>
+          <a:lstStyle/>
+          <a:p>
+            <a:pPr algn="ctr"/>
+            <a:r>
+              <a:rPr lang="en-US" sz="800" dirty="0">
+                <a:latin typeface="Arial" panose="020B0604020202020204" pitchFamily="34" charset="0"/>
+                <a:cs typeface="Arial" panose="020B0604020202020204" pitchFamily="34" charset="0"/>
+              </a:rPr>
+              <a:t>3.3</a:t>
+            </a:r>
+          </a:p>
+        </p:txBody>
+      </p:sp>
+      <p:sp>
+        <p:nvSpPr>
+          <p:cNvPr id="60" name="TextBox 59">
+            <a:extLst>
+              <a:ext uri="{FF2B5EF4-FFF2-40B4-BE49-F238E27FC236}">
+                <a16:creationId xmlns:a16="http://schemas.microsoft.com/office/drawing/2014/main" id="{BE3129B1-31E0-8868-831C-1A56112DC9AE}"/>
+              </a:ext>
+            </a:extLst>
+          </p:cNvPr>
+          <p:cNvSpPr txBox="1"/>
+          <p:nvPr/>
+        </p:nvSpPr>
+        <p:spPr>
+          <a:xfrm>
+            <a:off x="1967400" y="3256130"/>
+            <a:ext cx="1103001" cy="430887"/>
+          </a:xfrm>
+          <a:prstGeom prst="rect">
+            <a:avLst/>
+          </a:prstGeom>
+          <a:noFill/>
+        </p:spPr>
+        <p:txBody>
+          <a:bodyPr wrap="square" rtlCol="0">
+            <a:spAutoFit/>
+          </a:bodyPr>
+          <a:lstStyle/>
+          <a:p>
+            <a:pPr algn="ctr"/>
+            <a:r>
+              <a:rPr lang="en-US" sz="1100" dirty="0">
+                <a:latin typeface="Arial" panose="020B0604020202020204" pitchFamily="34" charset="0"/>
+                <a:cs typeface="Arial" panose="020B0604020202020204" pitchFamily="34" charset="0"/>
+              </a:rPr>
+              <a:t>Configuration Role</a:t>
+            </a:r>
+          </a:p>
+        </p:txBody>
+      </p:sp>
+      <p:pic>
+        <p:nvPicPr>
+          <p:cNvPr id="61" name="Graphic 60">
+            <a:extLst>
+              <a:ext uri="{FF2B5EF4-FFF2-40B4-BE49-F238E27FC236}">
+                <a16:creationId xmlns:a16="http://schemas.microsoft.com/office/drawing/2014/main" id="{355BEDDA-F9C0-FCE2-AC94-510D21CA5215}"/>
+              </a:ext>
+            </a:extLst>
+          </p:cNvPr>
+          <p:cNvPicPr>
+            <a:picLocks noChangeAspect="1"/>
+          </p:cNvPicPr>
+          <p:nvPr/>
+        </p:nvPicPr>
+        <p:blipFill>
+          <a:blip r:embed="rId17">
+            <a:extLst>
+              <a:ext uri="{96DAC541-7B7A-43D3-8B79-37D633B846F1}">
+                <asvg:svgBlip xmlns:asvg="http://schemas.microsoft.com/office/drawing/2016/SVG/main" r:embed="rId18"/>
+              </a:ext>
+            </a:extLst>
+          </a:blip>
+          <a:stretch>
+            <a:fillRect/>
+          </a:stretch>
+        </p:blipFill>
+        <p:spPr>
+          <a:xfrm>
+            <a:off x="2288532" y="2888455"/>
+            <a:ext cx="469900" cy="469900"/>
+          </a:xfrm>
+          <a:prstGeom prst="rect">
+            <a:avLst/>
+          </a:prstGeom>
+        </p:spPr>
+      </p:pic>
+      <p:sp>
+        <p:nvSpPr>
+          <p:cNvPr id="62" name="Oval 61">
+            <a:extLst>
+              <a:ext uri="{FF2B5EF4-FFF2-40B4-BE49-F238E27FC236}">
+                <a16:creationId xmlns:a16="http://schemas.microsoft.com/office/drawing/2014/main" id="{84CC7098-DD0B-457D-8EC4-281A8CD36CB3}"/>
+              </a:ext>
+            </a:extLst>
+          </p:cNvPr>
+          <p:cNvSpPr/>
+          <p:nvPr/>
+        </p:nvSpPr>
+        <p:spPr>
+          <a:xfrm>
+            <a:off x="2155894" y="2854701"/>
+            <a:ext cx="253435" cy="212902"/>
+          </a:xfrm>
+          <a:prstGeom prst="ellipse">
+            <a:avLst/>
+          </a:prstGeom>
+          <a:solidFill>
+            <a:schemeClr val="tx1"/>
+          </a:solidFill>
+          <a:ln>
+            <a:solidFill>
+              <a:schemeClr val="tx1"/>
+            </a:solidFill>
+          </a:ln>
+        </p:spPr>
+        <p:style>
+          <a:lnRef idx="2">
+            <a:schemeClr val="accent1">
+              <a:shade val="50000"/>
+            </a:schemeClr>
+          </a:lnRef>
+          <a:fillRef idx="1">
+            <a:schemeClr val="accent1"/>
+          </a:fillRef>
+          <a:effectRef idx="0">
+            <a:schemeClr val="accent1"/>
+          </a:effectRef>
+          <a:fontRef idx="minor">
+            <a:schemeClr val="lt1"/>
+          </a:fontRef>
+        </p:style>
+        <p:txBody>
+          <a:bodyPr lIns="0" tIns="0" rIns="0" bIns="0" rtlCol="0" anchor="ctr"/>
+          <a:lstStyle/>
+          <a:p>
+            <a:pPr algn="ctr"/>
+            <a:r>
+              <a:rPr lang="en-US" sz="800" dirty="0">
+                <a:latin typeface="Arial" panose="020B0604020202020204" pitchFamily="34" charset="0"/>
+                <a:cs typeface="Arial" panose="020B0604020202020204" pitchFamily="34" charset="0"/>
+              </a:rPr>
+              <a:t>1.3</a:t>
+            </a:r>
+          </a:p>
+        </p:txBody>
+      </p:sp>
+      <p:cxnSp>
+        <p:nvCxnSpPr>
+          <p:cNvPr id="65" name="Straight Arrow Connector 64">
+            <a:extLst>
+              <a:ext uri="{FF2B5EF4-FFF2-40B4-BE49-F238E27FC236}">
+                <a16:creationId xmlns:a16="http://schemas.microsoft.com/office/drawing/2014/main" id="{7AE7F20E-2158-846B-17A3-5960D872E911}"/>
+              </a:ext>
+            </a:extLst>
+          </p:cNvPr>
+          <p:cNvCxnSpPr>
+            <a:cxnSpLocks/>
+          </p:cNvCxnSpPr>
+          <p:nvPr/>
+        </p:nvCxnSpPr>
+        <p:spPr>
+          <a:xfrm>
+            <a:off x="4515940" y="1228077"/>
+            <a:ext cx="463335" cy="0"/>
+          </a:xfrm>
+          <a:prstGeom prst="straightConnector1">
+            <a:avLst/>
+          </a:prstGeom>
+          <a:ln>
+            <a:tailEnd type="triangle"/>
+          </a:ln>
+        </p:spPr>
+        <p:style>
+          <a:lnRef idx="1">
+            <a:schemeClr val="dk1"/>
+          </a:lnRef>
+          <a:fillRef idx="0">
+            <a:schemeClr val="dk1"/>
+          </a:fillRef>
+          <a:effectRef idx="0">
+            <a:schemeClr val="dk1"/>
+          </a:effectRef>
+          <a:fontRef idx="minor">
+            <a:schemeClr val="tx1"/>
+          </a:fontRef>
+        </p:style>
+      </p:cxnSp>
+      <p:sp>
+        <p:nvSpPr>
+          <p:cNvPr id="71" name="Oval 70">
+            <a:extLst>
+              <a:ext uri="{FF2B5EF4-FFF2-40B4-BE49-F238E27FC236}">
+                <a16:creationId xmlns:a16="http://schemas.microsoft.com/office/drawing/2014/main" id="{02D355C9-C25E-60AC-3C12-F876AF4A19B8}"/>
+              </a:ext>
+            </a:extLst>
+          </p:cNvPr>
+          <p:cNvSpPr/>
+          <p:nvPr/>
+        </p:nvSpPr>
+        <p:spPr>
+          <a:xfrm>
+            <a:off x="8846931" y="2408332"/>
+            <a:ext cx="253435" cy="212902"/>
+          </a:xfrm>
+          <a:prstGeom prst="ellipse">
+            <a:avLst/>
+          </a:prstGeom>
+          <a:solidFill>
+            <a:schemeClr val="tx1"/>
+          </a:solidFill>
+          <a:ln>
+            <a:solidFill>
+              <a:schemeClr val="tx1"/>
+            </a:solidFill>
+          </a:ln>
+        </p:spPr>
+        <p:style>
+          <a:lnRef idx="2">
+            <a:schemeClr val="accent1">
+              <a:shade val="50000"/>
+            </a:schemeClr>
+          </a:lnRef>
+          <a:fillRef idx="1">
+            <a:schemeClr val="accent1"/>
+          </a:fillRef>
+          <a:effectRef idx="0">
+            <a:schemeClr val="accent1"/>
+          </a:effectRef>
+          <a:fontRef idx="minor">
+            <a:schemeClr val="lt1"/>
+          </a:fontRef>
+        </p:style>
+        <p:txBody>
+          <a:bodyPr lIns="0" tIns="0" rIns="0" bIns="0" rtlCol="0" anchor="ctr"/>
+          <a:lstStyle/>
+          <a:p>
+            <a:pPr algn="ctr"/>
+            <a:r>
+              <a:rPr lang="en-US" sz="800" dirty="0">
+                <a:latin typeface="Arial" panose="020B0604020202020204" pitchFamily="34" charset="0"/>
+                <a:cs typeface="Arial" panose="020B0604020202020204" pitchFamily="34" charset="0"/>
+              </a:rPr>
+              <a:t>2.3</a:t>
+            </a:r>
+          </a:p>
+        </p:txBody>
+      </p:sp>
+      <p:pic>
+        <p:nvPicPr>
+          <p:cNvPr id="72" name="Graphic 71">
+            <a:extLst>
+              <a:ext uri="{FF2B5EF4-FFF2-40B4-BE49-F238E27FC236}">
+                <a16:creationId xmlns:a16="http://schemas.microsoft.com/office/drawing/2014/main" id="{A2FCFDE6-8EA4-CF02-29A8-8562827C873E}"/>
+              </a:ext>
+            </a:extLst>
+          </p:cNvPr>
+          <p:cNvPicPr>
+            <a:picLocks noChangeAspect="1"/>
+          </p:cNvPicPr>
+          <p:nvPr/>
+        </p:nvPicPr>
+        <p:blipFill>
+          <a:blip r:embed="rId5">
+            <a:extLst>
+              <a:ext uri="{96DAC541-7B7A-43D3-8B79-37D633B846F1}">
+                <asvg:svgBlip xmlns:asvg="http://schemas.microsoft.com/office/drawing/2016/SVG/main" r:embed="rId6"/>
+              </a:ext>
+            </a:extLst>
+          </a:blip>
+          <a:stretch>
+            <a:fillRect/>
+          </a:stretch>
+        </p:blipFill>
+        <p:spPr>
+          <a:xfrm>
+            <a:off x="654509" y="3883421"/>
+            <a:ext cx="424469" cy="424469"/>
+          </a:xfrm>
+          <a:prstGeom prst="rect">
+            <a:avLst/>
+          </a:prstGeom>
+        </p:spPr>
+      </p:pic>
+      <p:pic>
+        <p:nvPicPr>
+          <p:cNvPr id="3" name="Graphic 17">
+            <a:extLst>
+              <a:ext uri="{FF2B5EF4-FFF2-40B4-BE49-F238E27FC236}">
+                <a16:creationId xmlns:a16="http://schemas.microsoft.com/office/drawing/2014/main" id="{EA99C0AD-E82C-DA26-BCE0-1783D9BFD0CC}"/>
+              </a:ext>
+            </a:extLst>
+          </p:cNvPr>
+          <p:cNvPicPr>
+            <a:picLocks noChangeAspect="1" noChangeArrowheads="1"/>
+          </p:cNvPicPr>
+          <p:nvPr/>
+        </p:nvPicPr>
+        <p:blipFill>
+          <a:blip r:embed="rId9">
+            <a:extLst>
+              <a:ext uri="{28A0092B-C50C-407E-A947-70E740481C1C}">
+                <a14:useLocalDpi xmlns:a14="http://schemas.microsoft.com/office/drawing/2010/main" val="0"/>
+              </a:ext>
+            </a:extLst>
+          </a:blip>
+          <a:srcRect/>
+          <a:stretch>
+            <a:fillRect/>
+          </a:stretch>
+        </p:blipFill>
+        <p:spPr bwMode="auto">
+          <a:xfrm>
+            <a:off x="2978487" y="1012264"/>
+            <a:ext cx="457200" cy="457200"/>
+          </a:xfrm>
+          <a:prstGeom prst="rect">
+            <a:avLst/>
+          </a:prstGeom>
+          <a:noFill/>
+          <a:ln>
+            <a:noFill/>
+          </a:ln>
+          <a:extLst>
+            <a:ext uri="{909E8E84-426E-40DD-AFC4-6F175D3DCCD1}">
+              <a14:hiddenFill xmlns:a14="http://schemas.microsoft.com/office/drawing/2010/main">
+                <a:solidFill>
+                  <a:srgbClr val="FFFFFF"/>
+                </a:solidFill>
+              </a14:hiddenFill>
+            </a:ext>
+            <a:ext uri="{91240B29-F687-4F45-9708-019B960494DF}">
+              <a14:hiddenLine xmlns:a14="http://schemas.microsoft.com/office/drawing/2010/main" w="9525">
+                <a:solidFill>
+                  <a:srgbClr val="000000"/>
+                </a:solidFill>
+                <a:miter lim="800000"/>
+                <a:headEnd/>
+                <a:tailEnd/>
+              </a14:hiddenLine>
+            </a:ext>
+          </a:extLst>
+        </p:spPr>
+      </p:pic>
+      <p:sp>
+        <p:nvSpPr>
+          <p:cNvPr id="46" name="TextBox 2">
+            <a:extLst>
+              <a:ext uri="{FF2B5EF4-FFF2-40B4-BE49-F238E27FC236}">
+                <a16:creationId xmlns:a16="http://schemas.microsoft.com/office/drawing/2014/main" id="{115D1AF1-970E-549A-00C1-EE2CB6012B61}"/>
+              </a:ext>
+            </a:extLst>
+          </p:cNvPr>
+          <p:cNvSpPr txBox="1"/>
+          <p:nvPr/>
+        </p:nvSpPr>
+        <p:spPr>
+          <a:xfrm>
+            <a:off x="2768168" y="1397431"/>
+            <a:ext cx="917042" cy="261610"/>
           </a:xfrm>
           <a:prstGeom prst="rect">
             <a:avLst/>
@@ -9267,17 +10781,59 @@
                 <a:latin typeface="Arial" panose="020B0604020202020204" pitchFamily="34" charset="0"/>
                 <a:cs typeface="Arial" panose="020B0604020202020204" pitchFamily="34" charset="0"/>
               </a:rPr>
-              <a:t>Config Topic</a:t>
-            </a:r>
-          </a:p>
-        </p:txBody>
-      </p:sp>
-      <p:sp>
-        <p:nvSpPr>
-          <p:cNvPr id="28" name="Oval 27">
-            <a:extLst>
-              <a:ext uri="{FF2B5EF4-FFF2-40B4-BE49-F238E27FC236}">
-                <a16:creationId xmlns:a16="http://schemas.microsoft.com/office/drawing/2014/main" id="{3E03BD11-1DE0-10C6-6FB8-EDAC2E6F682E}"/>
+              <a:t>SNS Topic</a:t>
+            </a:r>
+          </a:p>
+        </p:txBody>
+      </p:sp>
+      <p:cxnSp>
+        <p:nvCxnSpPr>
+          <p:cNvPr id="47" name="Straight Arrow Connector 46">
+            <a:extLst>
+              <a:ext uri="{FF2B5EF4-FFF2-40B4-BE49-F238E27FC236}">
+                <a16:creationId xmlns:a16="http://schemas.microsoft.com/office/drawing/2014/main" id="{5C88D182-910C-8DF9-F27B-11D76BE5AB6B}"/>
+              </a:ext>
+            </a:extLst>
+          </p:cNvPr>
+          <p:cNvCxnSpPr>
+            <a:cxnSpLocks/>
+          </p:cNvCxnSpPr>
+          <p:nvPr/>
+        </p:nvCxnSpPr>
+        <p:spPr>
+          <a:xfrm>
+            <a:off x="3589230" y="1609783"/>
+            <a:ext cx="331112" cy="210076"/>
+          </a:xfrm>
+          <a:prstGeom prst="straightConnector1">
+            <a:avLst/>
+          </a:prstGeom>
+          <a:ln>
+            <a:headEnd type="triangle"/>
+            <a:tailEnd type="triangle"/>
+          </a:ln>
+        </p:spPr>
+        <p:style>
+          <a:lnRef idx="1">
+            <a:schemeClr val="dk1"/>
+          </a:lnRef>
+          <a:fillRef idx="0">
+            <a:schemeClr val="dk1"/>
+          </a:fillRef>
+          <a:effectRef idx="0">
+            <a:schemeClr val="dk1"/>
+          </a:effectRef>
+          <a:fontRef idx="minor">
+            <a:schemeClr val="tx1"/>
+          </a:fontRef>
+        </p:style>
+      </p:cxnSp>
+      <p:sp>
+        <p:nvSpPr>
+          <p:cNvPr id="48" name="Oval 47">
+            <a:extLst>
+              <a:ext uri="{FF2B5EF4-FFF2-40B4-BE49-F238E27FC236}">
+                <a16:creationId xmlns:a16="http://schemas.microsoft.com/office/drawing/2014/main" id="{A1797B0A-C041-ABE9-13B6-14E89A674BE1}"/>
               </a:ext>
             </a:extLst>
           </p:cNvPr>
@@ -9286,7 +10842,7 @@
         </p:nvSpPr>
         <p:spPr>
           <a:xfrm>
-            <a:off x="2595986" y="4547283"/>
+            <a:off x="2871707" y="973468"/>
             <a:ext cx="253435" cy="212902"/>
           </a:xfrm>
           <a:prstGeom prst="ellipse">
@@ -9327,162 +10883,17 @@
                 <a:latin typeface="Arial" panose="020B0604020202020204" pitchFamily="34" charset="0"/>
                 <a:cs typeface="Arial" panose="020B0604020202020204" pitchFamily="34" charset="0"/>
               </a:rPr>
-              <a:t>3.2</a:t>
-            </a:r>
-          </a:p>
-        </p:txBody>
-      </p:sp>
-      <p:sp>
-        <p:nvSpPr>
-          <p:cNvPr id="29" name="TextBox 28">
-            <a:extLst>
-              <a:ext uri="{FF2B5EF4-FFF2-40B4-BE49-F238E27FC236}">
-                <a16:creationId xmlns:a16="http://schemas.microsoft.com/office/drawing/2014/main" id="{F441BD57-985B-3F49-99C3-BF3B9E891322}"/>
-              </a:ext>
-            </a:extLst>
-          </p:cNvPr>
-          <p:cNvSpPr txBox="1"/>
-          <p:nvPr/>
-        </p:nvSpPr>
-        <p:spPr>
-          <a:xfrm>
-            <a:off x="2202298" y="5975148"/>
-            <a:ext cx="1405120" cy="430887"/>
-          </a:xfrm>
-          <a:prstGeom prst="rect">
-            <a:avLst/>
-          </a:prstGeom>
-          <a:noFill/>
-        </p:spPr>
-        <p:txBody>
-          <a:bodyPr wrap="square" rtlCol="0">
-            <a:spAutoFit/>
-          </a:bodyPr>
-          <a:lstStyle/>
-          <a:p>
-            <a:pPr algn="ctr"/>
-            <a:r>
-              <a:rPr lang="en-US" sz="1100" dirty="0">
-                <a:latin typeface="Arial" panose="020B0604020202020204" pitchFamily="34" charset="0"/>
-                <a:cs typeface="Arial" panose="020B0604020202020204" pitchFamily="34" charset="0"/>
-              </a:rPr>
-              <a:t>Config </a:t>
-            </a:r>
-          </a:p>
-          <a:p>
-            <a:pPr algn="ctr"/>
-            <a:r>
-              <a:rPr lang="en-US" sz="1100" dirty="0">
-                <a:latin typeface="Arial" panose="020B0604020202020204" pitchFamily="34" charset="0"/>
-                <a:cs typeface="Arial" panose="020B0604020202020204" pitchFamily="34" charset="0"/>
-              </a:rPr>
-              <a:t>Aggregator Role</a:t>
+              <a:t>1.6</a:t>
             </a:r>
           </a:p>
         </p:txBody>
       </p:sp>
       <p:pic>
         <p:nvPicPr>
-          <p:cNvPr id="30" name="Graphic 29">
-            <a:extLst>
-              <a:ext uri="{FF2B5EF4-FFF2-40B4-BE49-F238E27FC236}">
-                <a16:creationId xmlns:a16="http://schemas.microsoft.com/office/drawing/2014/main" id="{EC7991A4-D5C4-088B-091C-5C2EC8F034B9}"/>
-              </a:ext>
-            </a:extLst>
-          </p:cNvPr>
-          <p:cNvPicPr>
-            <a:picLocks noChangeAspect="1"/>
-          </p:cNvPicPr>
-          <p:nvPr/>
-        </p:nvPicPr>
-        <p:blipFill>
-          <a:blip r:embed="rId17">
-            <a:extLst>
-              <a:ext uri="{96DAC541-7B7A-43D3-8B79-37D633B846F1}">
-                <asvg:svgBlip xmlns:asvg="http://schemas.microsoft.com/office/drawing/2016/SVG/main" r:embed="rId18"/>
-              </a:ext>
-            </a:extLst>
-          </a:blip>
-          <a:stretch>
-            <a:fillRect/>
-          </a:stretch>
-        </p:blipFill>
-        <p:spPr>
-          <a:xfrm>
-            <a:off x="2649809" y="5665384"/>
-            <a:ext cx="469900" cy="469900"/>
-          </a:xfrm>
-          <a:prstGeom prst="rect">
-            <a:avLst/>
-          </a:prstGeom>
-        </p:spPr>
-      </p:pic>
-      <p:sp>
-        <p:nvSpPr>
-          <p:cNvPr id="31" name="Oval 30">
-            <a:extLst>
-              <a:ext uri="{FF2B5EF4-FFF2-40B4-BE49-F238E27FC236}">
-                <a16:creationId xmlns:a16="http://schemas.microsoft.com/office/drawing/2014/main" id="{71712401-EE44-D9B6-6171-3CB782CF2E00}"/>
-              </a:ext>
-            </a:extLst>
-          </p:cNvPr>
-          <p:cNvSpPr/>
-          <p:nvPr/>
-        </p:nvSpPr>
-        <p:spPr>
-          <a:xfrm>
-            <a:off x="2587881" y="5543327"/>
-            <a:ext cx="253435" cy="212902"/>
-          </a:xfrm>
-          <a:prstGeom prst="ellipse">
-            <a:avLst/>
-          </a:prstGeom>
-          <a:solidFill>
-            <a:schemeClr val="tx1"/>
-          </a:solidFill>
-          <a:ln>
-            <a:solidFill>
-              <a:schemeClr val="tx1"/>
-            </a:solidFill>
-          </a:ln>
-        </p:spPr>
-        <p:style>
-          <a:lnRef idx="2">
-            <a:schemeClr val="accent1">
-              <a:shade val="50000"/>
-            </a:schemeClr>
-          </a:lnRef>
-          <a:fillRef idx="1">
-            <a:schemeClr val="accent1"/>
-          </a:fillRef>
-          <a:effectRef idx="0">
-            <a:schemeClr val="accent1"/>
-          </a:effectRef>
-          <a:fontRef idx="minor">
-            <a:schemeClr val="lt1"/>
-          </a:fontRef>
-        </p:style>
-        <p:txBody>
-          <a:bodyPr lIns="0" tIns="0" rIns="0" bIns="0" rtlCol="0" anchor="ctr"/>
-          <a:lstStyle/>
-          <a:p>
-            <a:pPr algn="ctr"/>
-            <a:r>
-              <a:rPr lang="en-US" sz="800" dirty="0">
-                <a:latin typeface="Arial" panose="020B0604020202020204" pitchFamily="34" charset="0"/>
-                <a:cs typeface="Arial" panose="020B0604020202020204" pitchFamily="34" charset="0"/>
-              </a:rPr>
-              <a:t>3.5</a:t>
-            </a:r>
-          </a:p>
-        </p:txBody>
-      </p:sp>
-      <p:pic>
-        <p:nvPicPr>
-          <p:cNvPr id="32" name="Graphic 7">
-            <a:extLst>
-              <a:ext uri="{FF2B5EF4-FFF2-40B4-BE49-F238E27FC236}">
-                <a16:creationId xmlns:a16="http://schemas.microsoft.com/office/drawing/2014/main" id="{285D0C81-7FE5-E018-1499-16DDA2CA65A1}"/>
+          <p:cNvPr id="26" name="Graphic 17">
+            <a:extLst>
+              <a:ext uri="{FF2B5EF4-FFF2-40B4-BE49-F238E27FC236}">
+                <a16:creationId xmlns:a16="http://schemas.microsoft.com/office/drawing/2014/main" id="{7564EB38-E6C9-BEA3-06C8-2CA7A178281D}"/>
               </a:ext>
             </a:extLst>
           </p:cNvPr>
@@ -9492,7 +10903,7 @@
           <p:nvPr/>
         </p:nvPicPr>
         <p:blipFill>
-          <a:blip r:embed="rId22">
+          <a:blip r:embed="rId9">
             <a:extLst>
               <a:ext uri="{28A0092B-C50C-407E-A947-70E740481C1C}">
                 <a14:useLocalDpi xmlns:a14="http://schemas.microsoft.com/office/drawing/2010/main" val="0"/>
@@ -9506,8 +10917,8 @@
         </p:blipFill>
         <p:spPr bwMode="auto">
           <a:xfrm>
-            <a:off x="3898444" y="4623896"/>
-            <a:ext cx="398722" cy="398722"/>
+            <a:off x="4746191" y="5486401"/>
+            <a:ext cx="457200" cy="457200"/>
           </a:xfrm>
           <a:prstGeom prst="rect">
             <a:avLst/>
@@ -9539,10 +10950,10 @@
       </p:pic>
       <p:sp>
         <p:nvSpPr>
-          <p:cNvPr id="40" name="TextBox 39">
-            <a:extLst>
-              <a:ext uri="{FF2B5EF4-FFF2-40B4-BE49-F238E27FC236}">
-                <a16:creationId xmlns:a16="http://schemas.microsoft.com/office/drawing/2014/main" id="{9036CCF1-19D8-E915-FD29-2D54271D0B79}"/>
+          <p:cNvPr id="27" name="TextBox 2">
+            <a:extLst>
+              <a:ext uri="{FF2B5EF4-FFF2-40B4-BE49-F238E27FC236}">
+                <a16:creationId xmlns:a16="http://schemas.microsoft.com/office/drawing/2014/main" id="{869D045B-78C3-F872-E3CD-EF106730F8EF}"/>
               </a:ext>
             </a:extLst>
           </p:cNvPr>
@@ -9551,19 +10962,95 @@
         </p:nvSpPr>
         <p:spPr>
           <a:xfrm>
-            <a:off x="3554370" y="5068023"/>
-            <a:ext cx="1115962" cy="430887"/>
+            <a:off x="4317615" y="5910967"/>
+            <a:ext cx="1273984" cy="261610"/>
           </a:xfrm>
           <a:prstGeom prst="rect">
             <a:avLst/>
           </a:prstGeom>
           <a:noFill/>
         </p:spPr>
+        <p:style>
+          <a:lnRef idx="0">
+            <a:scrgbClr r="0" g="0" b="0"/>
+          </a:lnRef>
+          <a:fillRef idx="0">
+            <a:scrgbClr r="0" g="0" b="0"/>
+          </a:fillRef>
+          <a:effectRef idx="0">
+            <a:scrgbClr r="0" g="0" b="0"/>
+          </a:effectRef>
+          <a:fontRef idx="major"/>
+        </p:style>
         <p:txBody>
           <a:bodyPr wrap="square" rtlCol="0">
             <a:spAutoFit/>
           </a:bodyPr>
-          <a:lstStyle/>
+          <a:lstStyle>
+            <a:lvl1pPr>
+              <a:defRPr>
+                <a:latin typeface="+mj-lt"/>
+                <a:ea typeface="+mj-ea"/>
+                <a:cs typeface="+mj-cs"/>
+              </a:defRPr>
+            </a:lvl1pPr>
+            <a:lvl2pPr>
+              <a:defRPr>
+                <a:latin typeface="+mj-lt"/>
+                <a:ea typeface="+mj-ea"/>
+                <a:cs typeface="+mj-cs"/>
+              </a:defRPr>
+            </a:lvl2pPr>
+            <a:lvl3pPr>
+              <a:defRPr>
+                <a:latin typeface="+mj-lt"/>
+                <a:ea typeface="+mj-ea"/>
+                <a:cs typeface="+mj-cs"/>
+              </a:defRPr>
+            </a:lvl3pPr>
+            <a:lvl4pPr>
+              <a:defRPr>
+                <a:latin typeface="+mj-lt"/>
+                <a:ea typeface="+mj-ea"/>
+                <a:cs typeface="+mj-cs"/>
+              </a:defRPr>
+            </a:lvl4pPr>
+            <a:lvl5pPr>
+              <a:defRPr>
+                <a:latin typeface="+mj-lt"/>
+                <a:ea typeface="+mj-ea"/>
+                <a:cs typeface="+mj-cs"/>
+              </a:defRPr>
+            </a:lvl5pPr>
+            <a:lvl6pPr>
+              <a:defRPr>
+                <a:latin typeface="+mj-lt"/>
+                <a:ea typeface="+mj-ea"/>
+                <a:cs typeface="+mj-cs"/>
+              </a:defRPr>
+            </a:lvl6pPr>
+            <a:lvl7pPr>
+              <a:defRPr>
+                <a:latin typeface="+mj-lt"/>
+                <a:ea typeface="+mj-ea"/>
+                <a:cs typeface="+mj-cs"/>
+              </a:defRPr>
+            </a:lvl7pPr>
+            <a:lvl8pPr>
+              <a:defRPr>
+                <a:latin typeface="+mj-lt"/>
+                <a:ea typeface="+mj-ea"/>
+                <a:cs typeface="+mj-cs"/>
+              </a:defRPr>
+            </a:lvl8pPr>
+            <a:lvl9pPr>
+              <a:defRPr>
+                <a:latin typeface="+mj-lt"/>
+                <a:ea typeface="+mj-ea"/>
+                <a:cs typeface="+mj-cs"/>
+              </a:defRPr>
+            </a:lvl9pPr>
+          </a:lstStyle>
           <a:p>
             <a:pPr algn="ctr"/>
             <a:r>
@@ -9571,17 +11058,17 @@
                 <a:latin typeface="Arial" panose="020B0604020202020204" pitchFamily="34" charset="0"/>
                 <a:cs typeface="Arial" panose="020B0604020202020204" pitchFamily="34" charset="0"/>
               </a:rPr>
-              <a:t>Delivery KMS Key</a:t>
-            </a:r>
-          </a:p>
-        </p:txBody>
-      </p:sp>
-      <p:sp>
-        <p:nvSpPr>
-          <p:cNvPr id="43" name="Oval 42">
-            <a:extLst>
-              <a:ext uri="{FF2B5EF4-FFF2-40B4-BE49-F238E27FC236}">
-                <a16:creationId xmlns:a16="http://schemas.microsoft.com/office/drawing/2014/main" id="{53D48C63-48F3-8838-3DEE-58DA4DA1F93F}"/>
+              <a:t>Config Topic</a:t>
+            </a:r>
+          </a:p>
+        </p:txBody>
+      </p:sp>
+      <p:sp>
+        <p:nvSpPr>
+          <p:cNvPr id="28" name="Oval 27">
+            <a:extLst>
+              <a:ext uri="{FF2B5EF4-FFF2-40B4-BE49-F238E27FC236}">
+                <a16:creationId xmlns:a16="http://schemas.microsoft.com/office/drawing/2014/main" id="{3E03BD11-1DE0-10C6-6FB8-EDAC2E6F682E}"/>
               </a:ext>
             </a:extLst>
           </p:cNvPr>
@@ -9590,7 +11077,7 @@
         </p:nvSpPr>
         <p:spPr>
           <a:xfrm>
-            <a:off x="3764777" y="4541201"/>
+            <a:off x="4629128" y="5422861"/>
             <a:ext cx="253435" cy="212902"/>
           </a:xfrm>
           <a:prstGeom prst="ellipse">
@@ -9631,1221 +11118,11 @@
                 <a:latin typeface="Arial" panose="020B0604020202020204" pitchFamily="34" charset="0"/>
                 <a:cs typeface="Arial" panose="020B0604020202020204" pitchFamily="34" charset="0"/>
               </a:rPr>
-              <a:t>3.3</a:t>
-            </a:r>
-          </a:p>
-        </p:txBody>
-      </p:sp>
-      <p:sp>
-        <p:nvSpPr>
-          <p:cNvPr id="44" name="TextBox 43">
-            <a:extLst>
-              <a:ext uri="{FF2B5EF4-FFF2-40B4-BE49-F238E27FC236}">
-                <a16:creationId xmlns:a16="http://schemas.microsoft.com/office/drawing/2014/main" id="{EFAE6A75-3526-ABBF-1A4A-28677634242C}"/>
-              </a:ext>
-            </a:extLst>
-          </p:cNvPr>
-          <p:cNvSpPr txBox="1"/>
-          <p:nvPr/>
-        </p:nvSpPr>
-        <p:spPr>
-          <a:xfrm>
-            <a:off x="8633467" y="2875526"/>
-            <a:ext cx="1103001" cy="430887"/>
-          </a:xfrm>
-          <a:prstGeom prst="rect">
-            <a:avLst/>
-          </a:prstGeom>
-          <a:noFill/>
-        </p:spPr>
-        <p:txBody>
-          <a:bodyPr wrap="square" rtlCol="0">
-            <a:spAutoFit/>
-          </a:bodyPr>
-          <a:lstStyle/>
-          <a:p>
-            <a:pPr algn="ctr"/>
-            <a:r>
-              <a:rPr lang="en-US" sz="1100" dirty="0">
-                <a:latin typeface="Arial" panose="020B0604020202020204" pitchFamily="34" charset="0"/>
-                <a:cs typeface="Arial" panose="020B0604020202020204" pitchFamily="34" charset="0"/>
-              </a:rPr>
-              <a:t>Configuration Role</a:t>
-            </a:r>
-          </a:p>
-        </p:txBody>
-      </p:sp>
-      <p:pic>
-        <p:nvPicPr>
-          <p:cNvPr id="45" name="Graphic 44">
-            <a:extLst>
-              <a:ext uri="{FF2B5EF4-FFF2-40B4-BE49-F238E27FC236}">
-                <a16:creationId xmlns:a16="http://schemas.microsoft.com/office/drawing/2014/main" id="{C28EE8F8-227B-0272-04A5-504C1E35E717}"/>
-              </a:ext>
-            </a:extLst>
-          </p:cNvPr>
-          <p:cNvPicPr>
-            <a:picLocks noChangeAspect="1"/>
-          </p:cNvPicPr>
-          <p:nvPr/>
-        </p:nvPicPr>
-        <p:blipFill>
-          <a:blip r:embed="rId17">
-            <a:extLst>
-              <a:ext uri="{96DAC541-7B7A-43D3-8B79-37D633B846F1}">
-                <asvg:svgBlip xmlns:asvg="http://schemas.microsoft.com/office/drawing/2016/SVG/main" r:embed="rId18"/>
-              </a:ext>
-            </a:extLst>
-          </a:blip>
-          <a:stretch>
-            <a:fillRect/>
-          </a:stretch>
-        </p:blipFill>
-        <p:spPr>
-          <a:xfrm>
-            <a:off x="8915394" y="2519662"/>
-            <a:ext cx="469900" cy="469900"/>
-          </a:xfrm>
-          <a:prstGeom prst="rect">
-            <a:avLst/>
-          </a:prstGeom>
-        </p:spPr>
-      </p:pic>
-      <p:sp>
-        <p:nvSpPr>
-          <p:cNvPr id="170" name="Oval 169">
-            <a:extLst>
-              <a:ext uri="{FF2B5EF4-FFF2-40B4-BE49-F238E27FC236}">
-                <a16:creationId xmlns:a16="http://schemas.microsoft.com/office/drawing/2014/main" id="{97797EDC-C96B-4205-9EA5-4896D4E19CC8}"/>
-              </a:ext>
-            </a:extLst>
-          </p:cNvPr>
-          <p:cNvSpPr/>
-          <p:nvPr/>
-        </p:nvSpPr>
-        <p:spPr>
-          <a:xfrm>
-            <a:off x="2851114" y="1843129"/>
-            <a:ext cx="253435" cy="212902"/>
-          </a:xfrm>
-          <a:prstGeom prst="ellipse">
-            <a:avLst/>
-          </a:prstGeom>
-          <a:solidFill>
-            <a:schemeClr val="tx1"/>
-          </a:solidFill>
-          <a:ln>
-            <a:solidFill>
-              <a:schemeClr val="tx1"/>
-            </a:solidFill>
-          </a:ln>
-        </p:spPr>
-        <p:style>
-          <a:lnRef idx="2">
-            <a:schemeClr val="accent1">
-              <a:shade val="50000"/>
-            </a:schemeClr>
-          </a:lnRef>
-          <a:fillRef idx="1">
-            <a:schemeClr val="accent1"/>
-          </a:fillRef>
-          <a:effectRef idx="0">
-            <a:schemeClr val="accent1"/>
-          </a:effectRef>
-          <a:fontRef idx="minor">
-            <a:schemeClr val="lt1"/>
-          </a:fontRef>
-        </p:style>
-        <p:txBody>
-          <a:bodyPr lIns="0" tIns="0" rIns="0" bIns="0" rtlCol="0" anchor="ctr"/>
-          <a:lstStyle/>
-          <a:p>
-            <a:pPr algn="ctr"/>
-            <a:r>
-              <a:rPr lang="en-US" sz="800" dirty="0">
-                <a:latin typeface="Arial" panose="020B0604020202020204" pitchFamily="34" charset="0"/>
-                <a:cs typeface="Arial" panose="020B0604020202020204" pitchFamily="34" charset="0"/>
-              </a:rPr>
-              <a:t>1.8</a:t>
-            </a:r>
-          </a:p>
-        </p:txBody>
-      </p:sp>
-      <p:pic>
-        <p:nvPicPr>
-          <p:cNvPr id="2" name="Graphic 1">
-            <a:extLst>
-              <a:ext uri="{FF2B5EF4-FFF2-40B4-BE49-F238E27FC236}">
-                <a16:creationId xmlns:a16="http://schemas.microsoft.com/office/drawing/2014/main" id="{A85F3AAE-E32D-A9FD-BF13-A31E332CC209}"/>
-              </a:ext>
-            </a:extLst>
-          </p:cNvPr>
-          <p:cNvPicPr>
-            <a:picLocks noChangeAspect="1"/>
-          </p:cNvPicPr>
-          <p:nvPr/>
-        </p:nvPicPr>
-        <p:blipFill>
-          <a:blip r:embed="rId12">
-            <a:extLst>
-              <a:ext uri="{96DAC541-7B7A-43D3-8B79-37D633B846F1}">
-                <asvg:svgBlip xmlns:asvg="http://schemas.microsoft.com/office/drawing/2016/SVG/main" r:embed="rId13"/>
-              </a:ext>
-            </a:extLst>
-          </a:blip>
-          <a:stretch>
-            <a:fillRect/>
-          </a:stretch>
-        </p:blipFill>
-        <p:spPr>
-          <a:xfrm>
-            <a:off x="4807674" y="4786924"/>
-            <a:ext cx="442506" cy="391567"/>
-          </a:xfrm>
-          <a:prstGeom prst="rect">
-            <a:avLst/>
-          </a:prstGeom>
-          <a:effectLst>
-            <a:outerShdw blurRad="50800" dist="38100" dir="13500000" algn="br" rotWithShape="0">
-              <a:prstClr val="black">
-                <a:alpha val="40000"/>
-              </a:prstClr>
-            </a:outerShdw>
-          </a:effectLst>
-        </p:spPr>
-      </p:pic>
-      <p:sp>
-        <p:nvSpPr>
-          <p:cNvPr id="99" name="Rectangle 98">
-            <a:extLst>
-              <a:ext uri="{FF2B5EF4-FFF2-40B4-BE49-F238E27FC236}">
-                <a16:creationId xmlns:a16="http://schemas.microsoft.com/office/drawing/2014/main" id="{C03B0D71-46A9-CAB8-23CA-03441DD94C5D}"/>
-              </a:ext>
-            </a:extLst>
-          </p:cNvPr>
-          <p:cNvSpPr/>
-          <p:nvPr/>
-        </p:nvSpPr>
-        <p:spPr>
-          <a:xfrm>
-            <a:off x="4940408" y="5097937"/>
-            <a:ext cx="1945375" cy="1211596"/>
-          </a:xfrm>
-          <a:prstGeom prst="rect">
-            <a:avLst/>
-          </a:prstGeom>
-          <a:solidFill>
-            <a:schemeClr val="bg1"/>
-          </a:solidFill>
-          <a:ln w="12700">
-            <a:solidFill>
-              <a:srgbClr val="5B9CD5"/>
-            </a:solidFill>
-            <a:prstDash val="sysDash"/>
-          </a:ln>
-          <a:effectLst>
-            <a:outerShdw blurRad="50800" dist="38100" dir="13500000" algn="br" rotWithShape="0">
-              <a:prstClr val="black">
-                <a:alpha val="40000"/>
-              </a:prstClr>
-            </a:outerShdw>
-          </a:effectLst>
-        </p:spPr>
-        <p:style>
-          <a:lnRef idx="2">
-            <a:schemeClr val="accent1">
-              <a:shade val="50000"/>
-            </a:schemeClr>
-          </a:lnRef>
-          <a:fillRef idx="1">
-            <a:schemeClr val="accent1"/>
-          </a:fillRef>
-          <a:effectRef idx="0">
-            <a:schemeClr val="accent1"/>
-          </a:effectRef>
-          <a:fontRef idx="minor">
-            <a:schemeClr val="lt1"/>
-          </a:fontRef>
-        </p:style>
-        <p:txBody>
-          <a:bodyPr lIns="502920" tIns="91440"/>
-          <a:lstStyle/>
-          <a:p>
-            <a:pPr eaLnBrk="1" fontAlgn="auto" hangingPunct="1">
-              <a:spcBef>
-                <a:spcPts val="0"/>
-              </a:spcBef>
-              <a:spcAft>
-                <a:spcPts val="0"/>
-              </a:spcAft>
-              <a:defRPr/>
-            </a:pPr>
-            <a:r>
-              <a:rPr lang="en-US" sz="1200" dirty="0">
-                <a:solidFill>
-                  <a:srgbClr val="5B9CD5"/>
-                </a:solidFill>
-                <a:latin typeface="Arial" panose="020B0604020202020204" pitchFamily="34" charset="0"/>
-                <a:cs typeface="Arial" panose="020B0604020202020204" pitchFamily="34" charset="0"/>
-              </a:rPr>
-              <a:t>Region n</a:t>
-            </a:r>
-          </a:p>
-        </p:txBody>
-      </p:sp>
-      <p:sp>
-        <p:nvSpPr>
-          <p:cNvPr id="101" name="TextBox 100">
-            <a:extLst>
-              <a:ext uri="{FF2B5EF4-FFF2-40B4-BE49-F238E27FC236}">
-                <a16:creationId xmlns:a16="http://schemas.microsoft.com/office/drawing/2014/main" id="{A74ADE8E-4897-0A9C-D8A6-B3A0F7DEDAFF}"/>
-              </a:ext>
-            </a:extLst>
-          </p:cNvPr>
-          <p:cNvSpPr txBox="1"/>
-          <p:nvPr/>
-        </p:nvSpPr>
-        <p:spPr>
-          <a:xfrm>
-            <a:off x="5719603" y="5878646"/>
-            <a:ext cx="1504214" cy="430887"/>
-          </a:xfrm>
-          <a:prstGeom prst="rect">
-            <a:avLst/>
-          </a:prstGeom>
-          <a:noFill/>
-        </p:spPr>
-        <p:txBody>
-          <a:bodyPr wrap="square" rtlCol="0">
-            <a:spAutoFit/>
-          </a:bodyPr>
-          <a:lstStyle/>
-          <a:p>
-            <a:pPr algn="ctr"/>
-            <a:r>
-              <a:rPr lang="en-US" sz="1100" dirty="0">
-                <a:latin typeface="Arial" panose="020B0604020202020204" pitchFamily="34" charset="0"/>
-                <a:cs typeface="Arial" panose="020B0604020202020204" pitchFamily="34" charset="0"/>
-              </a:rPr>
-              <a:t>AWS </a:t>
-            </a:r>
-          </a:p>
-          <a:p>
-            <a:pPr algn="ctr"/>
-            <a:r>
-              <a:rPr lang="en-US" sz="1100" dirty="0">
-                <a:latin typeface="Arial" panose="020B0604020202020204" pitchFamily="34" charset="0"/>
-                <a:cs typeface="Arial" panose="020B0604020202020204" pitchFamily="34" charset="0"/>
-              </a:rPr>
-              <a:t>Config </a:t>
-            </a:r>
-          </a:p>
-        </p:txBody>
-      </p:sp>
-      <p:pic>
-        <p:nvPicPr>
-          <p:cNvPr id="25" name="Graphic 8">
-            <a:extLst>
-              <a:ext uri="{FF2B5EF4-FFF2-40B4-BE49-F238E27FC236}">
-                <a16:creationId xmlns:a16="http://schemas.microsoft.com/office/drawing/2014/main" id="{B3A940F9-11E8-BBC7-D543-93975E21C63D}"/>
-              </a:ext>
-            </a:extLst>
-          </p:cNvPr>
-          <p:cNvPicPr>
-            <a:picLocks noChangeAspect="1" noChangeArrowheads="1"/>
-          </p:cNvPicPr>
-          <p:nvPr/>
-        </p:nvPicPr>
-        <p:blipFill>
-          <a:blip r:embed="rId19">
-            <a:extLst>
-              <a:ext uri="{96DAC541-7B7A-43D3-8B79-37D633B846F1}">
-                <asvg:svgBlip xmlns:asvg="http://schemas.microsoft.com/office/drawing/2016/SVG/main" r:embed="rId20"/>
-              </a:ext>
-            </a:extLst>
-          </a:blip>
-          <a:srcRect/>
-          <a:stretch/>
-        </p:blipFill>
-        <p:spPr bwMode="auto">
-          <a:xfrm>
-            <a:off x="6231555" y="5475607"/>
-            <a:ext cx="458847" cy="458847"/>
-          </a:xfrm>
-          <a:prstGeom prst="rect">
-            <a:avLst/>
-          </a:prstGeom>
-          <a:noFill/>
-          <a:ln>
-            <a:noFill/>
-          </a:ln>
-          <a:extLst>
-            <a:ext uri="{909E8E84-426E-40DD-AFC4-6F175D3DCCD1}">
-              <a14:hiddenFill xmlns:a14="http://schemas.microsoft.com/office/drawing/2010/main">
-                <a:solidFill>
-                  <a:srgbClr val="FFFFFF"/>
-                </a:solidFill>
-              </a14:hiddenFill>
-            </a:ext>
-            <a:ext uri="{91240B29-F687-4F45-9708-019B960494DF}">
-              <a14:hiddenLine xmlns:a14="http://schemas.microsoft.com/office/drawing/2010/main" w="9525">
-                <a:solidFill>
-                  <a:srgbClr val="000000"/>
-                </a:solidFill>
-                <a:miter lim="800000"/>
-                <a:headEnd/>
-                <a:tailEnd/>
-              </a14:hiddenLine>
-            </a:ext>
-          </a:extLst>
-        </p:spPr>
-      </p:pic>
-      <p:sp>
-        <p:nvSpPr>
-          <p:cNvPr id="103" name="Oval 102">
-            <a:extLst>
-              <a:ext uri="{FF2B5EF4-FFF2-40B4-BE49-F238E27FC236}">
-                <a16:creationId xmlns:a16="http://schemas.microsoft.com/office/drawing/2014/main" id="{D000C133-7003-8DB2-4FC0-1B41AED12236}"/>
-              </a:ext>
-            </a:extLst>
-          </p:cNvPr>
-          <p:cNvSpPr/>
-          <p:nvPr/>
-        </p:nvSpPr>
-        <p:spPr>
-          <a:xfrm>
-            <a:off x="6101827" y="5387239"/>
-            <a:ext cx="253435" cy="212902"/>
-          </a:xfrm>
-          <a:prstGeom prst="ellipse">
-            <a:avLst/>
-          </a:prstGeom>
-          <a:solidFill>
-            <a:schemeClr val="tx1"/>
-          </a:solidFill>
-          <a:ln>
-            <a:solidFill>
-              <a:schemeClr val="tx1"/>
-            </a:solidFill>
-          </a:ln>
-        </p:spPr>
-        <p:style>
-          <a:lnRef idx="2">
-            <a:schemeClr val="accent1">
-              <a:shade val="50000"/>
-            </a:schemeClr>
-          </a:lnRef>
-          <a:fillRef idx="1">
-            <a:schemeClr val="accent1"/>
-          </a:fillRef>
-          <a:effectRef idx="0">
-            <a:schemeClr val="accent1"/>
-          </a:effectRef>
-          <a:fontRef idx="minor">
-            <a:schemeClr val="lt1"/>
-          </a:fontRef>
-        </p:style>
-        <p:txBody>
-          <a:bodyPr lIns="0" tIns="0" rIns="0" bIns="0" rtlCol="0" anchor="ctr"/>
-          <a:lstStyle/>
-          <a:p>
-            <a:pPr algn="ctr"/>
-            <a:r>
-              <a:rPr lang="en-US" sz="800" dirty="0">
-                <a:latin typeface="Arial" panose="020B0604020202020204" pitchFamily="34" charset="0"/>
-                <a:cs typeface="Arial" panose="020B0604020202020204" pitchFamily="34" charset="0"/>
-              </a:rPr>
-              <a:t>3.8</a:t>
-            </a:r>
-          </a:p>
-        </p:txBody>
-      </p:sp>
-      <p:pic>
-        <p:nvPicPr>
-          <p:cNvPr id="36" name="Graphic 7">
-            <a:extLst>
-              <a:ext uri="{FF2B5EF4-FFF2-40B4-BE49-F238E27FC236}">
-                <a16:creationId xmlns:a16="http://schemas.microsoft.com/office/drawing/2014/main" id="{30F64005-F015-BF94-01DA-63D7C4A4406F}"/>
-              </a:ext>
-            </a:extLst>
-          </p:cNvPr>
-          <p:cNvPicPr>
-            <a:picLocks noChangeAspect="1" noChangeArrowheads="1"/>
-          </p:cNvPicPr>
-          <p:nvPr/>
-        </p:nvPicPr>
-        <p:blipFill>
-          <a:blip r:embed="rId22">
-            <a:extLst>
-              <a:ext uri="{28A0092B-C50C-407E-A947-70E740481C1C}">
-                <a14:useLocalDpi xmlns:a14="http://schemas.microsoft.com/office/drawing/2010/main" val="0"/>
-              </a:ext>
-            </a:extLst>
-          </a:blip>
-          <a:srcRect/>
-          <a:stretch>
-            <a:fillRect/>
-          </a:stretch>
-        </p:blipFill>
-        <p:spPr bwMode="auto">
-          <a:xfrm>
-            <a:off x="5499212" y="5466538"/>
-            <a:ext cx="450663" cy="450663"/>
-          </a:xfrm>
-          <a:prstGeom prst="rect">
-            <a:avLst/>
-          </a:prstGeom>
-          <a:noFill/>
-          <a:ln>
-            <a:noFill/>
-          </a:ln>
-          <a:extLst>
-            <a:ext uri="{909E8E84-426E-40DD-AFC4-6F175D3DCCD1}">
-              <a14:hiddenFill xmlns:a14="http://schemas.microsoft.com/office/drawing/2010/main">
-                <a:solidFill>
-                  <a:srgbClr val="FFFFFF"/>
-                </a:solidFill>
-              </a14:hiddenFill>
-            </a:ext>
-            <a:ext uri="{91240B29-F687-4F45-9708-019B960494DF}">
-              <a14:hiddenLine xmlns:a14="http://schemas.microsoft.com/office/drawing/2010/main" w="9525">
-                <a:solidFill>
-                  <a:srgbClr val="000000"/>
-                </a:solidFill>
-                <a:miter lim="800000"/>
-                <a:headEnd/>
-                <a:tailEnd/>
-              </a14:hiddenLine>
-            </a:ext>
-          </a:extLst>
-        </p:spPr>
-      </p:pic>
-      <p:sp>
-        <p:nvSpPr>
-          <p:cNvPr id="37" name="TextBox 36">
-            <a:extLst>
-              <a:ext uri="{FF2B5EF4-FFF2-40B4-BE49-F238E27FC236}">
-                <a16:creationId xmlns:a16="http://schemas.microsoft.com/office/drawing/2014/main" id="{77098F96-AD47-76CF-7896-FA55D5941344}"/>
-              </a:ext>
-            </a:extLst>
-          </p:cNvPr>
-          <p:cNvSpPr txBox="1"/>
-          <p:nvPr/>
-        </p:nvSpPr>
-        <p:spPr>
-          <a:xfrm>
-            <a:off x="5161622" y="5878646"/>
-            <a:ext cx="1115962" cy="430887"/>
-          </a:xfrm>
-          <a:prstGeom prst="rect">
-            <a:avLst/>
-          </a:prstGeom>
-          <a:noFill/>
-        </p:spPr>
-        <p:txBody>
-          <a:bodyPr wrap="square" rtlCol="0">
-            <a:spAutoFit/>
-          </a:bodyPr>
-          <a:lstStyle/>
-          <a:p>
-            <a:pPr algn="ctr"/>
-            <a:r>
-              <a:rPr lang="en-US" sz="1100" dirty="0">
-                <a:latin typeface="Arial" panose="020B0604020202020204" pitchFamily="34" charset="0"/>
-                <a:cs typeface="Arial" panose="020B0604020202020204" pitchFamily="34" charset="0"/>
-              </a:rPr>
-              <a:t>SNS KMS </a:t>
-            </a:r>
-          </a:p>
-          <a:p>
-            <a:pPr algn="ctr"/>
-            <a:r>
-              <a:rPr lang="en-US" sz="1100" dirty="0">
-                <a:latin typeface="Arial" panose="020B0604020202020204" pitchFamily="34" charset="0"/>
-                <a:cs typeface="Arial" panose="020B0604020202020204" pitchFamily="34" charset="0"/>
-              </a:rPr>
-              <a:t>Key</a:t>
-            </a:r>
-          </a:p>
-        </p:txBody>
-      </p:sp>
-      <p:sp>
-        <p:nvSpPr>
-          <p:cNvPr id="38" name="Oval 37">
-            <a:extLst>
-              <a:ext uri="{FF2B5EF4-FFF2-40B4-BE49-F238E27FC236}">
-                <a16:creationId xmlns:a16="http://schemas.microsoft.com/office/drawing/2014/main" id="{4D62BE70-7F79-0946-0611-005B207927B3}"/>
-              </a:ext>
-            </a:extLst>
-          </p:cNvPr>
-          <p:cNvSpPr/>
-          <p:nvPr/>
-        </p:nvSpPr>
-        <p:spPr>
-          <a:xfrm>
-            <a:off x="5391198" y="5393729"/>
-            <a:ext cx="253435" cy="212902"/>
-          </a:xfrm>
-          <a:prstGeom prst="ellipse">
-            <a:avLst/>
-          </a:prstGeom>
-          <a:solidFill>
-            <a:schemeClr val="tx1"/>
-          </a:solidFill>
-          <a:ln>
-            <a:solidFill>
-              <a:schemeClr val="tx1"/>
-            </a:solidFill>
-          </a:ln>
-        </p:spPr>
-        <p:style>
-          <a:lnRef idx="2">
-            <a:schemeClr val="accent1">
-              <a:shade val="50000"/>
-            </a:schemeClr>
-          </a:lnRef>
-          <a:fillRef idx="1">
-            <a:schemeClr val="accent1"/>
-          </a:fillRef>
-          <a:effectRef idx="0">
-            <a:schemeClr val="accent1"/>
-          </a:effectRef>
-          <a:fontRef idx="minor">
-            <a:schemeClr val="lt1"/>
-          </a:fontRef>
-        </p:style>
-        <p:txBody>
-          <a:bodyPr lIns="0" tIns="0" rIns="0" bIns="0" rtlCol="0" anchor="ctr"/>
-          <a:lstStyle/>
-          <a:p>
-            <a:pPr algn="ctr"/>
-            <a:r>
-              <a:rPr lang="en-US" sz="800" dirty="0">
-                <a:latin typeface="Arial" panose="020B0604020202020204" pitchFamily="34" charset="0"/>
-                <a:cs typeface="Arial" panose="020B0604020202020204" pitchFamily="34" charset="0"/>
-              </a:rPr>
-              <a:t>3.7</a:t>
-            </a:r>
-          </a:p>
-        </p:txBody>
-      </p:sp>
-      <p:pic>
-        <p:nvPicPr>
-          <p:cNvPr id="100" name="Graphic 99">
-            <a:extLst>
-              <a:ext uri="{FF2B5EF4-FFF2-40B4-BE49-F238E27FC236}">
-                <a16:creationId xmlns:a16="http://schemas.microsoft.com/office/drawing/2014/main" id="{09B9FC02-6DB1-64F6-F1FE-F7C189505576}"/>
-              </a:ext>
-            </a:extLst>
-          </p:cNvPr>
-          <p:cNvPicPr>
-            <a:picLocks noChangeAspect="1"/>
-          </p:cNvPicPr>
-          <p:nvPr/>
-        </p:nvPicPr>
-        <p:blipFill>
-          <a:blip r:embed="rId12">
-            <a:extLst>
-              <a:ext uri="{96DAC541-7B7A-43D3-8B79-37D633B846F1}">
-                <asvg:svgBlip xmlns:asvg="http://schemas.microsoft.com/office/drawing/2016/SVG/main" r:embed="rId13"/>
-              </a:ext>
-            </a:extLst>
-          </a:blip>
-          <a:stretch>
-            <a:fillRect/>
-          </a:stretch>
-        </p:blipFill>
-        <p:spPr>
-          <a:xfrm>
-            <a:off x="4926856" y="5093527"/>
-            <a:ext cx="442506" cy="391567"/>
-          </a:xfrm>
-          <a:prstGeom prst="rect">
-            <a:avLst/>
-          </a:prstGeom>
-          <a:effectLst>
-            <a:outerShdw blurRad="50800" dist="38100" dir="13500000" algn="br" rotWithShape="0">
-              <a:prstClr val="black">
-                <a:alpha val="40000"/>
-              </a:prstClr>
-            </a:outerShdw>
-          </a:effectLst>
-        </p:spPr>
-      </p:pic>
-      <p:sp>
-        <p:nvSpPr>
-          <p:cNvPr id="5" name="TextBox 4">
-            <a:extLst>
-              <a:ext uri="{FF2B5EF4-FFF2-40B4-BE49-F238E27FC236}">
-                <a16:creationId xmlns:a16="http://schemas.microsoft.com/office/drawing/2014/main" id="{F85898DF-FE06-B871-7520-928FCB7C3AD4}"/>
-              </a:ext>
-            </a:extLst>
-          </p:cNvPr>
-          <p:cNvSpPr txBox="1"/>
-          <p:nvPr/>
-        </p:nvSpPr>
-        <p:spPr>
-          <a:xfrm>
-            <a:off x="7763762" y="5093527"/>
-            <a:ext cx="1233913" cy="430887"/>
-          </a:xfrm>
-          <a:prstGeom prst="rect">
-            <a:avLst/>
-          </a:prstGeom>
-          <a:noFill/>
-        </p:spPr>
-        <p:txBody>
-          <a:bodyPr wrap="square" rtlCol="0">
-            <a:spAutoFit/>
-          </a:bodyPr>
-          <a:lstStyle/>
-          <a:p>
-            <a:pPr algn="ctr"/>
-            <a:r>
-              <a:rPr lang="en-US" sz="1100" dirty="0">
-                <a:latin typeface="Arial" panose="020B0604020202020204" pitchFamily="34" charset="0"/>
-                <a:cs typeface="Arial" panose="020B0604020202020204" pitchFamily="34" charset="0"/>
-              </a:rPr>
-              <a:t>AWS CloudFormation</a:t>
-            </a:r>
-          </a:p>
-        </p:txBody>
-      </p:sp>
-      <p:pic>
-        <p:nvPicPr>
-          <p:cNvPr id="7" name="Graphic 6">
-            <a:extLst>
-              <a:ext uri="{FF2B5EF4-FFF2-40B4-BE49-F238E27FC236}">
-                <a16:creationId xmlns:a16="http://schemas.microsoft.com/office/drawing/2014/main" id="{7F8E8395-F0FD-2459-8B0B-206B29F4EA4E}"/>
-              </a:ext>
-            </a:extLst>
-          </p:cNvPr>
-          <p:cNvPicPr>
-            <a:picLocks noChangeAspect="1"/>
-          </p:cNvPicPr>
-          <p:nvPr/>
-        </p:nvPicPr>
-        <p:blipFill>
-          <a:blip r:embed="rId14">
-            <a:extLst>
-              <a:ext uri="{96DAC541-7B7A-43D3-8B79-37D633B846F1}">
-                <asvg:svgBlip xmlns:asvg="http://schemas.microsoft.com/office/drawing/2016/SVG/main" r:embed="rId15"/>
-              </a:ext>
-            </a:extLst>
-          </a:blip>
-          <a:stretch>
-            <a:fillRect/>
-          </a:stretch>
-        </p:blipFill>
-        <p:spPr>
-          <a:xfrm>
-            <a:off x="8164129" y="4652127"/>
-            <a:ext cx="457200" cy="457200"/>
-          </a:xfrm>
-          <a:prstGeom prst="rect">
-            <a:avLst/>
-          </a:prstGeom>
-        </p:spPr>
-      </p:pic>
-      <p:sp>
-        <p:nvSpPr>
-          <p:cNvPr id="9" name="Oval 8">
-            <a:extLst>
-              <a:ext uri="{FF2B5EF4-FFF2-40B4-BE49-F238E27FC236}">
-                <a16:creationId xmlns:a16="http://schemas.microsoft.com/office/drawing/2014/main" id="{66B62D17-C47D-420A-1668-9AFCC0E27D99}"/>
-              </a:ext>
-            </a:extLst>
-          </p:cNvPr>
-          <p:cNvSpPr/>
-          <p:nvPr/>
-        </p:nvSpPr>
-        <p:spPr>
-          <a:xfrm>
-            <a:off x="8073114" y="4571038"/>
-            <a:ext cx="253435" cy="212902"/>
-          </a:xfrm>
-          <a:prstGeom prst="ellipse">
-            <a:avLst/>
-          </a:prstGeom>
-          <a:solidFill>
-            <a:schemeClr val="tx1"/>
-          </a:solidFill>
-          <a:ln>
-            <a:solidFill>
-              <a:schemeClr val="tx1"/>
-            </a:solidFill>
-          </a:ln>
-        </p:spPr>
-        <p:style>
-          <a:lnRef idx="2">
-            <a:schemeClr val="accent1">
-              <a:shade val="50000"/>
-            </a:schemeClr>
-          </a:lnRef>
-          <a:fillRef idx="1">
-            <a:schemeClr val="accent1"/>
-          </a:fillRef>
-          <a:effectRef idx="0">
-            <a:schemeClr val="accent1"/>
-          </a:effectRef>
-          <a:fontRef idx="minor">
-            <a:schemeClr val="lt1"/>
-          </a:fontRef>
-        </p:style>
-        <p:txBody>
-          <a:bodyPr lIns="0" tIns="0" rIns="0" bIns="0" rtlCol="0" anchor="ctr"/>
-          <a:lstStyle/>
-          <a:p>
-            <a:pPr algn="ctr"/>
-            <a:r>
-              <a:rPr lang="en-US" sz="800" dirty="0">
-                <a:latin typeface="Arial" panose="020B0604020202020204" pitchFamily="34" charset="0"/>
-                <a:cs typeface="Arial" panose="020B0604020202020204" pitchFamily="34" charset="0"/>
-              </a:rPr>
-              <a:t>4.1</a:t>
-            </a:r>
-          </a:p>
-        </p:txBody>
-      </p:sp>
-      <p:sp>
-        <p:nvSpPr>
-          <p:cNvPr id="22" name="TextBox 21">
-            <a:extLst>
-              <a:ext uri="{FF2B5EF4-FFF2-40B4-BE49-F238E27FC236}">
-                <a16:creationId xmlns:a16="http://schemas.microsoft.com/office/drawing/2014/main" id="{F30231AB-D545-2D74-B8FB-112A1A36655B}"/>
-              </a:ext>
-            </a:extLst>
-          </p:cNvPr>
-          <p:cNvSpPr txBox="1"/>
-          <p:nvPr/>
-        </p:nvSpPr>
-        <p:spPr>
-          <a:xfrm>
-            <a:off x="3372692" y="5977879"/>
-            <a:ext cx="1504214" cy="430887"/>
-          </a:xfrm>
-          <a:prstGeom prst="rect">
-            <a:avLst/>
-          </a:prstGeom>
-          <a:noFill/>
-        </p:spPr>
-        <p:txBody>
-          <a:bodyPr wrap="square" rtlCol="0">
-            <a:spAutoFit/>
-          </a:bodyPr>
-          <a:lstStyle/>
-          <a:p>
-            <a:pPr algn="ctr"/>
-            <a:r>
-              <a:rPr lang="en-US" sz="1100" dirty="0">
-                <a:latin typeface="Arial" panose="020B0604020202020204" pitchFamily="34" charset="0"/>
-                <a:cs typeface="Arial" panose="020B0604020202020204" pitchFamily="34" charset="0"/>
-              </a:rPr>
-              <a:t>Config </a:t>
-            </a:r>
-          </a:p>
-          <a:p>
-            <a:pPr algn="ctr"/>
-            <a:r>
-              <a:rPr lang="en-US" sz="1100" dirty="0">
-                <a:latin typeface="Arial" panose="020B0604020202020204" pitchFamily="34" charset="0"/>
-                <a:cs typeface="Arial" panose="020B0604020202020204" pitchFamily="34" charset="0"/>
-              </a:rPr>
-              <a:t>Aggregator</a:t>
-            </a:r>
-          </a:p>
-        </p:txBody>
-      </p:sp>
-      <p:pic>
-        <p:nvPicPr>
-          <p:cNvPr id="23" name="Graphic 8">
-            <a:extLst>
-              <a:ext uri="{FF2B5EF4-FFF2-40B4-BE49-F238E27FC236}">
-                <a16:creationId xmlns:a16="http://schemas.microsoft.com/office/drawing/2014/main" id="{0A4BB5EA-9044-18F9-82E4-ED3DE32C5ACC}"/>
-              </a:ext>
-            </a:extLst>
-          </p:cNvPr>
-          <p:cNvPicPr>
-            <a:picLocks noChangeAspect="1" noChangeArrowheads="1"/>
-          </p:cNvPicPr>
-          <p:nvPr/>
-        </p:nvPicPr>
-        <p:blipFill>
-          <a:blip r:embed="rId19">
-            <a:extLst>
-              <a:ext uri="{96DAC541-7B7A-43D3-8B79-37D633B846F1}">
-                <asvg:svgBlip xmlns:asvg="http://schemas.microsoft.com/office/drawing/2016/SVG/main" r:embed="rId20"/>
-              </a:ext>
-            </a:extLst>
-          </a:blip>
-          <a:srcRect/>
-          <a:stretch/>
-        </p:blipFill>
-        <p:spPr bwMode="auto">
-          <a:xfrm>
-            <a:off x="3924332" y="5617829"/>
-            <a:ext cx="408383" cy="408383"/>
-          </a:xfrm>
-          <a:prstGeom prst="rect">
-            <a:avLst/>
-          </a:prstGeom>
-          <a:noFill/>
-          <a:ln>
-            <a:noFill/>
-          </a:ln>
-          <a:extLst>
-            <a:ext uri="{909E8E84-426E-40DD-AFC4-6F175D3DCCD1}">
-              <a14:hiddenFill xmlns:a14="http://schemas.microsoft.com/office/drawing/2010/main">
-                <a:solidFill>
-                  <a:srgbClr val="FFFFFF"/>
-                </a:solidFill>
-              </a14:hiddenFill>
-            </a:ext>
-            <a:ext uri="{91240B29-F687-4F45-9708-019B960494DF}">
-              <a14:hiddenLine xmlns:a14="http://schemas.microsoft.com/office/drawing/2010/main" w="9525">
-                <a:solidFill>
-                  <a:srgbClr val="000000"/>
-                </a:solidFill>
-                <a:miter lim="800000"/>
-                <a:headEnd/>
-                <a:tailEnd/>
-              </a14:hiddenLine>
-            </a:ext>
-          </a:extLst>
-        </p:spPr>
-      </p:pic>
-      <p:sp>
-        <p:nvSpPr>
-          <p:cNvPr id="24" name="Oval 23">
-            <a:extLst>
-              <a:ext uri="{FF2B5EF4-FFF2-40B4-BE49-F238E27FC236}">
-                <a16:creationId xmlns:a16="http://schemas.microsoft.com/office/drawing/2014/main" id="{54086077-7F12-AE28-F3E7-F6B133B70894}"/>
-              </a:ext>
-            </a:extLst>
-          </p:cNvPr>
-          <p:cNvSpPr/>
-          <p:nvPr/>
-        </p:nvSpPr>
-        <p:spPr>
-          <a:xfrm>
-            <a:off x="3799642" y="5522665"/>
-            <a:ext cx="253435" cy="212902"/>
-          </a:xfrm>
-          <a:prstGeom prst="ellipse">
-            <a:avLst/>
-          </a:prstGeom>
-          <a:solidFill>
-            <a:schemeClr val="tx1"/>
-          </a:solidFill>
-          <a:ln>
-            <a:solidFill>
-              <a:schemeClr val="tx1"/>
-            </a:solidFill>
-          </a:ln>
-        </p:spPr>
-        <p:style>
-          <a:lnRef idx="2">
-            <a:schemeClr val="accent1">
-              <a:shade val="50000"/>
-            </a:schemeClr>
-          </a:lnRef>
-          <a:fillRef idx="1">
-            <a:schemeClr val="accent1"/>
-          </a:fillRef>
-          <a:effectRef idx="0">
-            <a:schemeClr val="accent1"/>
-          </a:effectRef>
-          <a:fontRef idx="minor">
-            <a:schemeClr val="lt1"/>
-          </a:fontRef>
-        </p:style>
-        <p:txBody>
-          <a:bodyPr lIns="0" tIns="0" rIns="0" bIns="0" rtlCol="0" anchor="ctr"/>
-          <a:lstStyle/>
-          <a:p>
-            <a:pPr algn="ctr"/>
-            <a:r>
-              <a:rPr lang="en-US" sz="800" dirty="0">
-                <a:latin typeface="Arial" panose="020B0604020202020204" pitchFamily="34" charset="0"/>
-                <a:cs typeface="Arial" panose="020B0604020202020204" pitchFamily="34" charset="0"/>
-              </a:rPr>
               <a:t>3.6</a:t>
             </a:r>
           </a:p>
         </p:txBody>
       </p:sp>
-      <p:sp>
-        <p:nvSpPr>
-          <p:cNvPr id="60" name="TextBox 59">
-            <a:extLst>
-              <a:ext uri="{FF2B5EF4-FFF2-40B4-BE49-F238E27FC236}">
-                <a16:creationId xmlns:a16="http://schemas.microsoft.com/office/drawing/2014/main" id="{BE3129B1-31E0-8868-831C-1A56112DC9AE}"/>
-              </a:ext>
-            </a:extLst>
-          </p:cNvPr>
-          <p:cNvSpPr txBox="1"/>
-          <p:nvPr/>
-        </p:nvSpPr>
-        <p:spPr>
-          <a:xfrm>
-            <a:off x="1967400" y="3256130"/>
-            <a:ext cx="1103001" cy="430887"/>
-          </a:xfrm>
-          <a:prstGeom prst="rect">
-            <a:avLst/>
-          </a:prstGeom>
-          <a:noFill/>
-        </p:spPr>
-        <p:txBody>
-          <a:bodyPr wrap="square" rtlCol="0">
-            <a:spAutoFit/>
-          </a:bodyPr>
-          <a:lstStyle/>
-          <a:p>
-            <a:pPr algn="ctr"/>
-            <a:r>
-              <a:rPr lang="en-US" sz="1100" dirty="0">
-                <a:latin typeface="Arial" panose="020B0604020202020204" pitchFamily="34" charset="0"/>
-                <a:cs typeface="Arial" panose="020B0604020202020204" pitchFamily="34" charset="0"/>
-              </a:rPr>
-              <a:t>Configuration Role</a:t>
-            </a:r>
-          </a:p>
-        </p:txBody>
-      </p:sp>
-      <p:pic>
-        <p:nvPicPr>
-          <p:cNvPr id="61" name="Graphic 60">
-            <a:extLst>
-              <a:ext uri="{FF2B5EF4-FFF2-40B4-BE49-F238E27FC236}">
-                <a16:creationId xmlns:a16="http://schemas.microsoft.com/office/drawing/2014/main" id="{355BEDDA-F9C0-FCE2-AC94-510D21CA5215}"/>
-              </a:ext>
-            </a:extLst>
-          </p:cNvPr>
-          <p:cNvPicPr>
-            <a:picLocks noChangeAspect="1"/>
-          </p:cNvPicPr>
-          <p:nvPr/>
-        </p:nvPicPr>
-        <p:blipFill>
-          <a:blip r:embed="rId17">
-            <a:extLst>
-              <a:ext uri="{96DAC541-7B7A-43D3-8B79-37D633B846F1}">
-                <asvg:svgBlip xmlns:asvg="http://schemas.microsoft.com/office/drawing/2016/SVG/main" r:embed="rId18"/>
-              </a:ext>
-            </a:extLst>
-          </a:blip>
-          <a:stretch>
-            <a:fillRect/>
-          </a:stretch>
-        </p:blipFill>
-        <p:spPr>
-          <a:xfrm>
-            <a:off x="2288532" y="2888455"/>
-            <a:ext cx="469900" cy="469900"/>
-          </a:xfrm>
-          <a:prstGeom prst="rect">
-            <a:avLst/>
-          </a:prstGeom>
-        </p:spPr>
-      </p:pic>
-      <p:sp>
-        <p:nvSpPr>
-          <p:cNvPr id="62" name="Oval 61">
-            <a:extLst>
-              <a:ext uri="{FF2B5EF4-FFF2-40B4-BE49-F238E27FC236}">
-                <a16:creationId xmlns:a16="http://schemas.microsoft.com/office/drawing/2014/main" id="{84CC7098-DD0B-457D-8EC4-281A8CD36CB3}"/>
-              </a:ext>
-            </a:extLst>
-          </p:cNvPr>
-          <p:cNvSpPr/>
-          <p:nvPr/>
-        </p:nvSpPr>
-        <p:spPr>
-          <a:xfrm>
-            <a:off x="2155894" y="2854701"/>
-            <a:ext cx="253435" cy="212902"/>
-          </a:xfrm>
-          <a:prstGeom prst="ellipse">
-            <a:avLst/>
-          </a:prstGeom>
-          <a:solidFill>
-            <a:schemeClr val="tx1"/>
-          </a:solidFill>
-          <a:ln>
-            <a:solidFill>
-              <a:schemeClr val="tx1"/>
-            </a:solidFill>
-          </a:ln>
-        </p:spPr>
-        <p:style>
-          <a:lnRef idx="2">
-            <a:schemeClr val="accent1">
-              <a:shade val="50000"/>
-            </a:schemeClr>
-          </a:lnRef>
-          <a:fillRef idx="1">
-            <a:schemeClr val="accent1"/>
-          </a:fillRef>
-          <a:effectRef idx="0">
-            <a:schemeClr val="accent1"/>
-          </a:effectRef>
-          <a:fontRef idx="minor">
-            <a:schemeClr val="lt1"/>
-          </a:fontRef>
-        </p:style>
-        <p:txBody>
-          <a:bodyPr lIns="0" tIns="0" rIns="0" bIns="0" rtlCol="0" anchor="ctr"/>
-          <a:lstStyle/>
-          <a:p>
-            <a:pPr algn="ctr"/>
-            <a:r>
-              <a:rPr lang="en-US" sz="800" dirty="0">
-                <a:latin typeface="Arial" panose="020B0604020202020204" pitchFamily="34" charset="0"/>
-                <a:cs typeface="Arial" panose="020B0604020202020204" pitchFamily="34" charset="0"/>
-              </a:rPr>
-              <a:t>1.3</a:t>
-            </a:r>
-          </a:p>
-        </p:txBody>
-      </p:sp>
-      <p:cxnSp>
-        <p:nvCxnSpPr>
-          <p:cNvPr id="65" name="Straight Arrow Connector 64">
-            <a:extLst>
-              <a:ext uri="{FF2B5EF4-FFF2-40B4-BE49-F238E27FC236}">
-                <a16:creationId xmlns:a16="http://schemas.microsoft.com/office/drawing/2014/main" id="{7AE7F20E-2158-846B-17A3-5960D872E911}"/>
-              </a:ext>
-            </a:extLst>
-          </p:cNvPr>
-          <p:cNvCxnSpPr>
-            <a:cxnSpLocks/>
-          </p:cNvCxnSpPr>
-          <p:nvPr/>
-        </p:nvCxnSpPr>
-        <p:spPr>
-          <a:xfrm>
-            <a:off x="4515940" y="1228077"/>
-            <a:ext cx="463335" cy="0"/>
-          </a:xfrm>
-          <a:prstGeom prst="straightConnector1">
-            <a:avLst/>
-          </a:prstGeom>
-          <a:ln>
-            <a:tailEnd type="triangle"/>
-          </a:ln>
-        </p:spPr>
-        <p:style>
-          <a:lnRef idx="1">
-            <a:schemeClr val="dk1"/>
-          </a:lnRef>
-          <a:fillRef idx="0">
-            <a:schemeClr val="dk1"/>
-          </a:fillRef>
-          <a:effectRef idx="0">
-            <a:schemeClr val="dk1"/>
-          </a:effectRef>
-          <a:fontRef idx="minor">
-            <a:schemeClr val="tx1"/>
-          </a:fontRef>
-        </p:style>
-      </p:cxnSp>
-      <p:sp>
-        <p:nvSpPr>
-          <p:cNvPr id="71" name="Oval 70">
-            <a:extLst>
-              <a:ext uri="{FF2B5EF4-FFF2-40B4-BE49-F238E27FC236}">
-                <a16:creationId xmlns:a16="http://schemas.microsoft.com/office/drawing/2014/main" id="{02D355C9-C25E-60AC-3C12-F876AF4A19B8}"/>
-              </a:ext>
-            </a:extLst>
-          </p:cNvPr>
-          <p:cNvSpPr/>
-          <p:nvPr/>
-        </p:nvSpPr>
-        <p:spPr>
-          <a:xfrm>
-            <a:off x="8846931" y="2408332"/>
-            <a:ext cx="253435" cy="212902"/>
-          </a:xfrm>
-          <a:prstGeom prst="ellipse">
-            <a:avLst/>
-          </a:prstGeom>
-          <a:solidFill>
-            <a:schemeClr val="tx1"/>
-          </a:solidFill>
-          <a:ln>
-            <a:solidFill>
-              <a:schemeClr val="tx1"/>
-            </a:solidFill>
-          </a:ln>
-        </p:spPr>
-        <p:style>
-          <a:lnRef idx="2">
-            <a:schemeClr val="accent1">
-              <a:shade val="50000"/>
-            </a:schemeClr>
-          </a:lnRef>
-          <a:fillRef idx="1">
-            <a:schemeClr val="accent1"/>
-          </a:fillRef>
-          <a:effectRef idx="0">
-            <a:schemeClr val="accent1"/>
-          </a:effectRef>
-          <a:fontRef idx="minor">
-            <a:schemeClr val="lt1"/>
-          </a:fontRef>
-        </p:style>
-        <p:txBody>
-          <a:bodyPr lIns="0" tIns="0" rIns="0" bIns="0" rtlCol="0" anchor="ctr"/>
-          <a:lstStyle/>
-          <a:p>
-            <a:pPr algn="ctr"/>
-            <a:r>
-              <a:rPr lang="en-US" sz="800" dirty="0">
-                <a:latin typeface="Arial" panose="020B0604020202020204" pitchFamily="34" charset="0"/>
-                <a:cs typeface="Arial" panose="020B0604020202020204" pitchFamily="34" charset="0"/>
-              </a:rPr>
-              <a:t>2.3</a:t>
-            </a:r>
-          </a:p>
-        </p:txBody>
-      </p:sp>
-      <p:pic>
-        <p:nvPicPr>
-          <p:cNvPr id="72" name="Graphic 71">
-            <a:extLst>
-              <a:ext uri="{FF2B5EF4-FFF2-40B4-BE49-F238E27FC236}">
-                <a16:creationId xmlns:a16="http://schemas.microsoft.com/office/drawing/2014/main" id="{A2FCFDE6-8EA4-CF02-29A8-8562827C873E}"/>
-              </a:ext>
-            </a:extLst>
-          </p:cNvPr>
-          <p:cNvPicPr>
-            <a:picLocks noChangeAspect="1"/>
-          </p:cNvPicPr>
-          <p:nvPr/>
-        </p:nvPicPr>
-        <p:blipFill>
-          <a:blip r:embed="rId5">
-            <a:extLst>
-              <a:ext uri="{96DAC541-7B7A-43D3-8B79-37D633B846F1}">
-                <asvg:svgBlip xmlns:asvg="http://schemas.microsoft.com/office/drawing/2016/SVG/main" r:embed="rId6"/>
-              </a:ext>
-            </a:extLst>
-          </a:blip>
-          <a:stretch>
-            <a:fillRect/>
-          </a:stretch>
-        </p:blipFill>
-        <p:spPr>
-          <a:xfrm>
-            <a:off x="654509" y="3883421"/>
-            <a:ext cx="424469" cy="424469"/>
-          </a:xfrm>
-          <a:prstGeom prst="rect">
-            <a:avLst/>
-          </a:prstGeom>
-        </p:spPr>
-      </p:pic>
     </p:spTree>
     <p:extLst>
       <p:ext uri="{BB962C8B-B14F-4D97-AF65-F5344CB8AC3E}">

</xml_diff>